<commit_message>
Updates to the exceptions presentation.
</commit_message>
<xml_diff>
--- a/Presentations/Exceptions.pptx
+++ b/Presentations/Exceptions.pptx
@@ -15,6 +15,23 @@
     <p:sldId id="263" r:id="rId9"/>
     <p:sldId id="264" r:id="rId10"/>
     <p:sldId id="265" r:id="rId11"/>
+    <p:sldId id="266" r:id="rId12"/>
+    <p:sldId id="267" r:id="rId13"/>
+    <p:sldId id="268" r:id="rId14"/>
+    <p:sldId id="270" r:id="rId15"/>
+    <p:sldId id="269" r:id="rId16"/>
+    <p:sldId id="271" r:id="rId17"/>
+    <p:sldId id="272" r:id="rId18"/>
+    <p:sldId id="273" r:id="rId19"/>
+    <p:sldId id="274" r:id="rId20"/>
+    <p:sldId id="275" r:id="rId21"/>
+    <p:sldId id="276" r:id="rId22"/>
+    <p:sldId id="277" r:id="rId23"/>
+    <p:sldId id="278" r:id="rId24"/>
+    <p:sldId id="279" r:id="rId25"/>
+    <p:sldId id="280" r:id="rId26"/>
+    <p:sldId id="281" r:id="rId27"/>
+    <p:sldId id="282" r:id="rId28"/>
   </p:sldIdLst>
   <p:sldSz cx="12192000" cy="6858000"/>
   <p:notesSz cx="6858000" cy="9144000"/>
@@ -113,6 +130,11 @@
       </a:defRPr>
     </a:lvl9pPr>
   </p:defaultTextStyle>
+  <p:extLst>
+    <p:ext uri="{EFAFB233-063F-42B5-8137-9DF3F51BA10A}">
+      <p15:sldGuideLst xmlns:p15="http://schemas.microsoft.com/office/powerpoint/2012/main"/>
+    </p:ext>
+  </p:extLst>
 </p:presentation>
 </file>
 
@@ -3501,22 +3523,14 @@
             <a:pPr lvl="1"/>
             <a:r>
               <a:rPr lang="en-US" dirty="0"/>
-              <a:t>Handling such a failure is largely a local matter, so propagating error information over a long distance isn’t needed, manipulating error codes is fine</a:t>
+              <a:t>Handling such a failure is often a local matter, so propagating error information over a long distance isn’t needed, manipulating error codes is fine</a:t>
             </a:r>
           </a:p>
           <a:p>
             <a:pPr lvl="1"/>
             <a:r>
               <a:rPr lang="en-US" dirty="0"/>
-              <a:t>If necessary, the </a:t>
-            </a:r>
-            <a:r>
-              <a:rPr lang="en-US"/>
-              <a:t>error code can </a:t>
-            </a:r>
-            <a:r>
-              <a:rPr lang="en-US" dirty="0"/>
-              <a:t>be translated into an exception:</a:t>
+              <a:t>If necessary, the error code can be translated into an exception:</a:t>
             </a:r>
           </a:p>
         </p:txBody>
@@ -3665,6 +3679,1922 @@
     <p:extLst>
       <p:ext uri="{BB962C8B-B14F-4D97-AF65-F5344CB8AC3E}">
         <p14:creationId xmlns:p14="http://schemas.microsoft.com/office/powerpoint/2010/main" val="802124934"/>
+      </p:ext>
+    </p:extLst>
+  </p:cSld>
+  <p:clrMapOvr>
+    <a:masterClrMapping/>
+  </p:clrMapOvr>
+</p:sld>
+</file>
+
+<file path=ppt/slides/slide11.xml><?xml version="1.0" encoding="utf-8"?>
+<p:sld xmlns:a="http://schemas.openxmlformats.org/drawingml/2006/main" xmlns:r="http://schemas.openxmlformats.org/officeDocument/2006/relationships" xmlns:p="http://schemas.openxmlformats.org/presentationml/2006/main">
+  <p:cSld>
+    <p:spTree>
+      <p:nvGrpSpPr>
+        <p:cNvPr id="1" name=""/>
+        <p:cNvGrpSpPr/>
+        <p:nvPr/>
+      </p:nvGrpSpPr>
+      <p:grpSpPr>
+        <a:xfrm>
+          <a:off x="0" y="0"/>
+          <a:ext cx="0" cy="0"/>
+          <a:chOff x="0" y="0"/>
+          <a:chExt cx="0" cy="0"/>
+        </a:xfrm>
+      </p:grpSpPr>
+      <p:sp>
+        <p:nvSpPr>
+          <p:cNvPr id="2" name="Title 1">
+            <a:extLst>
+              <a:ext uri="{FF2B5EF4-FFF2-40B4-BE49-F238E27FC236}">
+                <a16:creationId xmlns:a16="http://schemas.microsoft.com/office/drawing/2014/main" id="{6F304A7D-A766-7DDE-2CF0-67382112C495}"/>
+              </a:ext>
+            </a:extLst>
+          </p:cNvPr>
+          <p:cNvSpPr>
+            <a:spLocks noGrp="1"/>
+          </p:cNvSpPr>
+          <p:nvPr>
+            <p:ph type="title"/>
+          </p:nvPr>
+        </p:nvSpPr>
+        <p:spPr/>
+        <p:txBody>
+          <a:bodyPr/>
+          <a:lstStyle/>
+          <a:p>
+            <a:r>
+              <a:rPr lang="en-US" dirty="0"/>
+              <a:t>Any Type?</a:t>
+            </a:r>
+          </a:p>
+        </p:txBody>
+      </p:sp>
+      <p:sp>
+        <p:nvSpPr>
+          <p:cNvPr id="3" name="Content Placeholder 2">
+            <a:extLst>
+              <a:ext uri="{FF2B5EF4-FFF2-40B4-BE49-F238E27FC236}">
+                <a16:creationId xmlns:a16="http://schemas.microsoft.com/office/drawing/2014/main" id="{37B39BEE-0E30-44F8-100D-F4922E8A176C}"/>
+              </a:ext>
+            </a:extLst>
+          </p:cNvPr>
+          <p:cNvSpPr>
+            <a:spLocks noGrp="1"/>
+          </p:cNvSpPr>
+          <p:nvPr>
+            <p:ph idx="1"/>
+          </p:nvPr>
+        </p:nvSpPr>
+        <p:spPr/>
+        <p:txBody>
+          <a:bodyPr/>
+          <a:lstStyle/>
+          <a:p>
+            <a:r>
+              <a:rPr lang="en-US" dirty="0"/>
+              <a:t>In C++, exception objects can be any type</a:t>
+            </a:r>
+          </a:p>
+          <a:p>
+            <a:pPr lvl="1"/>
+            <a:r>
+              <a:rPr lang="en-US" dirty="0"/>
+              <a:t>Primitive, scalar types: integers, characters, floating point numbers</a:t>
+            </a:r>
+          </a:p>
+          <a:p>
+            <a:pPr lvl="1"/>
+            <a:r>
+              <a:rPr lang="en-US" dirty="0"/>
+              <a:t>Pointer types (e.g., pointing at a complex dynamically allocated object)</a:t>
+            </a:r>
+          </a:p>
+          <a:p>
+            <a:pPr lvl="1"/>
+            <a:r>
+              <a:rPr lang="en-US" dirty="0"/>
+              <a:t>Class types (e.g., standard library strings, vectors, maps, etc.)</a:t>
+            </a:r>
+          </a:p>
+          <a:p>
+            <a:pPr lvl="1"/>
+            <a:r>
+              <a:rPr lang="en-US" dirty="0"/>
+              <a:t>Class types (e.g., classes of the programmer’s own design)</a:t>
+            </a:r>
+          </a:p>
+          <a:p>
+            <a:r>
+              <a:rPr lang="en-US" dirty="0"/>
+              <a:t>Unlike Java, C++ exception types need not be derived from any particular base class or be part of any particular class hierarchy</a:t>
+            </a:r>
+          </a:p>
+          <a:p>
+            <a:pPr lvl="1"/>
+            <a:r>
+              <a:rPr lang="en-US" dirty="0"/>
+              <a:t>Although the standard library provides a class hierarchy that can be used</a:t>
+            </a:r>
+          </a:p>
+          <a:p>
+            <a:r>
+              <a:rPr lang="en-US" dirty="0"/>
+              <a:t>Exception types can use multiple inheritance for some special effects</a:t>
+            </a:r>
+          </a:p>
+        </p:txBody>
+      </p:sp>
+    </p:spTree>
+    <p:extLst>
+      <p:ext uri="{BB962C8B-B14F-4D97-AF65-F5344CB8AC3E}">
+        <p14:creationId xmlns:p14="http://schemas.microsoft.com/office/powerpoint/2010/main" val="3836155075"/>
+      </p:ext>
+    </p:extLst>
+  </p:cSld>
+  <p:clrMapOvr>
+    <a:masterClrMapping/>
+  </p:clrMapOvr>
+</p:sld>
+</file>
+
+<file path=ppt/slides/slide12.xml><?xml version="1.0" encoding="utf-8"?>
+<p:sld xmlns:a="http://schemas.openxmlformats.org/drawingml/2006/main" xmlns:r="http://schemas.openxmlformats.org/officeDocument/2006/relationships" xmlns:p="http://schemas.openxmlformats.org/presentationml/2006/main">
+  <p:cSld>
+    <p:spTree>
+      <p:nvGrpSpPr>
+        <p:cNvPr id="1" name=""/>
+        <p:cNvGrpSpPr/>
+        <p:nvPr/>
+      </p:nvGrpSpPr>
+      <p:grpSpPr>
+        <a:xfrm>
+          <a:off x="0" y="0"/>
+          <a:ext cx="0" cy="0"/>
+          <a:chOff x="0" y="0"/>
+          <a:chExt cx="0" cy="0"/>
+        </a:xfrm>
+      </p:grpSpPr>
+      <p:sp>
+        <p:nvSpPr>
+          <p:cNvPr id="2" name="Title 1">
+            <a:extLst>
+              <a:ext uri="{FF2B5EF4-FFF2-40B4-BE49-F238E27FC236}">
+                <a16:creationId xmlns:a16="http://schemas.microsoft.com/office/drawing/2014/main" id="{EB8B81F8-52D4-5D72-9B1D-D018BDEEBF5A}"/>
+              </a:ext>
+            </a:extLst>
+          </p:cNvPr>
+          <p:cNvSpPr>
+            <a:spLocks noGrp="1"/>
+          </p:cNvSpPr>
+          <p:nvPr>
+            <p:ph type="title"/>
+          </p:nvPr>
+        </p:nvSpPr>
+        <p:spPr/>
+        <p:txBody>
+          <a:bodyPr/>
+          <a:lstStyle/>
+          <a:p>
+            <a:r>
+              <a:rPr lang="en-US" dirty="0"/>
+              <a:t>Try Block Syntax</a:t>
+            </a:r>
+          </a:p>
+        </p:txBody>
+      </p:sp>
+      <p:sp>
+        <p:nvSpPr>
+          <p:cNvPr id="3" name="TextBox 2">
+            <a:extLst>
+              <a:ext uri="{FF2B5EF4-FFF2-40B4-BE49-F238E27FC236}">
+                <a16:creationId xmlns:a16="http://schemas.microsoft.com/office/drawing/2014/main" id="{88D84E47-4BA9-024C-70C1-4456E5DFA7A0}"/>
+              </a:ext>
+            </a:extLst>
+          </p:cNvPr>
+          <p:cNvSpPr txBox="1"/>
+          <p:nvPr/>
+        </p:nvSpPr>
+        <p:spPr>
+          <a:xfrm>
+            <a:off x="838200" y="1690688"/>
+            <a:ext cx="10189008" cy="4247317"/>
+          </a:xfrm>
+          <a:prstGeom prst="rect">
+            <a:avLst/>
+          </a:prstGeom>
+          <a:noFill/>
+        </p:spPr>
+        <p:txBody>
+          <a:bodyPr wrap="none" rtlCol="0">
+            <a:spAutoFit/>
+          </a:bodyPr>
+          <a:lstStyle/>
+          <a:p>
+            <a:r>
+              <a:rPr lang="en-US" b="1" dirty="0">
+                <a:latin typeface="Consolas" panose="020B0609020204030204" pitchFamily="49" charset="0"/>
+                <a:cs typeface="Consolas" panose="020B0609020204030204" pitchFamily="49" charset="0"/>
+              </a:rPr>
+              <a:t>try</a:t>
+            </a:r>
+            <a:r>
+              <a:rPr lang="en-US" dirty="0">
+                <a:latin typeface="Consolas" panose="020B0609020204030204" pitchFamily="49" charset="0"/>
+                <a:cs typeface="Consolas" panose="020B0609020204030204" pitchFamily="49" charset="0"/>
+              </a:rPr>
+              <a:t> {</a:t>
+            </a:r>
+          </a:p>
+          <a:p>
+            <a:r>
+              <a:rPr lang="en-US" dirty="0">
+                <a:latin typeface="Consolas" panose="020B0609020204030204" pitchFamily="49" charset="0"/>
+                <a:cs typeface="Consolas" panose="020B0609020204030204" pitchFamily="49" charset="0"/>
+              </a:rPr>
+              <a:t>    // If an exception is thrown by this code, examine the handlers below</a:t>
+            </a:r>
+          </a:p>
+          <a:p>
+            <a:r>
+              <a:rPr lang="en-US" dirty="0">
+                <a:latin typeface="Consolas" panose="020B0609020204030204" pitchFamily="49" charset="0"/>
+                <a:cs typeface="Consolas" panose="020B0609020204030204" pitchFamily="49" charset="0"/>
+              </a:rPr>
+              <a:t>}</a:t>
+            </a:r>
+          </a:p>
+          <a:p>
+            <a:r>
+              <a:rPr lang="en-US" b="1" dirty="0">
+                <a:latin typeface="Consolas" panose="020B0609020204030204" pitchFamily="49" charset="0"/>
+                <a:cs typeface="Consolas" panose="020B0609020204030204" pitchFamily="49" charset="0"/>
+              </a:rPr>
+              <a:t>catch</a:t>
+            </a:r>
+            <a:r>
+              <a:rPr lang="en-US" dirty="0">
+                <a:latin typeface="Consolas" panose="020B0609020204030204" pitchFamily="49" charset="0"/>
+                <a:cs typeface="Consolas" panose="020B0609020204030204" pitchFamily="49" charset="0"/>
+              </a:rPr>
+              <a:t>( </a:t>
+            </a:r>
+            <a:r>
+              <a:rPr lang="en-US" b="1" dirty="0">
+                <a:latin typeface="Consolas" panose="020B0609020204030204" pitchFamily="49" charset="0"/>
+                <a:cs typeface="Consolas" panose="020B0609020204030204" pitchFamily="49" charset="0"/>
+              </a:rPr>
+              <a:t>int</a:t>
+            </a:r>
+            <a:r>
+              <a:rPr lang="en-US" dirty="0">
+                <a:latin typeface="Consolas" panose="020B0609020204030204" pitchFamily="49" charset="0"/>
+                <a:cs typeface="Consolas" panose="020B0609020204030204" pitchFamily="49" charset="0"/>
+              </a:rPr>
+              <a:t> ex ) {</a:t>
+            </a:r>
+          </a:p>
+          <a:p>
+            <a:r>
+              <a:rPr lang="en-US" dirty="0">
+                <a:latin typeface="Consolas" panose="020B0609020204030204" pitchFamily="49" charset="0"/>
+                <a:cs typeface="Consolas" panose="020B0609020204030204" pitchFamily="49" charset="0"/>
+              </a:rPr>
+              <a:t>    // Handle a thrown integer. The exception object is named ex in this scope.</a:t>
+            </a:r>
+          </a:p>
+          <a:p>
+            <a:r>
+              <a:rPr lang="en-US" dirty="0">
+                <a:latin typeface="Consolas" panose="020B0609020204030204" pitchFamily="49" charset="0"/>
+                <a:cs typeface="Consolas" panose="020B0609020204030204" pitchFamily="49" charset="0"/>
+              </a:rPr>
+              <a:t>}</a:t>
+            </a:r>
+          </a:p>
+          <a:p>
+            <a:r>
+              <a:rPr lang="en-US" b="1" dirty="0">
+                <a:latin typeface="Consolas" panose="020B0609020204030204" pitchFamily="49" charset="0"/>
+                <a:cs typeface="Consolas" panose="020B0609020204030204" pitchFamily="49" charset="0"/>
+              </a:rPr>
+              <a:t>catch</a:t>
+            </a:r>
+            <a:r>
+              <a:rPr lang="en-US" dirty="0">
+                <a:latin typeface="Consolas" panose="020B0609020204030204" pitchFamily="49" charset="0"/>
+                <a:cs typeface="Consolas" panose="020B0609020204030204" pitchFamily="49" charset="0"/>
+              </a:rPr>
+              <a:t>( </a:t>
+            </a:r>
+            <a:r>
+              <a:rPr lang="en-US" b="1" dirty="0">
+                <a:latin typeface="Consolas" panose="020B0609020204030204" pitchFamily="49" charset="0"/>
+                <a:cs typeface="Consolas" panose="020B0609020204030204" pitchFamily="49" charset="0"/>
+              </a:rPr>
+              <a:t>const</a:t>
+            </a:r>
+            <a:r>
+              <a:rPr lang="en-US" dirty="0">
+                <a:latin typeface="Consolas" panose="020B0609020204030204" pitchFamily="49" charset="0"/>
+                <a:cs typeface="Consolas" panose="020B0609020204030204" pitchFamily="49" charset="0"/>
+              </a:rPr>
+              <a:t> std::string &amp;ex ) {</a:t>
+            </a:r>
+          </a:p>
+          <a:p>
+            <a:r>
+              <a:rPr lang="en-US" dirty="0">
+                <a:latin typeface="Consolas" panose="020B0609020204030204" pitchFamily="49" charset="0"/>
+                <a:cs typeface="Consolas" panose="020B0609020204030204" pitchFamily="49" charset="0"/>
+              </a:rPr>
+              <a:t>    // Handle a thrown standard string</a:t>
+            </a:r>
+          </a:p>
+          <a:p>
+            <a:r>
+              <a:rPr lang="en-US" dirty="0">
+                <a:latin typeface="Consolas" panose="020B0609020204030204" pitchFamily="49" charset="0"/>
+                <a:cs typeface="Consolas" panose="020B0609020204030204" pitchFamily="49" charset="0"/>
+              </a:rPr>
+              <a:t>}</a:t>
+            </a:r>
+          </a:p>
+          <a:p>
+            <a:r>
+              <a:rPr lang="en-US" b="1" dirty="0">
+                <a:latin typeface="Consolas" panose="020B0609020204030204" pitchFamily="49" charset="0"/>
+                <a:cs typeface="Consolas" panose="020B0609020204030204" pitchFamily="49" charset="0"/>
+              </a:rPr>
+              <a:t>catch</a:t>
+            </a:r>
+            <a:r>
+              <a:rPr lang="en-US" dirty="0">
+                <a:latin typeface="Consolas" panose="020B0609020204030204" pitchFamily="49" charset="0"/>
+                <a:cs typeface="Consolas" panose="020B0609020204030204" pitchFamily="49" charset="0"/>
+              </a:rPr>
+              <a:t>( </a:t>
+            </a:r>
+            <a:r>
+              <a:rPr lang="en-US" b="1" dirty="0">
+                <a:latin typeface="Consolas" panose="020B0609020204030204" pitchFamily="49" charset="0"/>
+                <a:cs typeface="Consolas" panose="020B0609020204030204" pitchFamily="49" charset="0"/>
+              </a:rPr>
+              <a:t>const</a:t>
+            </a:r>
+            <a:r>
+              <a:rPr lang="en-US" dirty="0">
+                <a:latin typeface="Consolas" panose="020B0609020204030204" pitchFamily="49" charset="0"/>
+                <a:cs typeface="Consolas" panose="020B0609020204030204" pitchFamily="49" charset="0"/>
+              </a:rPr>
+              <a:t> std::map&lt;std::string, std::string&gt; &amp;ex ) {</a:t>
+            </a:r>
+          </a:p>
+          <a:p>
+            <a:r>
+              <a:rPr lang="en-US" dirty="0">
+                <a:latin typeface="Consolas" panose="020B0609020204030204" pitchFamily="49" charset="0"/>
+                <a:cs typeface="Consolas" panose="020B0609020204030204" pitchFamily="49" charset="0"/>
+              </a:rPr>
+              <a:t>    // Handle a thrown map from strings to strings</a:t>
+            </a:r>
+          </a:p>
+          <a:p>
+            <a:r>
+              <a:rPr lang="en-US" dirty="0">
+                <a:latin typeface="Consolas" panose="020B0609020204030204" pitchFamily="49" charset="0"/>
+                <a:cs typeface="Consolas" panose="020B0609020204030204" pitchFamily="49" charset="0"/>
+              </a:rPr>
+              <a:t>}</a:t>
+            </a:r>
+          </a:p>
+          <a:p>
+            <a:r>
+              <a:rPr lang="en-US" b="1" dirty="0">
+                <a:latin typeface="Consolas" panose="020B0609020204030204" pitchFamily="49" charset="0"/>
+                <a:cs typeface="Consolas" panose="020B0609020204030204" pitchFamily="49" charset="0"/>
+              </a:rPr>
+              <a:t>catch</a:t>
+            </a:r>
+            <a:r>
+              <a:rPr lang="en-US" dirty="0">
+                <a:latin typeface="Consolas" panose="020B0609020204030204" pitchFamily="49" charset="0"/>
+                <a:cs typeface="Consolas" panose="020B0609020204030204" pitchFamily="49" charset="0"/>
+              </a:rPr>
+              <a:t>( ... ) {</a:t>
+            </a:r>
+          </a:p>
+          <a:p>
+            <a:r>
+              <a:rPr lang="en-US" dirty="0">
+                <a:latin typeface="Consolas" panose="020B0609020204030204" pitchFamily="49" charset="0"/>
+                <a:cs typeface="Consolas" panose="020B0609020204030204" pitchFamily="49" charset="0"/>
+              </a:rPr>
+              <a:t>    // Handle everything else</a:t>
+            </a:r>
+          </a:p>
+          <a:p>
+            <a:r>
+              <a:rPr lang="en-US" dirty="0">
+                <a:latin typeface="Consolas" panose="020B0609020204030204" pitchFamily="49" charset="0"/>
+                <a:cs typeface="Consolas" panose="020B0609020204030204" pitchFamily="49" charset="0"/>
+              </a:rPr>
+              <a:t>}</a:t>
+            </a:r>
+          </a:p>
+        </p:txBody>
+      </p:sp>
+    </p:spTree>
+    <p:extLst>
+      <p:ext uri="{BB962C8B-B14F-4D97-AF65-F5344CB8AC3E}">
+        <p14:creationId xmlns:p14="http://schemas.microsoft.com/office/powerpoint/2010/main" val="2149257887"/>
+      </p:ext>
+    </p:extLst>
+  </p:cSld>
+  <p:clrMapOvr>
+    <a:masterClrMapping/>
+  </p:clrMapOvr>
+</p:sld>
+</file>
+
+<file path=ppt/slides/slide13.xml><?xml version="1.0" encoding="utf-8"?>
+<p:sld xmlns:a="http://schemas.openxmlformats.org/drawingml/2006/main" xmlns:r="http://schemas.openxmlformats.org/officeDocument/2006/relationships" xmlns:p="http://schemas.openxmlformats.org/presentationml/2006/main">
+  <p:cSld>
+    <p:spTree>
+      <p:nvGrpSpPr>
+        <p:cNvPr id="1" name=""/>
+        <p:cNvGrpSpPr/>
+        <p:nvPr/>
+      </p:nvGrpSpPr>
+      <p:grpSpPr>
+        <a:xfrm>
+          <a:off x="0" y="0"/>
+          <a:ext cx="0" cy="0"/>
+          <a:chOff x="0" y="0"/>
+          <a:chExt cx="0" cy="0"/>
+        </a:xfrm>
+      </p:grpSpPr>
+      <p:sp>
+        <p:nvSpPr>
+          <p:cNvPr id="2" name="Title 1">
+            <a:extLst>
+              <a:ext uri="{FF2B5EF4-FFF2-40B4-BE49-F238E27FC236}">
+                <a16:creationId xmlns:a16="http://schemas.microsoft.com/office/drawing/2014/main" id="{9D03D616-3C4E-E562-751F-724064931AE4}"/>
+              </a:ext>
+            </a:extLst>
+          </p:cNvPr>
+          <p:cNvSpPr>
+            <a:spLocks noGrp="1"/>
+          </p:cNvSpPr>
+          <p:nvPr>
+            <p:ph type="title"/>
+          </p:nvPr>
+        </p:nvSpPr>
+        <p:spPr/>
+        <p:txBody>
+          <a:bodyPr/>
+          <a:lstStyle/>
+          <a:p>
+            <a:r>
+              <a:rPr lang="en-US" dirty="0"/>
+              <a:t>More on Exception Syntax</a:t>
+            </a:r>
+          </a:p>
+        </p:txBody>
+      </p:sp>
+      <p:sp>
+        <p:nvSpPr>
+          <p:cNvPr id="3" name="Content Placeholder 2">
+            <a:extLst>
+              <a:ext uri="{FF2B5EF4-FFF2-40B4-BE49-F238E27FC236}">
+                <a16:creationId xmlns:a16="http://schemas.microsoft.com/office/drawing/2014/main" id="{D6658A94-67E5-02C8-A253-35FC872F25F6}"/>
+              </a:ext>
+            </a:extLst>
+          </p:cNvPr>
+          <p:cNvSpPr>
+            <a:spLocks noGrp="1"/>
+          </p:cNvSpPr>
+          <p:nvPr>
+            <p:ph idx="1"/>
+          </p:nvPr>
+        </p:nvSpPr>
+        <p:spPr/>
+        <p:txBody>
+          <a:bodyPr/>
+          <a:lstStyle/>
+          <a:p>
+            <a:r>
+              <a:rPr lang="en-US" dirty="0"/>
+              <a:t>If no handlers match, the exception continues to propagate</a:t>
+            </a:r>
+          </a:p>
+          <a:p>
+            <a:r>
+              <a:rPr lang="en-US" dirty="0"/>
+              <a:t>The handlers are checked in order, so if an earlier handler matches, later handers won’t be considered</a:t>
+            </a:r>
+          </a:p>
+          <a:p>
+            <a:pPr lvl="1"/>
+            <a:r>
+              <a:rPr lang="en-US" dirty="0"/>
+              <a:t>This mostly matters when using OOP techniques</a:t>
+            </a:r>
+          </a:p>
+          <a:p>
+            <a:r>
+              <a:rPr lang="en-US" dirty="0"/>
+              <a:t>The “catch all” handler must appear at the end if it is used at all</a:t>
+            </a:r>
+          </a:p>
+          <a:p>
+            <a:pPr lvl="1"/>
+            <a:r>
+              <a:rPr lang="en-US" dirty="0"/>
+              <a:t>Otherwise, no other handlers would ever be matched</a:t>
+            </a:r>
+          </a:p>
+          <a:p>
+            <a:r>
+              <a:rPr lang="en-US" dirty="0"/>
+              <a:t>Catching by reference (to const) prevents the exception object from being unnecessarily copied</a:t>
+            </a:r>
+          </a:p>
+          <a:p>
+            <a:r>
+              <a:rPr lang="en-US" dirty="0"/>
+              <a:t>Giving a name to the exception object is optional</a:t>
+            </a:r>
+          </a:p>
+        </p:txBody>
+      </p:sp>
+    </p:spTree>
+    <p:extLst>
+      <p:ext uri="{BB962C8B-B14F-4D97-AF65-F5344CB8AC3E}">
+        <p14:creationId xmlns:p14="http://schemas.microsoft.com/office/powerpoint/2010/main" val="1901719807"/>
+      </p:ext>
+    </p:extLst>
+  </p:cSld>
+  <p:clrMapOvr>
+    <a:masterClrMapping/>
+  </p:clrMapOvr>
+</p:sld>
+</file>
+
+<file path=ppt/slides/slide14.xml><?xml version="1.0" encoding="utf-8"?>
+<p:sld xmlns:a="http://schemas.openxmlformats.org/drawingml/2006/main" xmlns:r="http://schemas.openxmlformats.org/officeDocument/2006/relationships" xmlns:p="http://schemas.openxmlformats.org/presentationml/2006/main">
+  <p:cSld>
+    <p:spTree>
+      <p:nvGrpSpPr>
+        <p:cNvPr id="1" name=""/>
+        <p:cNvGrpSpPr/>
+        <p:nvPr/>
+      </p:nvGrpSpPr>
+      <p:grpSpPr>
+        <a:xfrm>
+          <a:off x="0" y="0"/>
+          <a:ext cx="0" cy="0"/>
+          <a:chOff x="0" y="0"/>
+          <a:chExt cx="0" cy="0"/>
+        </a:xfrm>
+      </p:grpSpPr>
+      <p:sp>
+        <p:nvSpPr>
+          <p:cNvPr id="2" name="Title 1">
+            <a:extLst>
+              <a:ext uri="{FF2B5EF4-FFF2-40B4-BE49-F238E27FC236}">
+                <a16:creationId xmlns:a16="http://schemas.microsoft.com/office/drawing/2014/main" id="{90CE9EF7-1A24-A3CF-BDBE-537B8F7B44AB}"/>
+              </a:ext>
+            </a:extLst>
+          </p:cNvPr>
+          <p:cNvSpPr>
+            <a:spLocks noGrp="1"/>
+          </p:cNvSpPr>
+          <p:nvPr>
+            <p:ph type="title"/>
+          </p:nvPr>
+        </p:nvSpPr>
+        <p:spPr/>
+        <p:txBody>
+          <a:bodyPr/>
+          <a:lstStyle/>
+          <a:p>
+            <a:r>
+              <a:rPr lang="en-US" dirty="0"/>
+              <a:t>Finally?</a:t>
+            </a:r>
+          </a:p>
+        </p:txBody>
+      </p:sp>
+      <p:sp>
+        <p:nvSpPr>
+          <p:cNvPr id="3" name="Content Placeholder 2">
+            <a:extLst>
+              <a:ext uri="{FF2B5EF4-FFF2-40B4-BE49-F238E27FC236}">
+                <a16:creationId xmlns:a16="http://schemas.microsoft.com/office/drawing/2014/main" id="{FA6337A5-5973-19C8-0226-1A1F884B3B9B}"/>
+              </a:ext>
+            </a:extLst>
+          </p:cNvPr>
+          <p:cNvSpPr>
+            <a:spLocks noGrp="1"/>
+          </p:cNvSpPr>
+          <p:nvPr>
+            <p:ph idx="1"/>
+          </p:nvPr>
+        </p:nvSpPr>
+        <p:spPr/>
+        <p:txBody>
+          <a:bodyPr/>
+          <a:lstStyle/>
+          <a:p>
+            <a:r>
+              <a:rPr lang="en-US" dirty="0"/>
+              <a:t>C++ try blocks do </a:t>
+            </a:r>
+            <a:r>
+              <a:rPr lang="en-US" i="1" dirty="0"/>
+              <a:t>not</a:t>
+            </a:r>
+            <a:r>
+              <a:rPr lang="en-US" dirty="0"/>
+              <a:t> have a finally clause as, for example, Java does</a:t>
+            </a:r>
+          </a:p>
+          <a:p>
+            <a:pPr lvl="1"/>
+            <a:r>
+              <a:rPr lang="en-US" dirty="0"/>
+              <a:t>The purpose of </a:t>
+            </a:r>
+            <a:r>
+              <a:rPr lang="en-US" dirty="0">
+                <a:latin typeface="Consolas" panose="020B0609020204030204" pitchFamily="49" charset="0"/>
+                <a:cs typeface="Consolas" panose="020B0609020204030204" pitchFamily="49" charset="0"/>
+              </a:rPr>
+              <a:t>finally</a:t>
+            </a:r>
+            <a:r>
+              <a:rPr lang="en-US" dirty="0"/>
+              <a:t> is to execute code either when the try block exits normally OR when an exception is thrown.</a:t>
+            </a:r>
+          </a:p>
+          <a:p>
+            <a:pPr lvl="1"/>
+            <a:r>
+              <a:rPr lang="en-US" dirty="0"/>
+              <a:t>C++ uses destructors of classes (RAI) to do this</a:t>
+            </a:r>
+          </a:p>
+          <a:p>
+            <a:r>
+              <a:rPr lang="en-US" i="1" dirty="0"/>
+              <a:t>When an exception propagates through a block, </a:t>
+            </a:r>
+            <a:r>
+              <a:rPr lang="en-US" b="1" i="1" dirty="0"/>
+              <a:t>the destructors of all fully constructed objects are executed</a:t>
+            </a:r>
+          </a:p>
+          <a:p>
+            <a:pPr lvl="1"/>
+            <a:r>
+              <a:rPr lang="en-US" dirty="0"/>
+              <a:t>… thus, resources are reclaimed regardless of if the code exits normally or exits by way of an exception</a:t>
+            </a:r>
+          </a:p>
+          <a:p>
+            <a:pPr lvl="1"/>
+            <a:r>
+              <a:rPr lang="en-US" dirty="0"/>
+              <a:t>… </a:t>
+            </a:r>
+            <a:r>
+              <a:rPr lang="en-US" u="sng" dirty="0"/>
+              <a:t>provided</a:t>
+            </a:r>
+            <a:r>
+              <a:rPr lang="en-US" dirty="0"/>
+              <a:t> all resource reclamation code is inside destructors</a:t>
+            </a:r>
+          </a:p>
+          <a:p>
+            <a:pPr lvl="1"/>
+            <a:r>
+              <a:rPr lang="en-US" i="1" dirty="0"/>
+              <a:t>Smart pointers are very helpful in this respect!</a:t>
+            </a:r>
+          </a:p>
+        </p:txBody>
+      </p:sp>
+    </p:spTree>
+    <p:extLst>
+      <p:ext uri="{BB962C8B-B14F-4D97-AF65-F5344CB8AC3E}">
+        <p14:creationId xmlns:p14="http://schemas.microsoft.com/office/powerpoint/2010/main" val="2823785419"/>
+      </p:ext>
+    </p:extLst>
+  </p:cSld>
+  <p:clrMapOvr>
+    <a:masterClrMapping/>
+  </p:clrMapOvr>
+</p:sld>
+</file>
+
+<file path=ppt/slides/slide15.xml><?xml version="1.0" encoding="utf-8"?>
+<p:sld xmlns:a="http://schemas.openxmlformats.org/drawingml/2006/main" xmlns:r="http://schemas.openxmlformats.org/officeDocument/2006/relationships" xmlns:p="http://schemas.openxmlformats.org/presentationml/2006/main">
+  <p:cSld>
+    <p:spTree>
+      <p:nvGrpSpPr>
+        <p:cNvPr id="1" name=""/>
+        <p:cNvGrpSpPr/>
+        <p:nvPr/>
+      </p:nvGrpSpPr>
+      <p:grpSpPr>
+        <a:xfrm>
+          <a:off x="0" y="0"/>
+          <a:ext cx="0" cy="0"/>
+          <a:chOff x="0" y="0"/>
+          <a:chExt cx="0" cy="0"/>
+        </a:xfrm>
+      </p:grpSpPr>
+      <p:sp>
+        <p:nvSpPr>
+          <p:cNvPr id="2" name="Title 1">
+            <a:extLst>
+              <a:ext uri="{FF2B5EF4-FFF2-40B4-BE49-F238E27FC236}">
+                <a16:creationId xmlns:a16="http://schemas.microsoft.com/office/drawing/2014/main" id="{1CBFAE61-362F-2DCD-0599-32D17B184D9D}"/>
+              </a:ext>
+            </a:extLst>
+          </p:cNvPr>
+          <p:cNvSpPr>
+            <a:spLocks noGrp="1"/>
+          </p:cNvSpPr>
+          <p:nvPr>
+            <p:ph type="title"/>
+          </p:nvPr>
+        </p:nvSpPr>
+        <p:spPr/>
+        <p:txBody>
+          <a:bodyPr/>
+          <a:lstStyle/>
+          <a:p>
+            <a:r>
+              <a:rPr lang="en-US" dirty="0"/>
+              <a:t>Multiple Threads?</a:t>
+            </a:r>
+          </a:p>
+        </p:txBody>
+      </p:sp>
+      <p:sp>
+        <p:nvSpPr>
+          <p:cNvPr id="3" name="Content Placeholder 2">
+            <a:extLst>
+              <a:ext uri="{FF2B5EF4-FFF2-40B4-BE49-F238E27FC236}">
+                <a16:creationId xmlns:a16="http://schemas.microsoft.com/office/drawing/2014/main" id="{AFBB430C-33ED-19FB-E42B-6A7704905053}"/>
+              </a:ext>
+            </a:extLst>
+          </p:cNvPr>
+          <p:cNvSpPr>
+            <a:spLocks noGrp="1"/>
+          </p:cNvSpPr>
+          <p:nvPr>
+            <p:ph idx="1"/>
+          </p:nvPr>
+        </p:nvSpPr>
+        <p:spPr/>
+        <p:txBody>
+          <a:bodyPr/>
+          <a:lstStyle/>
+          <a:p>
+            <a:r>
+              <a:rPr lang="en-US" dirty="0"/>
+              <a:t>In a multi-threaded program, an exception thrown in one thread has no impact on other threads</a:t>
+            </a:r>
+          </a:p>
+          <a:p>
+            <a:pPr lvl="1"/>
+            <a:r>
+              <a:rPr lang="en-US" u="sng" dirty="0"/>
+              <a:t>Every thread as its own call stack</a:t>
+            </a:r>
+            <a:r>
+              <a:rPr lang="en-US" dirty="0"/>
+              <a:t>. Only the stack being used by the throwing thread is unwound.</a:t>
+            </a:r>
+          </a:p>
+          <a:p>
+            <a:pPr lvl="1"/>
+            <a:r>
+              <a:rPr lang="en-US" dirty="0"/>
+              <a:t>Even if the same handler code is executed simultaneously by two threads, it doesn’t cause a problem because every thread has its own stack and its own exception object</a:t>
+            </a:r>
+          </a:p>
+        </p:txBody>
+      </p:sp>
+    </p:spTree>
+    <p:extLst>
+      <p:ext uri="{BB962C8B-B14F-4D97-AF65-F5344CB8AC3E}">
+        <p14:creationId xmlns:p14="http://schemas.microsoft.com/office/powerpoint/2010/main" val="1438819692"/>
+      </p:ext>
+    </p:extLst>
+  </p:cSld>
+  <p:clrMapOvr>
+    <a:masterClrMapping/>
+  </p:clrMapOvr>
+</p:sld>
+</file>
+
+<file path=ppt/slides/slide16.xml><?xml version="1.0" encoding="utf-8"?>
+<p:sld xmlns:a="http://schemas.openxmlformats.org/drawingml/2006/main" xmlns:r="http://schemas.openxmlformats.org/officeDocument/2006/relationships" xmlns:p="http://schemas.openxmlformats.org/presentationml/2006/main">
+  <p:cSld>
+    <p:spTree>
+      <p:nvGrpSpPr>
+        <p:cNvPr id="1" name=""/>
+        <p:cNvGrpSpPr/>
+        <p:nvPr/>
+      </p:nvGrpSpPr>
+      <p:grpSpPr>
+        <a:xfrm>
+          <a:off x="0" y="0"/>
+          <a:ext cx="0" cy="0"/>
+          <a:chOff x="0" y="0"/>
+          <a:chExt cx="0" cy="0"/>
+        </a:xfrm>
+      </p:grpSpPr>
+      <p:sp>
+        <p:nvSpPr>
+          <p:cNvPr id="2" name="Title 1">
+            <a:extLst>
+              <a:ext uri="{FF2B5EF4-FFF2-40B4-BE49-F238E27FC236}">
+                <a16:creationId xmlns:a16="http://schemas.microsoft.com/office/drawing/2014/main" id="{ED6049FD-3CE8-A861-8BBE-8F6E235EFB57}"/>
+              </a:ext>
+            </a:extLst>
+          </p:cNvPr>
+          <p:cNvSpPr>
+            <a:spLocks noGrp="1"/>
+          </p:cNvSpPr>
+          <p:nvPr>
+            <p:ph type="title"/>
+          </p:nvPr>
+        </p:nvSpPr>
+        <p:spPr/>
+        <p:txBody>
+          <a:bodyPr/>
+          <a:lstStyle/>
+          <a:p>
+            <a:r>
+              <a:rPr lang="en-US" dirty="0"/>
+              <a:t>Simple Ideas</a:t>
+            </a:r>
+          </a:p>
+        </p:txBody>
+      </p:sp>
+      <p:sp>
+        <p:nvSpPr>
+          <p:cNvPr id="3" name="Content Placeholder 2">
+            <a:extLst>
+              <a:ext uri="{FF2B5EF4-FFF2-40B4-BE49-F238E27FC236}">
+                <a16:creationId xmlns:a16="http://schemas.microsoft.com/office/drawing/2014/main" id="{43A4EBAA-D805-2937-7409-9F71F9A36817}"/>
+              </a:ext>
+            </a:extLst>
+          </p:cNvPr>
+          <p:cNvSpPr>
+            <a:spLocks noGrp="1"/>
+          </p:cNvSpPr>
+          <p:nvPr>
+            <p:ph idx="1"/>
+          </p:nvPr>
+        </p:nvSpPr>
+        <p:spPr/>
+        <p:txBody>
+          <a:bodyPr/>
+          <a:lstStyle/>
+          <a:p>
+            <a:r>
+              <a:rPr lang="en-US" dirty="0"/>
+              <a:t>Instead of returning an integer error code, why not throw the error code (i.e., throw the integer instead of returning it)?</a:t>
+            </a:r>
+          </a:p>
+          <a:p>
+            <a:pPr lvl="1"/>
+            <a:r>
+              <a:rPr lang="en-US" dirty="0"/>
+              <a:t>Useful if the handler is “far away” from the point where the error is detected</a:t>
+            </a:r>
+          </a:p>
+          <a:p>
+            <a:r>
+              <a:rPr lang="en-US" dirty="0"/>
+              <a:t>Throw a human-readable string containing an error message</a:t>
+            </a:r>
+          </a:p>
+          <a:p>
+            <a:pPr lvl="1"/>
+            <a:r>
+              <a:rPr lang="en-US" dirty="0"/>
+              <a:t>Useful to humans, less useful to other parts of the program unless the string encodes relevant data about the exception in an easy-to-parse way</a:t>
+            </a:r>
+          </a:p>
+          <a:p>
+            <a:r>
+              <a:rPr lang="en-US" dirty="0"/>
+              <a:t>Throw a structure containing information about the error so the handler has all the information it needs to fully handle the problem</a:t>
+            </a:r>
+          </a:p>
+        </p:txBody>
+      </p:sp>
+    </p:spTree>
+    <p:extLst>
+      <p:ext uri="{BB962C8B-B14F-4D97-AF65-F5344CB8AC3E}">
+        <p14:creationId xmlns:p14="http://schemas.microsoft.com/office/powerpoint/2010/main" val="3589149254"/>
+      </p:ext>
+    </p:extLst>
+  </p:cSld>
+  <p:clrMapOvr>
+    <a:masterClrMapping/>
+  </p:clrMapOvr>
+</p:sld>
+</file>
+
+<file path=ppt/slides/slide17.xml><?xml version="1.0" encoding="utf-8"?>
+<p:sld xmlns:a="http://schemas.openxmlformats.org/drawingml/2006/main" xmlns:r="http://schemas.openxmlformats.org/officeDocument/2006/relationships" xmlns:p="http://schemas.openxmlformats.org/presentationml/2006/main">
+  <p:cSld>
+    <p:spTree>
+      <p:nvGrpSpPr>
+        <p:cNvPr id="1" name=""/>
+        <p:cNvGrpSpPr/>
+        <p:nvPr/>
+      </p:nvGrpSpPr>
+      <p:grpSpPr>
+        <a:xfrm>
+          <a:off x="0" y="0"/>
+          <a:ext cx="0" cy="0"/>
+          <a:chOff x="0" y="0"/>
+          <a:chExt cx="0" cy="0"/>
+        </a:xfrm>
+      </p:grpSpPr>
+      <p:sp>
+        <p:nvSpPr>
+          <p:cNvPr id="2" name="Title 1">
+            <a:extLst>
+              <a:ext uri="{FF2B5EF4-FFF2-40B4-BE49-F238E27FC236}">
+                <a16:creationId xmlns:a16="http://schemas.microsoft.com/office/drawing/2014/main" id="{5A29CBBC-E892-5A42-EF6C-B8C54D306EE1}"/>
+              </a:ext>
+            </a:extLst>
+          </p:cNvPr>
+          <p:cNvSpPr>
+            <a:spLocks noGrp="1"/>
+          </p:cNvSpPr>
+          <p:nvPr>
+            <p:ph type="title"/>
+          </p:nvPr>
+        </p:nvSpPr>
+        <p:spPr/>
+        <p:txBody>
+          <a:bodyPr/>
+          <a:lstStyle/>
+          <a:p>
+            <a:r>
+              <a:rPr lang="en-US" dirty="0"/>
+              <a:t>Example (In General Purpose Library)</a:t>
+            </a:r>
+          </a:p>
+        </p:txBody>
+      </p:sp>
+      <p:sp>
+        <p:nvSpPr>
+          <p:cNvPr id="3" name="TextBox 2">
+            <a:extLst>
+              <a:ext uri="{FF2B5EF4-FFF2-40B4-BE49-F238E27FC236}">
+                <a16:creationId xmlns:a16="http://schemas.microsoft.com/office/drawing/2014/main" id="{D0C96205-8719-B1DD-5E52-BCA9855C8E21}"/>
+              </a:ext>
+            </a:extLst>
+          </p:cNvPr>
+          <p:cNvSpPr txBox="1"/>
+          <p:nvPr/>
+        </p:nvSpPr>
+        <p:spPr>
+          <a:xfrm>
+            <a:off x="838200" y="1690688"/>
+            <a:ext cx="10189008" cy="4524315"/>
+          </a:xfrm>
+          <a:prstGeom prst="rect">
+            <a:avLst/>
+          </a:prstGeom>
+          <a:noFill/>
+        </p:spPr>
+        <p:txBody>
+          <a:bodyPr wrap="none" rtlCol="0">
+            <a:spAutoFit/>
+          </a:bodyPr>
+          <a:lstStyle/>
+          <a:p>
+            <a:r>
+              <a:rPr lang="en-US" b="1" dirty="0">
+                <a:latin typeface="Consolas" panose="020B0609020204030204" pitchFamily="49" charset="0"/>
+                <a:cs typeface="Consolas" panose="020B0609020204030204" pitchFamily="49" charset="0"/>
+              </a:rPr>
+              <a:t>struct</a:t>
+            </a:r>
+            <a:r>
+              <a:rPr lang="en-US" dirty="0">
+                <a:latin typeface="Consolas" panose="020B0609020204030204" pitchFamily="49" charset="0"/>
+                <a:cs typeface="Consolas" panose="020B0609020204030204" pitchFamily="49" charset="0"/>
+              </a:rPr>
+              <a:t> </a:t>
+            </a:r>
+            <a:r>
+              <a:rPr lang="en-US" dirty="0" err="1">
+                <a:latin typeface="Consolas" panose="020B0609020204030204" pitchFamily="49" charset="0"/>
+                <a:cs typeface="Consolas" panose="020B0609020204030204" pitchFamily="49" charset="0"/>
+              </a:rPr>
+              <a:t>ConfigError</a:t>
+            </a:r>
+            <a:r>
+              <a:rPr lang="en-US" dirty="0">
+                <a:latin typeface="Consolas" panose="020B0609020204030204" pitchFamily="49" charset="0"/>
+                <a:cs typeface="Consolas" panose="020B0609020204030204" pitchFamily="49" charset="0"/>
+              </a:rPr>
+              <a:t> {</a:t>
+            </a:r>
+          </a:p>
+          <a:p>
+            <a:r>
+              <a:rPr lang="en-US" dirty="0">
+                <a:latin typeface="Consolas" panose="020B0609020204030204" pitchFamily="49" charset="0"/>
+                <a:cs typeface="Consolas" panose="020B0609020204030204" pitchFamily="49" charset="0"/>
+              </a:rPr>
+              <a:t>    std::string     </a:t>
+            </a:r>
+            <a:r>
+              <a:rPr lang="en-US" dirty="0" err="1">
+                <a:latin typeface="Consolas" panose="020B0609020204030204" pitchFamily="49" charset="0"/>
+                <a:cs typeface="Consolas" panose="020B0609020204030204" pitchFamily="49" charset="0"/>
+              </a:rPr>
+              <a:t>file_name</a:t>
+            </a:r>
+            <a:r>
+              <a:rPr lang="en-US" dirty="0">
+                <a:latin typeface="Consolas" panose="020B0609020204030204" pitchFamily="49" charset="0"/>
+                <a:cs typeface="Consolas" panose="020B0609020204030204" pitchFamily="49" charset="0"/>
+              </a:rPr>
+              <a:t>;</a:t>
+            </a:r>
+          </a:p>
+          <a:p>
+            <a:r>
+              <a:rPr lang="en-US" dirty="0">
+                <a:latin typeface="Consolas" panose="020B0609020204030204" pitchFamily="49" charset="0"/>
+                <a:cs typeface="Consolas" panose="020B0609020204030204" pitchFamily="49" charset="0"/>
+              </a:rPr>
+              <a:t>    </a:t>
+            </a:r>
+            <a:r>
+              <a:rPr lang="en-US" dirty="0" err="1">
+                <a:latin typeface="Consolas" panose="020B0609020204030204" pitchFamily="49" charset="0"/>
+                <a:cs typeface="Consolas" panose="020B0609020204030204" pitchFamily="49" charset="0"/>
+              </a:rPr>
+              <a:t>FileCoordinates</a:t>
+            </a:r>
+            <a:r>
+              <a:rPr lang="en-US" dirty="0">
+                <a:latin typeface="Consolas" panose="020B0609020204030204" pitchFamily="49" charset="0"/>
+                <a:cs typeface="Consolas" panose="020B0609020204030204" pitchFamily="49" charset="0"/>
+              </a:rPr>
+              <a:t> </a:t>
+            </a:r>
+            <a:r>
+              <a:rPr lang="en-US" dirty="0" err="1">
+                <a:latin typeface="Consolas" panose="020B0609020204030204" pitchFamily="49" charset="0"/>
+                <a:cs typeface="Consolas" panose="020B0609020204030204" pitchFamily="49" charset="0"/>
+              </a:rPr>
+              <a:t>file_coordinates</a:t>
+            </a:r>
+            <a:r>
+              <a:rPr lang="en-US" dirty="0">
+                <a:latin typeface="Consolas" panose="020B0609020204030204" pitchFamily="49" charset="0"/>
+                <a:cs typeface="Consolas" panose="020B0609020204030204" pitchFamily="49" charset="0"/>
+              </a:rPr>
+              <a:t>;</a:t>
+            </a:r>
+          </a:p>
+          <a:p>
+            <a:r>
+              <a:rPr lang="en-US" dirty="0">
+                <a:latin typeface="Consolas" panose="020B0609020204030204" pitchFamily="49" charset="0"/>
+                <a:cs typeface="Consolas" panose="020B0609020204030204" pitchFamily="49" charset="0"/>
+              </a:rPr>
+              <a:t>    std::string     </a:t>
+            </a:r>
+            <a:r>
+              <a:rPr lang="en-US" dirty="0" err="1">
+                <a:latin typeface="Consolas" panose="020B0609020204030204" pitchFamily="49" charset="0"/>
+                <a:cs typeface="Consolas" panose="020B0609020204030204" pitchFamily="49" charset="0"/>
+              </a:rPr>
+              <a:t>config_key</a:t>
+            </a:r>
+            <a:r>
+              <a:rPr lang="en-US" dirty="0">
+                <a:latin typeface="Consolas" panose="020B0609020204030204" pitchFamily="49" charset="0"/>
+                <a:cs typeface="Consolas" panose="020B0609020204030204" pitchFamily="49" charset="0"/>
+              </a:rPr>
+              <a:t>;</a:t>
+            </a:r>
+          </a:p>
+          <a:p>
+            <a:r>
+              <a:rPr lang="en-US" dirty="0">
+                <a:latin typeface="Consolas" panose="020B0609020204030204" pitchFamily="49" charset="0"/>
+                <a:cs typeface="Consolas" panose="020B0609020204030204" pitchFamily="49" charset="0"/>
+              </a:rPr>
+              <a:t>    std::string     </a:t>
+            </a:r>
+            <a:r>
+              <a:rPr lang="en-US" dirty="0" err="1">
+                <a:latin typeface="Consolas" panose="020B0609020204030204" pitchFamily="49" charset="0"/>
+                <a:cs typeface="Consolas" panose="020B0609020204030204" pitchFamily="49" charset="0"/>
+              </a:rPr>
+              <a:t>config_value</a:t>
+            </a:r>
+            <a:r>
+              <a:rPr lang="en-US" dirty="0">
+                <a:latin typeface="Consolas" panose="020B0609020204030204" pitchFamily="49" charset="0"/>
+                <a:cs typeface="Consolas" panose="020B0609020204030204" pitchFamily="49" charset="0"/>
+              </a:rPr>
+              <a:t>;</a:t>
+            </a:r>
+          </a:p>
+          <a:p>
+            <a:r>
+              <a:rPr lang="en-US" dirty="0">
+                <a:latin typeface="Consolas" panose="020B0609020204030204" pitchFamily="49" charset="0"/>
+                <a:cs typeface="Consolas" panose="020B0609020204030204" pitchFamily="49" charset="0"/>
+              </a:rPr>
+              <a:t>};</a:t>
+            </a:r>
+          </a:p>
+          <a:p>
+            <a:endParaRPr lang="en-US" dirty="0">
+              <a:latin typeface="Consolas" panose="020B0609020204030204" pitchFamily="49" charset="0"/>
+              <a:cs typeface="Consolas" panose="020B0609020204030204" pitchFamily="49" charset="0"/>
+            </a:endParaRPr>
+          </a:p>
+          <a:p>
+            <a:r>
+              <a:rPr lang="en-US" dirty="0">
+                <a:latin typeface="Consolas" panose="020B0609020204030204" pitchFamily="49" charset="0"/>
+                <a:cs typeface="Consolas" panose="020B0609020204030204" pitchFamily="49" charset="0"/>
+              </a:rPr>
+              <a:t>// Throw an instance of the structure initialized as indicated.</a:t>
+            </a:r>
+          </a:p>
+          <a:p>
+            <a:r>
+              <a:rPr lang="en-US" dirty="0">
+                <a:latin typeface="Consolas" panose="020B0609020204030204" pitchFamily="49" charset="0"/>
+                <a:cs typeface="Consolas" panose="020B0609020204030204" pitchFamily="49" charset="0"/>
+              </a:rPr>
+              <a:t>// Here we are reporting a problem on line 10, column 43 of “</a:t>
+            </a:r>
+            <a:r>
+              <a:rPr lang="en-US" dirty="0" err="1">
+                <a:latin typeface="Consolas" panose="020B0609020204030204" pitchFamily="49" charset="0"/>
+                <a:cs typeface="Consolas" panose="020B0609020204030204" pitchFamily="49" charset="0"/>
+              </a:rPr>
+              <a:t>config.txt</a:t>
+            </a:r>
+            <a:r>
+              <a:rPr lang="en-US" dirty="0">
+                <a:latin typeface="Consolas" panose="020B0609020204030204" pitchFamily="49" charset="0"/>
+                <a:cs typeface="Consolas" panose="020B0609020204030204" pitchFamily="49" charset="0"/>
+              </a:rPr>
+              <a:t>”: the</a:t>
+            </a:r>
+          </a:p>
+          <a:p>
+            <a:r>
+              <a:rPr lang="en-US" dirty="0">
+                <a:latin typeface="Consolas" panose="020B0609020204030204" pitchFamily="49" charset="0"/>
+                <a:cs typeface="Consolas" panose="020B0609020204030204" pitchFamily="49" charset="0"/>
+              </a:rPr>
+              <a:t>// key SILLY_KEY has a bad value: 1.0.</a:t>
+            </a:r>
+          </a:p>
+          <a:p>
+            <a:r>
+              <a:rPr lang="en-US" dirty="0">
+                <a:latin typeface="Consolas" panose="020B0609020204030204" pitchFamily="49" charset="0"/>
+                <a:cs typeface="Consolas" panose="020B0609020204030204" pitchFamily="49" charset="0"/>
+              </a:rPr>
+              <a:t>//</a:t>
+            </a:r>
+          </a:p>
+          <a:p>
+            <a:r>
+              <a:rPr lang="en-US" dirty="0">
+                <a:latin typeface="Consolas" panose="020B0609020204030204" pitchFamily="49" charset="0"/>
+                <a:cs typeface="Consolas" panose="020B0609020204030204" pitchFamily="49" charset="0"/>
+              </a:rPr>
+              <a:t>// Note the explicit constructor call for class </a:t>
+            </a:r>
+            <a:r>
+              <a:rPr lang="en-US" dirty="0" err="1">
+                <a:latin typeface="Consolas" panose="020B0609020204030204" pitchFamily="49" charset="0"/>
+                <a:cs typeface="Consolas" panose="020B0609020204030204" pitchFamily="49" charset="0"/>
+              </a:rPr>
+              <a:t>FileCoordinates</a:t>
+            </a:r>
+            <a:r>
+              <a:rPr lang="en-US" dirty="0">
+                <a:latin typeface="Consolas" panose="020B0609020204030204" pitchFamily="49" charset="0"/>
+                <a:cs typeface="Consolas" panose="020B0609020204030204" pitchFamily="49" charset="0"/>
+              </a:rPr>
+              <a:t>.</a:t>
+            </a:r>
+          </a:p>
+          <a:p>
+            <a:endParaRPr lang="en-US" dirty="0">
+              <a:latin typeface="Consolas" panose="020B0609020204030204" pitchFamily="49" charset="0"/>
+              <a:cs typeface="Consolas" panose="020B0609020204030204" pitchFamily="49" charset="0"/>
+            </a:endParaRPr>
+          </a:p>
+          <a:p>
+            <a:r>
+              <a:rPr lang="en-US" b="1" dirty="0">
+                <a:latin typeface="Consolas" panose="020B0609020204030204" pitchFamily="49" charset="0"/>
+                <a:cs typeface="Consolas" panose="020B0609020204030204" pitchFamily="49" charset="0"/>
+              </a:rPr>
+              <a:t>throw</a:t>
+            </a:r>
+            <a:r>
+              <a:rPr lang="en-US" dirty="0">
+                <a:latin typeface="Consolas" panose="020B0609020204030204" pitchFamily="49" charset="0"/>
+                <a:cs typeface="Consolas" panose="020B0609020204030204" pitchFamily="49" charset="0"/>
+              </a:rPr>
+              <a:t> </a:t>
+            </a:r>
+            <a:r>
+              <a:rPr lang="en-US" dirty="0" err="1">
+                <a:latin typeface="Consolas" panose="020B0609020204030204" pitchFamily="49" charset="0"/>
+                <a:cs typeface="Consolas" panose="020B0609020204030204" pitchFamily="49" charset="0"/>
+              </a:rPr>
+              <a:t>ConfigError</a:t>
+            </a:r>
+            <a:r>
+              <a:rPr lang="en-US" dirty="0">
+                <a:latin typeface="Consolas" panose="020B0609020204030204" pitchFamily="49" charset="0"/>
+                <a:cs typeface="Consolas" panose="020B0609020204030204" pitchFamily="49" charset="0"/>
+              </a:rPr>
+              <a:t>{ “</a:t>
+            </a:r>
+            <a:r>
+              <a:rPr lang="en-US" dirty="0" err="1">
+                <a:latin typeface="Consolas" panose="020B0609020204030204" pitchFamily="49" charset="0"/>
+                <a:cs typeface="Consolas" panose="020B0609020204030204" pitchFamily="49" charset="0"/>
+              </a:rPr>
+              <a:t>config.txt</a:t>
+            </a:r>
+            <a:r>
+              <a:rPr lang="en-US" dirty="0">
+                <a:latin typeface="Consolas" panose="020B0609020204030204" pitchFamily="49" charset="0"/>
+                <a:cs typeface="Consolas" panose="020B0609020204030204" pitchFamily="49" charset="0"/>
+              </a:rPr>
+              <a:t>”, </a:t>
+            </a:r>
+            <a:r>
+              <a:rPr lang="en-US" dirty="0" err="1">
+                <a:latin typeface="Consolas" panose="020B0609020204030204" pitchFamily="49" charset="0"/>
+                <a:cs typeface="Consolas" panose="020B0609020204030204" pitchFamily="49" charset="0"/>
+              </a:rPr>
+              <a:t>FileCoordinates</a:t>
+            </a:r>
+            <a:r>
+              <a:rPr lang="en-US" dirty="0">
+                <a:latin typeface="Consolas" panose="020B0609020204030204" pitchFamily="49" charset="0"/>
+                <a:cs typeface="Consolas" panose="020B0609020204030204" pitchFamily="49" charset="0"/>
+              </a:rPr>
+              <a:t>(10, 43), “SILLY_KEY”, “1.0” };</a:t>
+            </a:r>
+          </a:p>
+          <a:p>
+            <a:endParaRPr lang="en-US" dirty="0"/>
+          </a:p>
+          <a:p>
+            <a:endParaRPr lang="en-US" dirty="0"/>
+          </a:p>
+        </p:txBody>
+      </p:sp>
+    </p:spTree>
+    <p:extLst>
+      <p:ext uri="{BB962C8B-B14F-4D97-AF65-F5344CB8AC3E}">
+        <p14:creationId xmlns:p14="http://schemas.microsoft.com/office/powerpoint/2010/main" val="2229839289"/>
+      </p:ext>
+    </p:extLst>
+  </p:cSld>
+  <p:clrMapOvr>
+    <a:masterClrMapping/>
+  </p:clrMapOvr>
+</p:sld>
+</file>
+
+<file path=ppt/slides/slide18.xml><?xml version="1.0" encoding="utf-8"?>
+<p:sld xmlns:a="http://schemas.openxmlformats.org/drawingml/2006/main" xmlns:r="http://schemas.openxmlformats.org/officeDocument/2006/relationships" xmlns:p="http://schemas.openxmlformats.org/presentationml/2006/main">
+  <p:cSld>
+    <p:spTree>
+      <p:nvGrpSpPr>
+        <p:cNvPr id="1" name=""/>
+        <p:cNvGrpSpPr/>
+        <p:nvPr/>
+      </p:nvGrpSpPr>
+      <p:grpSpPr>
+        <a:xfrm>
+          <a:off x="0" y="0"/>
+          <a:ext cx="0" cy="0"/>
+          <a:chOff x="0" y="0"/>
+          <a:chExt cx="0" cy="0"/>
+        </a:xfrm>
+      </p:grpSpPr>
+      <p:sp>
+        <p:nvSpPr>
+          <p:cNvPr id="2" name="Title 1">
+            <a:extLst>
+              <a:ext uri="{FF2B5EF4-FFF2-40B4-BE49-F238E27FC236}">
+                <a16:creationId xmlns:a16="http://schemas.microsoft.com/office/drawing/2014/main" id="{E4B55C9D-1E2B-01EF-3A01-F40C40CF9C99}"/>
+              </a:ext>
+            </a:extLst>
+          </p:cNvPr>
+          <p:cNvSpPr>
+            <a:spLocks noGrp="1"/>
+          </p:cNvSpPr>
+          <p:nvPr>
+            <p:ph type="title"/>
+          </p:nvPr>
+        </p:nvSpPr>
+        <p:spPr/>
+        <p:txBody>
+          <a:bodyPr/>
+          <a:lstStyle/>
+          <a:p>
+            <a:r>
+              <a:rPr lang="en-US" dirty="0"/>
+              <a:t>Now, The Handler (In Application Code)</a:t>
+            </a:r>
+          </a:p>
+        </p:txBody>
+      </p:sp>
+      <p:sp>
+        <p:nvSpPr>
+          <p:cNvPr id="3" name="TextBox 2">
+            <a:extLst>
+              <a:ext uri="{FF2B5EF4-FFF2-40B4-BE49-F238E27FC236}">
+                <a16:creationId xmlns:a16="http://schemas.microsoft.com/office/drawing/2014/main" id="{8B448CC8-3B9F-8E38-D7EF-9E784A56FE50}"/>
+              </a:ext>
+            </a:extLst>
+          </p:cNvPr>
+          <p:cNvSpPr txBox="1"/>
+          <p:nvPr/>
+        </p:nvSpPr>
+        <p:spPr>
+          <a:xfrm>
+            <a:off x="838200" y="1690688"/>
+            <a:ext cx="10442282" cy="2862322"/>
+          </a:xfrm>
+          <a:prstGeom prst="rect">
+            <a:avLst/>
+          </a:prstGeom>
+          <a:noFill/>
+        </p:spPr>
+        <p:txBody>
+          <a:bodyPr wrap="none" rtlCol="0">
+            <a:spAutoFit/>
+          </a:bodyPr>
+          <a:lstStyle/>
+          <a:p>
+            <a:r>
+              <a:rPr lang="en-US" b="1" dirty="0">
+                <a:latin typeface="Consolas" panose="020B0609020204030204" pitchFamily="49" charset="0"/>
+                <a:cs typeface="Consolas" panose="020B0609020204030204" pitchFamily="49" charset="0"/>
+              </a:rPr>
+              <a:t>catch</a:t>
+            </a:r>
+            <a:r>
+              <a:rPr lang="en-US" dirty="0">
+                <a:latin typeface="Consolas" panose="020B0609020204030204" pitchFamily="49" charset="0"/>
+                <a:cs typeface="Consolas" panose="020B0609020204030204" pitchFamily="49" charset="0"/>
+              </a:rPr>
+              <a:t>( </a:t>
+            </a:r>
+            <a:r>
+              <a:rPr lang="en-US" b="1" dirty="0">
+                <a:latin typeface="Consolas" panose="020B0609020204030204" pitchFamily="49" charset="0"/>
+                <a:cs typeface="Consolas" panose="020B0609020204030204" pitchFamily="49" charset="0"/>
+              </a:rPr>
+              <a:t>const</a:t>
+            </a:r>
+            <a:r>
+              <a:rPr lang="en-US" dirty="0">
+                <a:latin typeface="Consolas" panose="020B0609020204030204" pitchFamily="49" charset="0"/>
+                <a:cs typeface="Consolas" panose="020B0609020204030204" pitchFamily="49" charset="0"/>
+              </a:rPr>
+              <a:t> </a:t>
+            </a:r>
+            <a:r>
+              <a:rPr lang="en-US" dirty="0" err="1">
+                <a:latin typeface="Consolas" panose="020B0609020204030204" pitchFamily="49" charset="0"/>
+                <a:cs typeface="Consolas" panose="020B0609020204030204" pitchFamily="49" charset="0"/>
+              </a:rPr>
+              <a:t>ConfigError</a:t>
+            </a:r>
+            <a:r>
+              <a:rPr lang="en-US" dirty="0">
+                <a:latin typeface="Consolas" panose="020B0609020204030204" pitchFamily="49" charset="0"/>
+                <a:cs typeface="Consolas" panose="020B0609020204030204" pitchFamily="49" charset="0"/>
+              </a:rPr>
+              <a:t> &amp;ex ) {</a:t>
+            </a:r>
+          </a:p>
+          <a:p>
+            <a:r>
+              <a:rPr lang="en-US" dirty="0">
+                <a:latin typeface="Consolas" panose="020B0609020204030204" pitchFamily="49" charset="0"/>
+                <a:cs typeface="Consolas" panose="020B0609020204030204" pitchFamily="49" charset="0"/>
+              </a:rPr>
+              <a:t>    // Ignore errors in SILLY_KEY</a:t>
+            </a:r>
+          </a:p>
+          <a:p>
+            <a:r>
+              <a:rPr lang="en-US" dirty="0">
+                <a:latin typeface="Consolas" panose="020B0609020204030204" pitchFamily="49" charset="0"/>
+                <a:cs typeface="Consolas" panose="020B0609020204030204" pitchFamily="49" charset="0"/>
+              </a:rPr>
+              <a:t>    </a:t>
+            </a:r>
+            <a:r>
+              <a:rPr lang="en-US" b="1" dirty="0">
+                <a:latin typeface="Consolas" panose="020B0609020204030204" pitchFamily="49" charset="0"/>
+                <a:cs typeface="Consolas" panose="020B0609020204030204" pitchFamily="49" charset="0"/>
+              </a:rPr>
+              <a:t>if</a:t>
+            </a:r>
+            <a:r>
+              <a:rPr lang="en-US" dirty="0">
+                <a:latin typeface="Consolas" panose="020B0609020204030204" pitchFamily="49" charset="0"/>
+                <a:cs typeface="Consolas" panose="020B0609020204030204" pitchFamily="49" charset="0"/>
+              </a:rPr>
+              <a:t>( </a:t>
+            </a:r>
+            <a:r>
+              <a:rPr lang="en-US" dirty="0" err="1">
+                <a:latin typeface="Consolas" panose="020B0609020204030204" pitchFamily="49" charset="0"/>
+                <a:cs typeface="Consolas" panose="020B0609020204030204" pitchFamily="49" charset="0"/>
+              </a:rPr>
+              <a:t>ex.config_key</a:t>
+            </a:r>
+            <a:r>
+              <a:rPr lang="en-US" dirty="0">
+                <a:latin typeface="Consolas" panose="020B0609020204030204" pitchFamily="49" charset="0"/>
+                <a:cs typeface="Consolas" panose="020B0609020204030204" pitchFamily="49" charset="0"/>
+              </a:rPr>
+              <a:t> != “SILLY_KEY” ) {</a:t>
+            </a:r>
+          </a:p>
+          <a:p>
+            <a:r>
+              <a:rPr lang="en-US" dirty="0">
+                <a:latin typeface="Consolas" panose="020B0609020204030204" pitchFamily="49" charset="0"/>
+                <a:cs typeface="Consolas" panose="020B0609020204030204" pitchFamily="49" charset="0"/>
+              </a:rPr>
+              <a:t>        </a:t>
+            </a:r>
+            <a:r>
+              <a:rPr lang="en-US" dirty="0" err="1">
+                <a:latin typeface="Consolas" panose="020B0609020204030204" pitchFamily="49" charset="0"/>
+                <a:cs typeface="Consolas" panose="020B0609020204030204" pitchFamily="49" charset="0"/>
+              </a:rPr>
+              <a:t>ostringstream</a:t>
+            </a:r>
+            <a:r>
+              <a:rPr lang="en-US" dirty="0">
+                <a:latin typeface="Consolas" panose="020B0609020204030204" pitchFamily="49" charset="0"/>
+                <a:cs typeface="Consolas" panose="020B0609020204030204" pitchFamily="49" charset="0"/>
+              </a:rPr>
+              <a:t> formatter;</a:t>
+            </a:r>
+          </a:p>
+          <a:p>
+            <a:r>
+              <a:rPr lang="en-US" dirty="0">
+                <a:latin typeface="Consolas" panose="020B0609020204030204" pitchFamily="49" charset="0"/>
+                <a:cs typeface="Consolas" panose="020B0609020204030204" pitchFamily="49" charset="0"/>
+              </a:rPr>
+              <a:t>        formatter &lt;&lt; “FILE: ” &lt;&lt; </a:t>
+            </a:r>
+            <a:r>
+              <a:rPr lang="en-US" dirty="0" err="1">
+                <a:latin typeface="Consolas" panose="020B0609020204030204" pitchFamily="49" charset="0"/>
+                <a:cs typeface="Consolas" panose="020B0609020204030204" pitchFamily="49" charset="0"/>
+              </a:rPr>
+              <a:t>ex.file_name</a:t>
+            </a:r>
+            <a:endParaRPr lang="en-US" dirty="0">
+              <a:latin typeface="Consolas" panose="020B0609020204030204" pitchFamily="49" charset="0"/>
+              <a:cs typeface="Consolas" panose="020B0609020204030204" pitchFamily="49" charset="0"/>
+            </a:endParaRPr>
+          </a:p>
+          <a:p>
+            <a:r>
+              <a:rPr lang="en-US" dirty="0">
+                <a:latin typeface="Consolas" panose="020B0609020204030204" pitchFamily="49" charset="0"/>
+                <a:cs typeface="Consolas" panose="020B0609020204030204" pitchFamily="49" charset="0"/>
+              </a:rPr>
+              <a:t>        formatter &lt;&lt; “, LINE: ” &lt;&lt; </a:t>
+            </a:r>
+            <a:r>
+              <a:rPr lang="en-US" dirty="0" err="1">
+                <a:latin typeface="Consolas" panose="020B0609020204030204" pitchFamily="49" charset="0"/>
+                <a:cs typeface="Consolas" panose="020B0609020204030204" pitchFamily="49" charset="0"/>
+              </a:rPr>
+              <a:t>ex.file_coordinates.line</a:t>
+            </a:r>
+            <a:endParaRPr lang="en-US" dirty="0">
+              <a:latin typeface="Consolas" panose="020B0609020204030204" pitchFamily="49" charset="0"/>
+              <a:cs typeface="Consolas" panose="020B0609020204030204" pitchFamily="49" charset="0"/>
+            </a:endParaRPr>
+          </a:p>
+          <a:p>
+            <a:r>
+              <a:rPr lang="en-US" dirty="0">
+                <a:latin typeface="Consolas" panose="020B0609020204030204" pitchFamily="49" charset="0"/>
+                <a:cs typeface="Consolas" panose="020B0609020204030204" pitchFamily="49" charset="0"/>
+              </a:rPr>
+              <a:t>        formatter &lt;&lt; “, COLUMN: ” &lt;&lt; </a:t>
+            </a:r>
+            <a:r>
+              <a:rPr lang="en-US" dirty="0" err="1">
+                <a:latin typeface="Consolas" panose="020B0609020204030204" pitchFamily="49" charset="0"/>
+                <a:cs typeface="Consolas" panose="020B0609020204030204" pitchFamily="49" charset="0"/>
+              </a:rPr>
+              <a:t>ex.file_coordinates.column</a:t>
+            </a:r>
+            <a:endParaRPr lang="en-US" dirty="0">
+              <a:latin typeface="Consolas" panose="020B0609020204030204" pitchFamily="49" charset="0"/>
+              <a:cs typeface="Consolas" panose="020B0609020204030204" pitchFamily="49" charset="0"/>
+            </a:endParaRPr>
+          </a:p>
+          <a:p>
+            <a:r>
+              <a:rPr lang="en-US" dirty="0">
+                <a:latin typeface="Consolas" panose="020B0609020204030204" pitchFamily="49" charset="0"/>
+                <a:cs typeface="Consolas" panose="020B0609020204030204" pitchFamily="49" charset="0"/>
+              </a:rPr>
+              <a:t>        </a:t>
+            </a:r>
+            <a:r>
+              <a:rPr lang="en-US" dirty="0" err="1">
+                <a:latin typeface="Consolas" panose="020B0609020204030204" pitchFamily="49" charset="0"/>
+                <a:cs typeface="Consolas" panose="020B0609020204030204" pitchFamily="49" charset="0"/>
+              </a:rPr>
+              <a:t>DialogBox</a:t>
+            </a:r>
+            <a:r>
+              <a:rPr lang="en-US" dirty="0">
+                <a:latin typeface="Consolas" panose="020B0609020204030204" pitchFamily="49" charset="0"/>
+                <a:cs typeface="Consolas" panose="020B0609020204030204" pitchFamily="49" charset="0"/>
+              </a:rPr>
+              <a:t>( </a:t>
+            </a:r>
+            <a:r>
+              <a:rPr lang="en-US" dirty="0" err="1">
+                <a:latin typeface="Consolas" panose="020B0609020204030204" pitchFamily="49" charset="0"/>
+                <a:cs typeface="Consolas" panose="020B0609020204030204" pitchFamily="49" charset="0"/>
+              </a:rPr>
+              <a:t>window_handle</a:t>
+            </a:r>
+            <a:r>
+              <a:rPr lang="en-US" dirty="0">
+                <a:latin typeface="Consolas" panose="020B0609020204030204" pitchFamily="49" charset="0"/>
+                <a:cs typeface="Consolas" panose="020B0609020204030204" pitchFamily="49" charset="0"/>
+              </a:rPr>
+              <a:t>, </a:t>
+            </a:r>
+            <a:r>
+              <a:rPr lang="en-US" dirty="0" err="1">
+                <a:latin typeface="Consolas" panose="020B0609020204030204" pitchFamily="49" charset="0"/>
+                <a:cs typeface="Consolas" panose="020B0609020204030204" pitchFamily="49" charset="0"/>
+              </a:rPr>
+              <a:t>formatter.str</a:t>
+            </a:r>
+            <a:r>
+              <a:rPr lang="en-US" dirty="0">
+                <a:latin typeface="Consolas" panose="020B0609020204030204" pitchFamily="49" charset="0"/>
+                <a:cs typeface="Consolas" panose="020B0609020204030204" pitchFamily="49" charset="0"/>
+              </a:rPr>
+              <a:t>( ).</a:t>
+            </a:r>
+            <a:r>
+              <a:rPr lang="en-US" dirty="0" err="1">
+                <a:latin typeface="Consolas" panose="020B0609020204030204" pitchFamily="49" charset="0"/>
+                <a:cs typeface="Consolas" panose="020B0609020204030204" pitchFamily="49" charset="0"/>
+              </a:rPr>
+              <a:t>c_str</a:t>
+            </a:r>
+            <a:r>
+              <a:rPr lang="en-US" dirty="0">
+                <a:latin typeface="Consolas" panose="020B0609020204030204" pitchFamily="49" charset="0"/>
+                <a:cs typeface="Consolas" panose="020B0609020204030204" pitchFamily="49" charset="0"/>
+              </a:rPr>
+              <a:t>( ), DLG_ALERT, DLG_OK );</a:t>
+            </a:r>
+          </a:p>
+          <a:p>
+            <a:r>
+              <a:rPr lang="en-US" dirty="0">
+                <a:latin typeface="Consolas" panose="020B0609020204030204" pitchFamily="49" charset="0"/>
+                <a:cs typeface="Consolas" panose="020B0609020204030204" pitchFamily="49" charset="0"/>
+              </a:rPr>
+              <a:t>    }</a:t>
+            </a:r>
+          </a:p>
+          <a:p>
+            <a:r>
+              <a:rPr lang="en-US" dirty="0">
+                <a:latin typeface="Consolas" panose="020B0609020204030204" pitchFamily="49" charset="0"/>
+                <a:cs typeface="Consolas" panose="020B0609020204030204" pitchFamily="49" charset="0"/>
+              </a:rPr>
+              <a:t>}</a:t>
+            </a:r>
+          </a:p>
+        </p:txBody>
+      </p:sp>
+    </p:spTree>
+    <p:extLst>
+      <p:ext uri="{BB962C8B-B14F-4D97-AF65-F5344CB8AC3E}">
+        <p14:creationId xmlns:p14="http://schemas.microsoft.com/office/powerpoint/2010/main" val="472953644"/>
+      </p:ext>
+    </p:extLst>
+  </p:cSld>
+  <p:clrMapOvr>
+    <a:masterClrMapping/>
+  </p:clrMapOvr>
+</p:sld>
+</file>
+
+<file path=ppt/slides/slide19.xml><?xml version="1.0" encoding="utf-8"?>
+<p:sld xmlns:a="http://schemas.openxmlformats.org/drawingml/2006/main" xmlns:r="http://schemas.openxmlformats.org/officeDocument/2006/relationships" xmlns:p="http://schemas.openxmlformats.org/presentationml/2006/main">
+  <p:cSld>
+    <p:spTree>
+      <p:nvGrpSpPr>
+        <p:cNvPr id="1" name=""/>
+        <p:cNvGrpSpPr/>
+        <p:nvPr/>
+      </p:nvGrpSpPr>
+      <p:grpSpPr>
+        <a:xfrm>
+          <a:off x="0" y="0"/>
+          <a:ext cx="0" cy="0"/>
+          <a:chOff x="0" y="0"/>
+          <a:chExt cx="0" cy="0"/>
+        </a:xfrm>
+      </p:grpSpPr>
+      <p:sp>
+        <p:nvSpPr>
+          <p:cNvPr id="2" name="Title 1">
+            <a:extLst>
+              <a:ext uri="{FF2B5EF4-FFF2-40B4-BE49-F238E27FC236}">
+                <a16:creationId xmlns:a16="http://schemas.microsoft.com/office/drawing/2014/main" id="{0F99F048-2E9E-7482-0BA5-CABC888258AC}"/>
+              </a:ext>
+            </a:extLst>
+          </p:cNvPr>
+          <p:cNvSpPr>
+            <a:spLocks noGrp="1"/>
+          </p:cNvSpPr>
+          <p:nvPr>
+            <p:ph type="title"/>
+          </p:nvPr>
+        </p:nvSpPr>
+        <p:spPr/>
+        <p:txBody>
+          <a:bodyPr/>
+          <a:lstStyle/>
+          <a:p>
+            <a:r>
+              <a:rPr lang="en-US" dirty="0"/>
+              <a:t>Exceptions and Inheritance</a:t>
+            </a:r>
+          </a:p>
+        </p:txBody>
+      </p:sp>
+      <p:sp>
+        <p:nvSpPr>
+          <p:cNvPr id="3" name="TextBox 2">
+            <a:extLst>
+              <a:ext uri="{FF2B5EF4-FFF2-40B4-BE49-F238E27FC236}">
+                <a16:creationId xmlns:a16="http://schemas.microsoft.com/office/drawing/2014/main" id="{2A751E78-633B-EE71-BC74-60DD04268773}"/>
+              </a:ext>
+            </a:extLst>
+          </p:cNvPr>
+          <p:cNvSpPr txBox="1"/>
+          <p:nvPr/>
+        </p:nvSpPr>
+        <p:spPr>
+          <a:xfrm>
+            <a:off x="881743" y="2046514"/>
+            <a:ext cx="10189008" cy="2862322"/>
+          </a:xfrm>
+          <a:prstGeom prst="rect">
+            <a:avLst/>
+          </a:prstGeom>
+          <a:noFill/>
+        </p:spPr>
+        <p:txBody>
+          <a:bodyPr wrap="none" rtlCol="0">
+            <a:spAutoFit/>
+          </a:bodyPr>
+          <a:lstStyle/>
+          <a:p>
+            <a:r>
+              <a:rPr lang="en-US" dirty="0">
+                <a:latin typeface="Consolas" panose="020B0609020204030204" pitchFamily="49" charset="0"/>
+                <a:cs typeface="Consolas" panose="020B0609020204030204" pitchFamily="49" charset="0"/>
+              </a:rPr>
+              <a:t>// First, we define an inheritance hierarchy</a:t>
+            </a:r>
+          </a:p>
+          <a:p>
+            <a:endParaRPr lang="en-US" dirty="0">
+              <a:latin typeface="Consolas" panose="020B0609020204030204" pitchFamily="49" charset="0"/>
+              <a:cs typeface="Consolas" panose="020B0609020204030204" pitchFamily="49" charset="0"/>
+            </a:endParaRPr>
+          </a:p>
+          <a:p>
+            <a:r>
+              <a:rPr lang="en-US" dirty="0">
+                <a:latin typeface="Consolas" panose="020B0609020204030204" pitchFamily="49" charset="0"/>
+                <a:cs typeface="Consolas" panose="020B0609020204030204" pitchFamily="49" charset="0"/>
+              </a:rPr>
+              <a:t>// For brevity, I elide the contents of these classes.</a:t>
+            </a:r>
+          </a:p>
+          <a:p>
+            <a:r>
+              <a:rPr lang="en-US" dirty="0">
+                <a:latin typeface="Consolas" panose="020B0609020204030204" pitchFamily="49" charset="0"/>
+                <a:cs typeface="Consolas" panose="020B0609020204030204" pitchFamily="49" charset="0"/>
+              </a:rPr>
+              <a:t>// In a real application they would have interesting constructors and internals</a:t>
+            </a:r>
+          </a:p>
+          <a:p>
+            <a:endParaRPr lang="en-US" dirty="0">
+              <a:latin typeface="Consolas" panose="020B0609020204030204" pitchFamily="49" charset="0"/>
+              <a:cs typeface="Consolas" panose="020B0609020204030204" pitchFamily="49" charset="0"/>
+            </a:endParaRPr>
+          </a:p>
+          <a:p>
+            <a:r>
+              <a:rPr lang="en-US" b="1" dirty="0">
+                <a:latin typeface="Consolas" panose="020B0609020204030204" pitchFamily="49" charset="0"/>
+                <a:cs typeface="Consolas" panose="020B0609020204030204" pitchFamily="49" charset="0"/>
+              </a:rPr>
+              <a:t>class</a:t>
+            </a:r>
+            <a:r>
+              <a:rPr lang="en-US" dirty="0">
+                <a:latin typeface="Consolas" panose="020B0609020204030204" pitchFamily="49" charset="0"/>
+                <a:cs typeface="Consolas" panose="020B0609020204030204" pitchFamily="49" charset="0"/>
+              </a:rPr>
+              <a:t> Animal { … }</a:t>
+            </a:r>
+          </a:p>
+          <a:p>
+            <a:r>
+              <a:rPr lang="en-US" b="1" dirty="0">
+                <a:latin typeface="Consolas" panose="020B0609020204030204" pitchFamily="49" charset="0"/>
+                <a:cs typeface="Consolas" panose="020B0609020204030204" pitchFamily="49" charset="0"/>
+              </a:rPr>
+              <a:t>class</a:t>
+            </a:r>
+            <a:r>
+              <a:rPr lang="en-US" dirty="0">
+                <a:latin typeface="Consolas" panose="020B0609020204030204" pitchFamily="49" charset="0"/>
+                <a:cs typeface="Consolas" panose="020B0609020204030204" pitchFamily="49" charset="0"/>
+              </a:rPr>
+              <a:t> Reptile : </a:t>
+            </a:r>
+            <a:r>
+              <a:rPr lang="en-US" b="1" dirty="0">
+                <a:latin typeface="Consolas" panose="020B0609020204030204" pitchFamily="49" charset="0"/>
+                <a:cs typeface="Consolas" panose="020B0609020204030204" pitchFamily="49" charset="0"/>
+              </a:rPr>
+              <a:t>public</a:t>
+            </a:r>
+            <a:r>
+              <a:rPr lang="en-US" dirty="0">
+                <a:latin typeface="Consolas" panose="020B0609020204030204" pitchFamily="49" charset="0"/>
+                <a:cs typeface="Consolas" panose="020B0609020204030204" pitchFamily="49" charset="0"/>
+              </a:rPr>
+              <a:t> Animal { … }</a:t>
+            </a:r>
+          </a:p>
+          <a:p>
+            <a:r>
+              <a:rPr lang="en-US" b="1" dirty="0">
+                <a:latin typeface="Consolas" panose="020B0609020204030204" pitchFamily="49" charset="0"/>
+                <a:cs typeface="Consolas" panose="020B0609020204030204" pitchFamily="49" charset="0"/>
+              </a:rPr>
+              <a:t>class</a:t>
+            </a:r>
+            <a:r>
+              <a:rPr lang="en-US" dirty="0">
+                <a:latin typeface="Consolas" panose="020B0609020204030204" pitchFamily="49" charset="0"/>
+                <a:cs typeface="Consolas" panose="020B0609020204030204" pitchFamily="49" charset="0"/>
+              </a:rPr>
+              <a:t> Mammal : </a:t>
+            </a:r>
+            <a:r>
+              <a:rPr lang="en-US" b="1" dirty="0">
+                <a:latin typeface="Consolas" panose="020B0609020204030204" pitchFamily="49" charset="0"/>
+                <a:cs typeface="Consolas" panose="020B0609020204030204" pitchFamily="49" charset="0"/>
+              </a:rPr>
+              <a:t>public</a:t>
+            </a:r>
+            <a:r>
+              <a:rPr lang="en-US" dirty="0">
+                <a:latin typeface="Consolas" panose="020B0609020204030204" pitchFamily="49" charset="0"/>
+                <a:cs typeface="Consolas" panose="020B0609020204030204" pitchFamily="49" charset="0"/>
+              </a:rPr>
+              <a:t> Animal { … }</a:t>
+            </a:r>
+          </a:p>
+          <a:p>
+            <a:r>
+              <a:rPr lang="en-US" b="1" dirty="0">
+                <a:latin typeface="Consolas" panose="020B0609020204030204" pitchFamily="49" charset="0"/>
+                <a:cs typeface="Consolas" panose="020B0609020204030204" pitchFamily="49" charset="0"/>
+              </a:rPr>
+              <a:t>class</a:t>
+            </a:r>
+            <a:r>
+              <a:rPr lang="en-US" dirty="0">
+                <a:latin typeface="Consolas" panose="020B0609020204030204" pitchFamily="49" charset="0"/>
+                <a:cs typeface="Consolas" panose="020B0609020204030204" pitchFamily="49" charset="0"/>
+              </a:rPr>
+              <a:t> Cat : </a:t>
+            </a:r>
+            <a:r>
+              <a:rPr lang="en-US" b="1" dirty="0">
+                <a:latin typeface="Consolas" panose="020B0609020204030204" pitchFamily="49" charset="0"/>
+                <a:cs typeface="Consolas" panose="020B0609020204030204" pitchFamily="49" charset="0"/>
+              </a:rPr>
+              <a:t>public</a:t>
+            </a:r>
+            <a:r>
+              <a:rPr lang="en-US" dirty="0">
+                <a:latin typeface="Consolas" panose="020B0609020204030204" pitchFamily="49" charset="0"/>
+                <a:cs typeface="Consolas" panose="020B0609020204030204" pitchFamily="49" charset="0"/>
+              </a:rPr>
+              <a:t> Mammal { … }</a:t>
+            </a:r>
+          </a:p>
+          <a:p>
+            <a:r>
+              <a:rPr lang="en-US" b="1" dirty="0">
+                <a:latin typeface="Consolas" panose="020B0609020204030204" pitchFamily="49" charset="0"/>
+                <a:cs typeface="Consolas" panose="020B0609020204030204" pitchFamily="49" charset="0"/>
+              </a:rPr>
+              <a:t>class</a:t>
+            </a:r>
+            <a:r>
+              <a:rPr lang="en-US" dirty="0">
+                <a:latin typeface="Consolas" panose="020B0609020204030204" pitchFamily="49" charset="0"/>
+                <a:cs typeface="Consolas" panose="020B0609020204030204" pitchFamily="49" charset="0"/>
+              </a:rPr>
+              <a:t> Dog : </a:t>
+            </a:r>
+            <a:r>
+              <a:rPr lang="en-US" b="1" dirty="0">
+                <a:latin typeface="Consolas" panose="020B0609020204030204" pitchFamily="49" charset="0"/>
+                <a:cs typeface="Consolas" panose="020B0609020204030204" pitchFamily="49" charset="0"/>
+              </a:rPr>
+              <a:t>public</a:t>
+            </a:r>
+            <a:r>
+              <a:rPr lang="en-US" dirty="0">
+                <a:latin typeface="Consolas" panose="020B0609020204030204" pitchFamily="49" charset="0"/>
+                <a:cs typeface="Consolas" panose="020B0609020204030204" pitchFamily="49" charset="0"/>
+              </a:rPr>
+              <a:t> Mammal { … }</a:t>
+            </a:r>
+          </a:p>
+        </p:txBody>
+      </p:sp>
+    </p:spTree>
+    <p:extLst>
+      <p:ext uri="{BB962C8B-B14F-4D97-AF65-F5344CB8AC3E}">
+        <p14:creationId xmlns:p14="http://schemas.microsoft.com/office/powerpoint/2010/main" val="707781470"/>
       </p:ext>
     </p:extLst>
   </p:cSld>
@@ -4007,6 +5937,1351 @@
     <p:extLst>
       <p:ext uri="{BB962C8B-B14F-4D97-AF65-F5344CB8AC3E}">
         <p14:creationId xmlns:p14="http://schemas.microsoft.com/office/powerpoint/2010/main" val="3327051055"/>
+      </p:ext>
+    </p:extLst>
+  </p:cSld>
+  <p:clrMapOvr>
+    <a:masterClrMapping/>
+  </p:clrMapOvr>
+</p:sld>
+</file>
+
+<file path=ppt/slides/slide20.xml><?xml version="1.0" encoding="utf-8"?>
+<p:sld xmlns:a="http://schemas.openxmlformats.org/drawingml/2006/main" xmlns:r="http://schemas.openxmlformats.org/officeDocument/2006/relationships" xmlns:p="http://schemas.openxmlformats.org/presentationml/2006/main">
+  <p:cSld>
+    <p:spTree>
+      <p:nvGrpSpPr>
+        <p:cNvPr id="1" name=""/>
+        <p:cNvGrpSpPr/>
+        <p:nvPr/>
+      </p:nvGrpSpPr>
+      <p:grpSpPr>
+        <a:xfrm>
+          <a:off x="0" y="0"/>
+          <a:ext cx="0" cy="0"/>
+          <a:chOff x="0" y="0"/>
+          <a:chExt cx="0" cy="0"/>
+        </a:xfrm>
+      </p:grpSpPr>
+      <p:sp>
+        <p:nvSpPr>
+          <p:cNvPr id="2" name="Title 1">
+            <a:extLst>
+              <a:ext uri="{FF2B5EF4-FFF2-40B4-BE49-F238E27FC236}">
+                <a16:creationId xmlns:a16="http://schemas.microsoft.com/office/drawing/2014/main" id="{3EA3560E-1E3A-F5D7-6577-456C0B9F08AC}"/>
+              </a:ext>
+            </a:extLst>
+          </p:cNvPr>
+          <p:cNvSpPr>
+            <a:spLocks noGrp="1"/>
+          </p:cNvSpPr>
+          <p:nvPr>
+            <p:ph type="title"/>
+          </p:nvPr>
+        </p:nvSpPr>
+        <p:spPr/>
+        <p:txBody>
+          <a:bodyPr/>
+          <a:lstStyle/>
+          <a:p>
+            <a:r>
+              <a:rPr lang="en-US" dirty="0"/>
+              <a:t>Exceptions and Inheritance</a:t>
+            </a:r>
+          </a:p>
+        </p:txBody>
+      </p:sp>
+      <p:sp>
+        <p:nvSpPr>
+          <p:cNvPr id="3" name="TextBox 2">
+            <a:extLst>
+              <a:ext uri="{FF2B5EF4-FFF2-40B4-BE49-F238E27FC236}">
+                <a16:creationId xmlns:a16="http://schemas.microsoft.com/office/drawing/2014/main" id="{A8883BCF-C766-1496-1224-36232850B115}"/>
+              </a:ext>
+            </a:extLst>
+          </p:cNvPr>
+          <p:cNvSpPr txBox="1"/>
+          <p:nvPr/>
+        </p:nvSpPr>
+        <p:spPr>
+          <a:xfrm>
+            <a:off x="838200" y="1690688"/>
+            <a:ext cx="8669361" cy="3970318"/>
+          </a:xfrm>
+          <a:prstGeom prst="rect">
+            <a:avLst/>
+          </a:prstGeom>
+          <a:noFill/>
+        </p:spPr>
+        <p:txBody>
+          <a:bodyPr wrap="none" rtlCol="0">
+            <a:spAutoFit/>
+          </a:bodyPr>
+          <a:lstStyle/>
+          <a:p>
+            <a:r>
+              <a:rPr lang="en-US" dirty="0">
+                <a:latin typeface="Consolas" panose="020B0609020204030204" pitchFamily="49" charset="0"/>
+                <a:cs typeface="Consolas" panose="020B0609020204030204" pitchFamily="49" charset="0"/>
+              </a:rPr>
+              <a:t>// Examples of handlers</a:t>
+            </a:r>
+          </a:p>
+          <a:p>
+            <a:endParaRPr lang="en-US" dirty="0">
+              <a:latin typeface="Consolas" panose="020B0609020204030204" pitchFamily="49" charset="0"/>
+              <a:cs typeface="Consolas" panose="020B0609020204030204" pitchFamily="49" charset="0"/>
+            </a:endParaRPr>
+          </a:p>
+          <a:p>
+            <a:r>
+              <a:rPr lang="en-US" b="1" dirty="0">
+                <a:latin typeface="Consolas" panose="020B0609020204030204" pitchFamily="49" charset="0"/>
+                <a:cs typeface="Consolas" panose="020B0609020204030204" pitchFamily="49" charset="0"/>
+              </a:rPr>
+              <a:t>catch</a:t>
+            </a:r>
+            <a:r>
+              <a:rPr lang="en-US" dirty="0">
+                <a:latin typeface="Consolas" panose="020B0609020204030204" pitchFamily="49" charset="0"/>
+                <a:cs typeface="Consolas" panose="020B0609020204030204" pitchFamily="49" charset="0"/>
+              </a:rPr>
+              <a:t>( </a:t>
+            </a:r>
+            <a:r>
+              <a:rPr lang="en-US" b="1" dirty="0">
+                <a:latin typeface="Consolas" panose="020B0609020204030204" pitchFamily="49" charset="0"/>
+                <a:cs typeface="Consolas" panose="020B0609020204030204" pitchFamily="49" charset="0"/>
+              </a:rPr>
+              <a:t>const</a:t>
+            </a:r>
+            <a:r>
+              <a:rPr lang="en-US" dirty="0">
+                <a:latin typeface="Consolas" panose="020B0609020204030204" pitchFamily="49" charset="0"/>
+                <a:cs typeface="Consolas" panose="020B0609020204030204" pitchFamily="49" charset="0"/>
+              </a:rPr>
+              <a:t> Cat &amp;ex ) {</a:t>
+            </a:r>
+          </a:p>
+          <a:p>
+            <a:r>
+              <a:rPr lang="en-US" dirty="0">
+                <a:latin typeface="Consolas" panose="020B0609020204030204" pitchFamily="49" charset="0"/>
+                <a:cs typeface="Consolas" panose="020B0609020204030204" pitchFamily="49" charset="0"/>
+              </a:rPr>
+              <a:t>    // Handle thrown cats</a:t>
+            </a:r>
+          </a:p>
+          <a:p>
+            <a:r>
+              <a:rPr lang="en-US" dirty="0">
+                <a:latin typeface="Consolas" panose="020B0609020204030204" pitchFamily="49" charset="0"/>
+                <a:cs typeface="Consolas" panose="020B0609020204030204" pitchFamily="49" charset="0"/>
+              </a:rPr>
+              <a:t>}</a:t>
+            </a:r>
+          </a:p>
+          <a:p>
+            <a:r>
+              <a:rPr lang="en-US" b="1" dirty="0">
+                <a:latin typeface="Consolas" panose="020B0609020204030204" pitchFamily="49" charset="0"/>
+                <a:cs typeface="Consolas" panose="020B0609020204030204" pitchFamily="49" charset="0"/>
+              </a:rPr>
+              <a:t>catch</a:t>
+            </a:r>
+            <a:r>
+              <a:rPr lang="en-US" dirty="0">
+                <a:latin typeface="Consolas" panose="020B0609020204030204" pitchFamily="49" charset="0"/>
+                <a:cs typeface="Consolas" panose="020B0609020204030204" pitchFamily="49" charset="0"/>
+              </a:rPr>
+              <a:t>( </a:t>
+            </a:r>
+            <a:r>
+              <a:rPr lang="en-US" b="1" dirty="0">
+                <a:latin typeface="Consolas" panose="020B0609020204030204" pitchFamily="49" charset="0"/>
+                <a:cs typeface="Consolas" panose="020B0609020204030204" pitchFamily="49" charset="0"/>
+              </a:rPr>
+              <a:t>const</a:t>
+            </a:r>
+            <a:r>
+              <a:rPr lang="en-US" dirty="0">
+                <a:latin typeface="Consolas" panose="020B0609020204030204" pitchFamily="49" charset="0"/>
+                <a:cs typeface="Consolas" panose="020B0609020204030204" pitchFamily="49" charset="0"/>
+              </a:rPr>
+              <a:t> Reptile &amp;ex ) {</a:t>
+            </a:r>
+          </a:p>
+          <a:p>
+            <a:r>
+              <a:rPr lang="en-US" dirty="0">
+                <a:latin typeface="Consolas" panose="020B0609020204030204" pitchFamily="49" charset="0"/>
+                <a:cs typeface="Consolas" panose="020B0609020204030204" pitchFamily="49" charset="0"/>
+              </a:rPr>
+              <a:t>    // Handle thrown reptiles of any kind</a:t>
+            </a:r>
+          </a:p>
+          <a:p>
+            <a:r>
+              <a:rPr lang="en-US" dirty="0">
+                <a:latin typeface="Consolas" panose="020B0609020204030204" pitchFamily="49" charset="0"/>
+                <a:cs typeface="Consolas" panose="020B0609020204030204" pitchFamily="49" charset="0"/>
+              </a:rPr>
+              <a:t>    // Meaning all classes derived from Reptile</a:t>
+            </a:r>
+          </a:p>
+          <a:p>
+            <a:r>
+              <a:rPr lang="en-US" dirty="0">
+                <a:latin typeface="Consolas" panose="020B0609020204030204" pitchFamily="49" charset="0"/>
+                <a:cs typeface="Consolas" panose="020B0609020204030204" pitchFamily="49" charset="0"/>
+              </a:rPr>
+              <a:t>    // Calling virtual methods on ex will dispatch in the usual way</a:t>
+            </a:r>
+          </a:p>
+          <a:p>
+            <a:r>
+              <a:rPr lang="en-US" dirty="0">
+                <a:latin typeface="Consolas" panose="020B0609020204030204" pitchFamily="49" charset="0"/>
+                <a:cs typeface="Consolas" panose="020B0609020204030204" pitchFamily="49" charset="0"/>
+              </a:rPr>
+              <a:t>}</a:t>
+            </a:r>
+          </a:p>
+          <a:p>
+            <a:r>
+              <a:rPr lang="en-US" b="1" dirty="0">
+                <a:latin typeface="Consolas" panose="020B0609020204030204" pitchFamily="49" charset="0"/>
+                <a:cs typeface="Consolas" panose="020B0609020204030204" pitchFamily="49" charset="0"/>
+              </a:rPr>
+              <a:t>catch</a:t>
+            </a:r>
+            <a:r>
+              <a:rPr lang="en-US" dirty="0">
+                <a:latin typeface="Consolas" panose="020B0609020204030204" pitchFamily="49" charset="0"/>
+                <a:cs typeface="Consolas" panose="020B0609020204030204" pitchFamily="49" charset="0"/>
+              </a:rPr>
+              <a:t>( </a:t>
+            </a:r>
+            <a:r>
+              <a:rPr lang="en-US" b="1" dirty="0">
+                <a:latin typeface="Consolas" panose="020B0609020204030204" pitchFamily="49" charset="0"/>
+                <a:cs typeface="Consolas" panose="020B0609020204030204" pitchFamily="49" charset="0"/>
+              </a:rPr>
+              <a:t>const</a:t>
+            </a:r>
+            <a:r>
+              <a:rPr lang="en-US" dirty="0">
+                <a:latin typeface="Consolas" panose="020B0609020204030204" pitchFamily="49" charset="0"/>
+                <a:cs typeface="Consolas" panose="020B0609020204030204" pitchFamily="49" charset="0"/>
+              </a:rPr>
+              <a:t> Animal &amp;ex ) {</a:t>
+            </a:r>
+          </a:p>
+          <a:p>
+            <a:r>
+              <a:rPr lang="en-US" dirty="0">
+                <a:latin typeface="Consolas" panose="020B0609020204030204" pitchFamily="49" charset="0"/>
+                <a:cs typeface="Consolas" panose="020B0609020204030204" pitchFamily="49" charset="0"/>
+              </a:rPr>
+              <a:t>    // Handle all remaining animals</a:t>
+            </a:r>
+          </a:p>
+          <a:p>
+            <a:r>
+              <a:rPr lang="en-US" dirty="0">
+                <a:latin typeface="Consolas" panose="020B0609020204030204" pitchFamily="49" charset="0"/>
+                <a:cs typeface="Consolas" panose="020B0609020204030204" pitchFamily="49" charset="0"/>
+              </a:rPr>
+              <a:t>    </a:t>
+            </a:r>
+            <a:r>
+              <a:rPr lang="en-US" dirty="0" err="1">
+                <a:latin typeface="Consolas" panose="020B0609020204030204" pitchFamily="49" charset="0"/>
+                <a:cs typeface="Consolas" panose="020B0609020204030204" pitchFamily="49" charset="0"/>
+              </a:rPr>
+              <a:t>ex.make_noise</a:t>
+            </a:r>
+            <a:r>
+              <a:rPr lang="en-US" dirty="0">
+                <a:latin typeface="Consolas" panose="020B0609020204030204" pitchFamily="49" charset="0"/>
+                <a:cs typeface="Consolas" panose="020B0609020204030204" pitchFamily="49" charset="0"/>
+              </a:rPr>
+              <a:t>( );    // Bark? Squeal? Trumpet? Cluck?</a:t>
+            </a:r>
+          </a:p>
+          <a:p>
+            <a:r>
+              <a:rPr lang="en-US" dirty="0">
+                <a:latin typeface="Consolas" panose="020B0609020204030204" pitchFamily="49" charset="0"/>
+                <a:cs typeface="Consolas" panose="020B0609020204030204" pitchFamily="49" charset="0"/>
+              </a:rPr>
+              <a:t>}</a:t>
+            </a:r>
+          </a:p>
+        </p:txBody>
+      </p:sp>
+    </p:spTree>
+    <p:extLst>
+      <p:ext uri="{BB962C8B-B14F-4D97-AF65-F5344CB8AC3E}">
+        <p14:creationId xmlns:p14="http://schemas.microsoft.com/office/powerpoint/2010/main" val="2663068287"/>
+      </p:ext>
+    </p:extLst>
+  </p:cSld>
+  <p:clrMapOvr>
+    <a:masterClrMapping/>
+  </p:clrMapOvr>
+</p:sld>
+</file>
+
+<file path=ppt/slides/slide21.xml><?xml version="1.0" encoding="utf-8"?>
+<p:sld xmlns:a="http://schemas.openxmlformats.org/drawingml/2006/main" xmlns:r="http://schemas.openxmlformats.org/officeDocument/2006/relationships" xmlns:p="http://schemas.openxmlformats.org/presentationml/2006/main">
+  <p:cSld>
+    <p:spTree>
+      <p:nvGrpSpPr>
+        <p:cNvPr id="1" name=""/>
+        <p:cNvGrpSpPr/>
+        <p:nvPr/>
+      </p:nvGrpSpPr>
+      <p:grpSpPr>
+        <a:xfrm>
+          <a:off x="0" y="0"/>
+          <a:ext cx="0" cy="0"/>
+          <a:chOff x="0" y="0"/>
+          <a:chExt cx="0" cy="0"/>
+        </a:xfrm>
+      </p:grpSpPr>
+      <p:sp>
+        <p:nvSpPr>
+          <p:cNvPr id="2" name="Title 1">
+            <a:extLst>
+              <a:ext uri="{FF2B5EF4-FFF2-40B4-BE49-F238E27FC236}">
+                <a16:creationId xmlns:a16="http://schemas.microsoft.com/office/drawing/2014/main" id="{0F99F048-2E9E-7482-0BA5-CABC888258AC}"/>
+              </a:ext>
+            </a:extLst>
+          </p:cNvPr>
+          <p:cNvSpPr>
+            <a:spLocks noGrp="1"/>
+          </p:cNvSpPr>
+          <p:nvPr>
+            <p:ph type="title"/>
+          </p:nvPr>
+        </p:nvSpPr>
+        <p:spPr/>
+        <p:txBody>
+          <a:bodyPr/>
+          <a:lstStyle/>
+          <a:p>
+            <a:r>
+              <a:rPr lang="en-US" dirty="0"/>
+              <a:t>Exceptions and Inheritance</a:t>
+            </a:r>
+          </a:p>
+        </p:txBody>
+      </p:sp>
+      <p:sp>
+        <p:nvSpPr>
+          <p:cNvPr id="3" name="TextBox 2">
+            <a:extLst>
+              <a:ext uri="{FF2B5EF4-FFF2-40B4-BE49-F238E27FC236}">
+                <a16:creationId xmlns:a16="http://schemas.microsoft.com/office/drawing/2014/main" id="{2A751E78-633B-EE71-BC74-60DD04268773}"/>
+              </a:ext>
+            </a:extLst>
+          </p:cNvPr>
+          <p:cNvSpPr txBox="1"/>
+          <p:nvPr/>
+        </p:nvSpPr>
+        <p:spPr>
+          <a:xfrm>
+            <a:off x="881743" y="2046514"/>
+            <a:ext cx="6516528" cy="2308324"/>
+          </a:xfrm>
+          <a:prstGeom prst="rect">
+            <a:avLst/>
+          </a:prstGeom>
+          <a:noFill/>
+        </p:spPr>
+        <p:txBody>
+          <a:bodyPr wrap="none" rtlCol="0">
+            <a:spAutoFit/>
+          </a:bodyPr>
+          <a:lstStyle/>
+          <a:p>
+            <a:r>
+              <a:rPr lang="en-US" dirty="0">
+                <a:latin typeface="Consolas" panose="020B0609020204030204" pitchFamily="49" charset="0"/>
+                <a:cs typeface="Consolas" panose="020B0609020204030204" pitchFamily="49" charset="0"/>
+              </a:rPr>
+              <a:t>// A more compelling example</a:t>
+            </a:r>
+          </a:p>
+          <a:p>
+            <a:endParaRPr lang="en-US" dirty="0">
+              <a:latin typeface="Consolas" panose="020B0609020204030204" pitchFamily="49" charset="0"/>
+              <a:cs typeface="Consolas" panose="020B0609020204030204" pitchFamily="49" charset="0"/>
+            </a:endParaRPr>
+          </a:p>
+          <a:p>
+            <a:r>
+              <a:rPr lang="en-US" b="1" dirty="0">
+                <a:latin typeface="Consolas" panose="020B0609020204030204" pitchFamily="49" charset="0"/>
+                <a:cs typeface="Consolas" panose="020B0609020204030204" pitchFamily="49" charset="0"/>
+              </a:rPr>
+              <a:t>class</a:t>
+            </a:r>
+            <a:r>
+              <a:rPr lang="en-US" dirty="0">
+                <a:latin typeface="Consolas" panose="020B0609020204030204" pitchFamily="49" charset="0"/>
+                <a:cs typeface="Consolas" panose="020B0609020204030204" pitchFamily="49" charset="0"/>
+              </a:rPr>
+              <a:t> </a:t>
+            </a:r>
+            <a:r>
+              <a:rPr lang="en-US" dirty="0" err="1">
+                <a:latin typeface="Consolas" panose="020B0609020204030204" pitchFamily="49" charset="0"/>
+                <a:cs typeface="Consolas" panose="020B0609020204030204" pitchFamily="49" charset="0"/>
+              </a:rPr>
+              <a:t>NetworkError</a:t>
+            </a:r>
+            <a:r>
+              <a:rPr lang="en-US" dirty="0">
+                <a:latin typeface="Consolas" panose="020B0609020204030204" pitchFamily="49" charset="0"/>
+                <a:cs typeface="Consolas" panose="020B0609020204030204" pitchFamily="49" charset="0"/>
+              </a:rPr>
+              <a:t> { … }</a:t>
+            </a:r>
+          </a:p>
+          <a:p>
+            <a:r>
+              <a:rPr lang="en-US" b="1" dirty="0">
+                <a:latin typeface="Consolas" panose="020B0609020204030204" pitchFamily="49" charset="0"/>
+                <a:cs typeface="Consolas" panose="020B0609020204030204" pitchFamily="49" charset="0"/>
+              </a:rPr>
+              <a:t>class</a:t>
+            </a:r>
+            <a:r>
+              <a:rPr lang="en-US" dirty="0">
+                <a:latin typeface="Consolas" panose="020B0609020204030204" pitchFamily="49" charset="0"/>
+                <a:cs typeface="Consolas" panose="020B0609020204030204" pitchFamily="49" charset="0"/>
+              </a:rPr>
+              <a:t> </a:t>
+            </a:r>
+            <a:r>
+              <a:rPr lang="en-US" dirty="0" err="1">
+                <a:latin typeface="Consolas" panose="020B0609020204030204" pitchFamily="49" charset="0"/>
+                <a:cs typeface="Consolas" panose="020B0609020204030204" pitchFamily="49" charset="0"/>
+              </a:rPr>
+              <a:t>ClientError</a:t>
+            </a:r>
+            <a:r>
+              <a:rPr lang="en-US" dirty="0">
+                <a:latin typeface="Consolas" panose="020B0609020204030204" pitchFamily="49" charset="0"/>
+                <a:cs typeface="Consolas" panose="020B0609020204030204" pitchFamily="49" charset="0"/>
+              </a:rPr>
+              <a:t> : </a:t>
+            </a:r>
+            <a:r>
+              <a:rPr lang="en-US" b="1" dirty="0">
+                <a:latin typeface="Consolas" panose="020B0609020204030204" pitchFamily="49" charset="0"/>
+                <a:cs typeface="Consolas" panose="020B0609020204030204" pitchFamily="49" charset="0"/>
+              </a:rPr>
+              <a:t>public</a:t>
+            </a:r>
+            <a:r>
+              <a:rPr lang="en-US" dirty="0">
+                <a:latin typeface="Consolas" panose="020B0609020204030204" pitchFamily="49" charset="0"/>
+                <a:cs typeface="Consolas" panose="020B0609020204030204" pitchFamily="49" charset="0"/>
+              </a:rPr>
+              <a:t> </a:t>
+            </a:r>
+            <a:r>
+              <a:rPr lang="en-US" dirty="0" err="1">
+                <a:latin typeface="Consolas" panose="020B0609020204030204" pitchFamily="49" charset="0"/>
+                <a:cs typeface="Consolas" panose="020B0609020204030204" pitchFamily="49" charset="0"/>
+              </a:rPr>
+              <a:t>NetworkError</a:t>
+            </a:r>
+            <a:r>
+              <a:rPr lang="en-US" dirty="0">
+                <a:latin typeface="Consolas" panose="020B0609020204030204" pitchFamily="49" charset="0"/>
+                <a:cs typeface="Consolas" panose="020B0609020204030204" pitchFamily="49" charset="0"/>
+              </a:rPr>
+              <a:t> { … }</a:t>
+            </a:r>
+          </a:p>
+          <a:p>
+            <a:r>
+              <a:rPr lang="en-US" b="1" dirty="0">
+                <a:latin typeface="Consolas" panose="020B0609020204030204" pitchFamily="49" charset="0"/>
+                <a:cs typeface="Consolas" panose="020B0609020204030204" pitchFamily="49" charset="0"/>
+              </a:rPr>
+              <a:t>class</a:t>
+            </a:r>
+            <a:r>
+              <a:rPr lang="en-US" dirty="0">
+                <a:latin typeface="Consolas" panose="020B0609020204030204" pitchFamily="49" charset="0"/>
+                <a:cs typeface="Consolas" panose="020B0609020204030204" pitchFamily="49" charset="0"/>
+              </a:rPr>
+              <a:t> </a:t>
+            </a:r>
+            <a:r>
+              <a:rPr lang="en-US" dirty="0" err="1">
+                <a:latin typeface="Consolas" panose="020B0609020204030204" pitchFamily="49" charset="0"/>
+                <a:cs typeface="Consolas" panose="020B0609020204030204" pitchFamily="49" charset="0"/>
+              </a:rPr>
+              <a:t>ServerError</a:t>
+            </a:r>
+            <a:r>
+              <a:rPr lang="en-US" dirty="0">
+                <a:latin typeface="Consolas" panose="020B0609020204030204" pitchFamily="49" charset="0"/>
+                <a:cs typeface="Consolas" panose="020B0609020204030204" pitchFamily="49" charset="0"/>
+              </a:rPr>
+              <a:t> : </a:t>
+            </a:r>
+            <a:r>
+              <a:rPr lang="en-US" b="1" dirty="0">
+                <a:latin typeface="Consolas" panose="020B0609020204030204" pitchFamily="49" charset="0"/>
+                <a:cs typeface="Consolas" panose="020B0609020204030204" pitchFamily="49" charset="0"/>
+              </a:rPr>
+              <a:t>public</a:t>
+            </a:r>
+            <a:r>
+              <a:rPr lang="en-US" dirty="0">
+                <a:latin typeface="Consolas" panose="020B0609020204030204" pitchFamily="49" charset="0"/>
+                <a:cs typeface="Consolas" panose="020B0609020204030204" pitchFamily="49" charset="0"/>
+              </a:rPr>
+              <a:t> </a:t>
+            </a:r>
+            <a:r>
+              <a:rPr lang="en-US" dirty="0" err="1">
+                <a:latin typeface="Consolas" panose="020B0609020204030204" pitchFamily="49" charset="0"/>
+                <a:cs typeface="Consolas" panose="020B0609020204030204" pitchFamily="49" charset="0"/>
+              </a:rPr>
+              <a:t>NetworkError</a:t>
+            </a:r>
+            <a:r>
+              <a:rPr lang="en-US" dirty="0">
+                <a:latin typeface="Consolas" panose="020B0609020204030204" pitchFamily="49" charset="0"/>
+                <a:cs typeface="Consolas" panose="020B0609020204030204" pitchFamily="49" charset="0"/>
+              </a:rPr>
+              <a:t> { … }</a:t>
+            </a:r>
+          </a:p>
+          <a:p>
+            <a:r>
+              <a:rPr lang="en-US" b="1" dirty="0">
+                <a:latin typeface="Consolas" panose="020B0609020204030204" pitchFamily="49" charset="0"/>
+                <a:cs typeface="Consolas" panose="020B0609020204030204" pitchFamily="49" charset="0"/>
+              </a:rPr>
+              <a:t>class</a:t>
+            </a:r>
+            <a:r>
+              <a:rPr lang="en-US" dirty="0">
+                <a:latin typeface="Consolas" panose="020B0609020204030204" pitchFamily="49" charset="0"/>
+                <a:cs typeface="Consolas" panose="020B0609020204030204" pitchFamily="49" charset="0"/>
+              </a:rPr>
+              <a:t> </a:t>
+            </a:r>
+            <a:r>
+              <a:rPr lang="en-US" dirty="0" err="1">
+                <a:latin typeface="Consolas" panose="020B0609020204030204" pitchFamily="49" charset="0"/>
+                <a:cs typeface="Consolas" panose="020B0609020204030204" pitchFamily="49" charset="0"/>
+              </a:rPr>
+              <a:t>AddressError</a:t>
+            </a:r>
+            <a:r>
+              <a:rPr lang="en-US" dirty="0">
+                <a:latin typeface="Consolas" panose="020B0609020204030204" pitchFamily="49" charset="0"/>
+                <a:cs typeface="Consolas" panose="020B0609020204030204" pitchFamily="49" charset="0"/>
+              </a:rPr>
+              <a:t> : </a:t>
+            </a:r>
+            <a:r>
+              <a:rPr lang="en-US" b="1" dirty="0">
+                <a:latin typeface="Consolas" panose="020B0609020204030204" pitchFamily="49" charset="0"/>
+                <a:cs typeface="Consolas" panose="020B0609020204030204" pitchFamily="49" charset="0"/>
+              </a:rPr>
+              <a:t>public</a:t>
+            </a:r>
+            <a:r>
+              <a:rPr lang="en-US" dirty="0">
+                <a:latin typeface="Consolas" panose="020B0609020204030204" pitchFamily="49" charset="0"/>
+                <a:cs typeface="Consolas" panose="020B0609020204030204" pitchFamily="49" charset="0"/>
+              </a:rPr>
+              <a:t> </a:t>
+            </a:r>
+            <a:r>
+              <a:rPr lang="en-US" dirty="0" err="1">
+                <a:latin typeface="Consolas" panose="020B0609020204030204" pitchFamily="49" charset="0"/>
+                <a:cs typeface="Consolas" panose="020B0609020204030204" pitchFamily="49" charset="0"/>
+              </a:rPr>
+              <a:t>NetworkError</a:t>
+            </a:r>
+            <a:r>
+              <a:rPr lang="en-US" dirty="0">
+                <a:latin typeface="Consolas" panose="020B0609020204030204" pitchFamily="49" charset="0"/>
+                <a:cs typeface="Consolas" panose="020B0609020204030204" pitchFamily="49" charset="0"/>
+              </a:rPr>
+              <a:t> { … }</a:t>
+            </a:r>
+          </a:p>
+          <a:p>
+            <a:r>
+              <a:rPr lang="en-US" b="1" dirty="0">
+                <a:latin typeface="Consolas" panose="020B0609020204030204" pitchFamily="49" charset="0"/>
+                <a:cs typeface="Consolas" panose="020B0609020204030204" pitchFamily="49" charset="0"/>
+              </a:rPr>
+              <a:t>class</a:t>
+            </a:r>
+            <a:r>
+              <a:rPr lang="en-US" dirty="0">
+                <a:latin typeface="Consolas" panose="020B0609020204030204" pitchFamily="49" charset="0"/>
+                <a:cs typeface="Consolas" panose="020B0609020204030204" pitchFamily="49" charset="0"/>
+              </a:rPr>
+              <a:t> IPv4AddressError : </a:t>
+            </a:r>
+            <a:r>
+              <a:rPr lang="en-US" b="1" dirty="0">
+                <a:latin typeface="Consolas" panose="020B0609020204030204" pitchFamily="49" charset="0"/>
+                <a:cs typeface="Consolas" panose="020B0609020204030204" pitchFamily="49" charset="0"/>
+              </a:rPr>
+              <a:t>public</a:t>
+            </a:r>
+            <a:r>
+              <a:rPr lang="en-US" dirty="0">
+                <a:latin typeface="Consolas" panose="020B0609020204030204" pitchFamily="49" charset="0"/>
+                <a:cs typeface="Consolas" panose="020B0609020204030204" pitchFamily="49" charset="0"/>
+              </a:rPr>
+              <a:t> </a:t>
+            </a:r>
+            <a:r>
+              <a:rPr lang="en-US" dirty="0" err="1">
+                <a:latin typeface="Consolas" panose="020B0609020204030204" pitchFamily="49" charset="0"/>
+                <a:cs typeface="Consolas" panose="020B0609020204030204" pitchFamily="49" charset="0"/>
+              </a:rPr>
+              <a:t>AddressError</a:t>
+            </a:r>
+            <a:r>
+              <a:rPr lang="en-US" dirty="0">
+                <a:latin typeface="Consolas" panose="020B0609020204030204" pitchFamily="49" charset="0"/>
+                <a:cs typeface="Consolas" panose="020B0609020204030204" pitchFamily="49" charset="0"/>
+              </a:rPr>
+              <a:t> { … }</a:t>
+            </a:r>
+          </a:p>
+          <a:p>
+            <a:r>
+              <a:rPr lang="en-US" b="1" dirty="0">
+                <a:latin typeface="Consolas" panose="020B0609020204030204" pitchFamily="49" charset="0"/>
+                <a:cs typeface="Consolas" panose="020B0609020204030204" pitchFamily="49" charset="0"/>
+              </a:rPr>
+              <a:t>class</a:t>
+            </a:r>
+            <a:r>
+              <a:rPr lang="en-US" dirty="0">
+                <a:latin typeface="Consolas" panose="020B0609020204030204" pitchFamily="49" charset="0"/>
+                <a:cs typeface="Consolas" panose="020B0609020204030204" pitchFamily="49" charset="0"/>
+              </a:rPr>
+              <a:t> IPv6AddressError : </a:t>
+            </a:r>
+            <a:r>
+              <a:rPr lang="en-US" b="1" dirty="0">
+                <a:latin typeface="Consolas" panose="020B0609020204030204" pitchFamily="49" charset="0"/>
+                <a:cs typeface="Consolas" panose="020B0609020204030204" pitchFamily="49" charset="0"/>
+              </a:rPr>
+              <a:t>public</a:t>
+            </a:r>
+            <a:r>
+              <a:rPr lang="en-US" dirty="0">
+                <a:latin typeface="Consolas" panose="020B0609020204030204" pitchFamily="49" charset="0"/>
+                <a:cs typeface="Consolas" panose="020B0609020204030204" pitchFamily="49" charset="0"/>
+              </a:rPr>
+              <a:t> </a:t>
+            </a:r>
+            <a:r>
+              <a:rPr lang="en-US" dirty="0" err="1">
+                <a:latin typeface="Consolas" panose="020B0609020204030204" pitchFamily="49" charset="0"/>
+                <a:cs typeface="Consolas" panose="020B0609020204030204" pitchFamily="49" charset="0"/>
+              </a:rPr>
+              <a:t>AddressError</a:t>
+            </a:r>
+            <a:r>
+              <a:rPr lang="en-US" dirty="0">
+                <a:latin typeface="Consolas" panose="020B0609020204030204" pitchFamily="49" charset="0"/>
+                <a:cs typeface="Consolas" panose="020B0609020204030204" pitchFamily="49" charset="0"/>
+              </a:rPr>
+              <a:t> { … }</a:t>
+            </a:r>
+          </a:p>
+        </p:txBody>
+      </p:sp>
+    </p:spTree>
+    <p:extLst>
+      <p:ext uri="{BB962C8B-B14F-4D97-AF65-F5344CB8AC3E}">
+        <p14:creationId xmlns:p14="http://schemas.microsoft.com/office/powerpoint/2010/main" val="2972021708"/>
+      </p:ext>
+    </p:extLst>
+  </p:cSld>
+  <p:clrMapOvr>
+    <a:masterClrMapping/>
+  </p:clrMapOvr>
+</p:sld>
+</file>
+
+<file path=ppt/slides/slide22.xml><?xml version="1.0" encoding="utf-8"?>
+<p:sld xmlns:a="http://schemas.openxmlformats.org/drawingml/2006/main" xmlns:r="http://schemas.openxmlformats.org/officeDocument/2006/relationships" xmlns:p="http://schemas.openxmlformats.org/presentationml/2006/main">
+  <p:cSld>
+    <p:spTree>
+      <p:nvGrpSpPr>
+        <p:cNvPr id="1" name=""/>
+        <p:cNvGrpSpPr/>
+        <p:nvPr/>
+      </p:nvGrpSpPr>
+      <p:grpSpPr>
+        <a:xfrm>
+          <a:off x="0" y="0"/>
+          <a:ext cx="0" cy="0"/>
+          <a:chOff x="0" y="0"/>
+          <a:chExt cx="0" cy="0"/>
+        </a:xfrm>
+      </p:grpSpPr>
+      <p:sp>
+        <p:nvSpPr>
+          <p:cNvPr id="2" name="Title 1">
+            <a:extLst>
+              <a:ext uri="{FF2B5EF4-FFF2-40B4-BE49-F238E27FC236}">
+                <a16:creationId xmlns:a16="http://schemas.microsoft.com/office/drawing/2014/main" id="{D845BBF7-BF34-C16F-B1D1-EF777477090B}"/>
+              </a:ext>
+            </a:extLst>
+          </p:cNvPr>
+          <p:cNvSpPr>
+            <a:spLocks noGrp="1"/>
+          </p:cNvSpPr>
+          <p:nvPr>
+            <p:ph type="title"/>
+          </p:nvPr>
+        </p:nvSpPr>
+        <p:spPr/>
+        <p:txBody>
+          <a:bodyPr/>
+          <a:lstStyle/>
+          <a:p>
+            <a:r>
+              <a:rPr lang="en-US" dirty="0"/>
+              <a:t>Standard Exceptions</a:t>
+            </a:r>
+          </a:p>
+        </p:txBody>
+      </p:sp>
+      <p:sp>
+        <p:nvSpPr>
+          <p:cNvPr id="3" name="Content Placeholder 2">
+            <a:extLst>
+              <a:ext uri="{FF2B5EF4-FFF2-40B4-BE49-F238E27FC236}">
+                <a16:creationId xmlns:a16="http://schemas.microsoft.com/office/drawing/2014/main" id="{7207CC5F-2D7B-6C42-5AFB-C482CACC8D8E}"/>
+              </a:ext>
+            </a:extLst>
+          </p:cNvPr>
+          <p:cNvSpPr>
+            <a:spLocks noGrp="1"/>
+          </p:cNvSpPr>
+          <p:nvPr>
+            <p:ph idx="1"/>
+          </p:nvPr>
+        </p:nvSpPr>
+        <p:spPr/>
+        <p:txBody>
+          <a:bodyPr/>
+          <a:lstStyle/>
+          <a:p>
+            <a:r>
+              <a:rPr lang="en-US" dirty="0"/>
+              <a:t>The standard library has a hierarchy of exceptions already</a:t>
+            </a:r>
+          </a:p>
+          <a:p>
+            <a:r>
+              <a:rPr lang="en-US" dirty="0"/>
+              <a:t>It is widely used, but optional</a:t>
+            </a:r>
+          </a:p>
+          <a:p>
+            <a:r>
+              <a:rPr lang="en-US" dirty="0"/>
+              <a:t>You can hook into the standard hierarchy by deriving your exception classes from it</a:t>
+            </a:r>
+          </a:p>
+          <a:p>
+            <a:pPr lvl="1"/>
+            <a:r>
+              <a:rPr lang="en-US" dirty="0"/>
+              <a:t>This allows code that catches the standard classes to also catch your exceptions without knowing anything about your exceptions</a:t>
+            </a:r>
+          </a:p>
+        </p:txBody>
+      </p:sp>
+    </p:spTree>
+    <p:extLst>
+      <p:ext uri="{BB962C8B-B14F-4D97-AF65-F5344CB8AC3E}">
+        <p14:creationId xmlns:p14="http://schemas.microsoft.com/office/powerpoint/2010/main" val="3066778762"/>
+      </p:ext>
+    </p:extLst>
+  </p:cSld>
+  <p:clrMapOvr>
+    <a:masterClrMapping/>
+  </p:clrMapOvr>
+</p:sld>
+</file>
+
+<file path=ppt/slides/slide23.xml><?xml version="1.0" encoding="utf-8"?>
+<p:sld xmlns:a="http://schemas.openxmlformats.org/drawingml/2006/main" xmlns:r="http://schemas.openxmlformats.org/officeDocument/2006/relationships" xmlns:p="http://schemas.openxmlformats.org/presentationml/2006/main">
+  <p:cSld>
+    <p:spTree>
+      <p:nvGrpSpPr>
+        <p:cNvPr id="1" name=""/>
+        <p:cNvGrpSpPr/>
+        <p:nvPr/>
+      </p:nvGrpSpPr>
+      <p:grpSpPr>
+        <a:xfrm>
+          <a:off x="0" y="0"/>
+          <a:ext cx="0" cy="0"/>
+          <a:chOff x="0" y="0"/>
+          <a:chExt cx="0" cy="0"/>
+        </a:xfrm>
+      </p:grpSpPr>
+      <p:sp>
+        <p:nvSpPr>
+          <p:cNvPr id="2" name="Title 1">
+            <a:extLst>
+              <a:ext uri="{FF2B5EF4-FFF2-40B4-BE49-F238E27FC236}">
+                <a16:creationId xmlns:a16="http://schemas.microsoft.com/office/drawing/2014/main" id="{437BEE37-F15F-64EB-AB82-0EA7A5CC8A57}"/>
+              </a:ext>
+            </a:extLst>
+          </p:cNvPr>
+          <p:cNvSpPr>
+            <a:spLocks noGrp="1"/>
+          </p:cNvSpPr>
+          <p:nvPr>
+            <p:ph type="title"/>
+          </p:nvPr>
+        </p:nvSpPr>
+        <p:spPr/>
+        <p:txBody>
+          <a:bodyPr/>
+          <a:lstStyle/>
+          <a:p>
+            <a:r>
+              <a:rPr lang="en-US" dirty="0"/>
+              <a:t>Meet The Family</a:t>
+            </a:r>
+          </a:p>
+        </p:txBody>
+      </p:sp>
+      <p:sp>
+        <p:nvSpPr>
+          <p:cNvPr id="3" name="Content Placeholder 2">
+            <a:extLst>
+              <a:ext uri="{FF2B5EF4-FFF2-40B4-BE49-F238E27FC236}">
+                <a16:creationId xmlns:a16="http://schemas.microsoft.com/office/drawing/2014/main" id="{D2253DD1-4219-A3C4-0E07-B0A327E0DC8C}"/>
+              </a:ext>
+            </a:extLst>
+          </p:cNvPr>
+          <p:cNvSpPr>
+            <a:spLocks noGrp="1"/>
+          </p:cNvSpPr>
+          <p:nvPr>
+            <p:ph idx="1"/>
+          </p:nvPr>
+        </p:nvSpPr>
+        <p:spPr/>
+        <p:txBody>
+          <a:bodyPr/>
+          <a:lstStyle/>
+          <a:p>
+            <a:r>
+              <a:rPr lang="en-US" i="1" dirty="0"/>
+              <a:t>Finish Me!</a:t>
+            </a:r>
+          </a:p>
+        </p:txBody>
+      </p:sp>
+    </p:spTree>
+    <p:extLst>
+      <p:ext uri="{BB962C8B-B14F-4D97-AF65-F5344CB8AC3E}">
+        <p14:creationId xmlns:p14="http://schemas.microsoft.com/office/powerpoint/2010/main" val="1482434733"/>
+      </p:ext>
+    </p:extLst>
+  </p:cSld>
+  <p:clrMapOvr>
+    <a:masterClrMapping/>
+  </p:clrMapOvr>
+</p:sld>
+</file>
+
+<file path=ppt/slides/slide24.xml><?xml version="1.0" encoding="utf-8"?>
+<p:sld xmlns:a="http://schemas.openxmlformats.org/drawingml/2006/main" xmlns:r="http://schemas.openxmlformats.org/officeDocument/2006/relationships" xmlns:p="http://schemas.openxmlformats.org/presentationml/2006/main">
+  <p:cSld>
+    <p:spTree>
+      <p:nvGrpSpPr>
+        <p:cNvPr id="1" name=""/>
+        <p:cNvGrpSpPr/>
+        <p:nvPr/>
+      </p:nvGrpSpPr>
+      <p:grpSpPr>
+        <a:xfrm>
+          <a:off x="0" y="0"/>
+          <a:ext cx="0" cy="0"/>
+          <a:chOff x="0" y="0"/>
+          <a:chExt cx="0" cy="0"/>
+        </a:xfrm>
+      </p:grpSpPr>
+      <p:sp>
+        <p:nvSpPr>
+          <p:cNvPr id="2" name="Title 1">
+            <a:extLst>
+              <a:ext uri="{FF2B5EF4-FFF2-40B4-BE49-F238E27FC236}">
+                <a16:creationId xmlns:a16="http://schemas.microsoft.com/office/drawing/2014/main" id="{F3082411-E9A4-A944-9340-9F466602DD0D}"/>
+              </a:ext>
+            </a:extLst>
+          </p:cNvPr>
+          <p:cNvSpPr>
+            <a:spLocks noGrp="1"/>
+          </p:cNvSpPr>
+          <p:nvPr>
+            <p:ph type="title"/>
+          </p:nvPr>
+        </p:nvSpPr>
+        <p:spPr/>
+        <p:txBody>
+          <a:bodyPr/>
+          <a:lstStyle/>
+          <a:p>
+            <a:r>
+              <a:rPr lang="en-US" dirty="0"/>
+              <a:t>Exception Specifications?</a:t>
+            </a:r>
+          </a:p>
+        </p:txBody>
+      </p:sp>
+      <p:sp>
+        <p:nvSpPr>
+          <p:cNvPr id="3" name="Content Placeholder 2">
+            <a:extLst>
+              <a:ext uri="{FF2B5EF4-FFF2-40B4-BE49-F238E27FC236}">
+                <a16:creationId xmlns:a16="http://schemas.microsoft.com/office/drawing/2014/main" id="{CBEB03E1-7F52-5E2A-265E-2B14FA91C142}"/>
+              </a:ext>
+            </a:extLst>
+          </p:cNvPr>
+          <p:cNvSpPr>
+            <a:spLocks noGrp="1"/>
+          </p:cNvSpPr>
+          <p:nvPr>
+            <p:ph idx="1"/>
+          </p:nvPr>
+        </p:nvSpPr>
+        <p:spPr/>
+        <p:txBody>
+          <a:bodyPr/>
+          <a:lstStyle/>
+          <a:p>
+            <a:r>
+              <a:rPr lang="en-US" dirty="0"/>
+              <a:t>Java allows you to declare which exceptions a method might throw</a:t>
+            </a:r>
+          </a:p>
+          <a:p>
+            <a:pPr lvl="1"/>
+            <a:r>
+              <a:rPr lang="en-US" dirty="0"/>
+              <a:t>Compiler verifies (statically) that all declared exceptions of called methods are either handled or declared to be thrown</a:t>
+            </a:r>
+          </a:p>
+          <a:p>
+            <a:pPr lvl="1"/>
+            <a:r>
+              <a:rPr lang="en-US" dirty="0"/>
+              <a:t>The idea was to ensure that no exceptions will go unnoticed/unhandled</a:t>
+            </a:r>
+          </a:p>
+          <a:p>
+            <a:r>
+              <a:rPr lang="en-US" dirty="0"/>
+              <a:t>Problems:</a:t>
+            </a:r>
+          </a:p>
+          <a:p>
+            <a:pPr lvl="1"/>
+            <a:r>
+              <a:rPr lang="en-US" dirty="0"/>
+              <a:t>Not all exceptions are “checked”, and they can be thrown even without the specification. Thus, the feature doesn’t really guarantee that there are no unhandled exceptions</a:t>
+            </a:r>
+          </a:p>
+          <a:p>
+            <a:pPr lvl="1"/>
+            <a:r>
+              <a:rPr lang="en-US" dirty="0"/>
+              <a:t>Sometimes, because of the logic of your program, you know an exception won’t be thrown, yet you are forced to handle an exception that can’t happen or declare that you will throw an exception you never will</a:t>
+            </a:r>
+          </a:p>
+        </p:txBody>
+      </p:sp>
+    </p:spTree>
+    <p:extLst>
+      <p:ext uri="{BB962C8B-B14F-4D97-AF65-F5344CB8AC3E}">
+        <p14:creationId xmlns:p14="http://schemas.microsoft.com/office/powerpoint/2010/main" val="3373807689"/>
+      </p:ext>
+    </p:extLst>
+  </p:cSld>
+  <p:clrMapOvr>
+    <a:masterClrMapping/>
+  </p:clrMapOvr>
+</p:sld>
+</file>
+
+<file path=ppt/slides/slide25.xml><?xml version="1.0" encoding="utf-8"?>
+<p:sld xmlns:a="http://schemas.openxmlformats.org/drawingml/2006/main" xmlns:r="http://schemas.openxmlformats.org/officeDocument/2006/relationships" xmlns:p="http://schemas.openxmlformats.org/presentationml/2006/main">
+  <p:cSld>
+    <p:spTree>
+      <p:nvGrpSpPr>
+        <p:cNvPr id="1" name=""/>
+        <p:cNvGrpSpPr/>
+        <p:nvPr/>
+      </p:nvGrpSpPr>
+      <p:grpSpPr>
+        <a:xfrm>
+          <a:off x="0" y="0"/>
+          <a:ext cx="0" cy="0"/>
+          <a:chOff x="0" y="0"/>
+          <a:chExt cx="0" cy="0"/>
+        </a:xfrm>
+      </p:grpSpPr>
+      <p:sp>
+        <p:nvSpPr>
+          <p:cNvPr id="2" name="Title 1">
+            <a:extLst>
+              <a:ext uri="{FF2B5EF4-FFF2-40B4-BE49-F238E27FC236}">
+                <a16:creationId xmlns:a16="http://schemas.microsoft.com/office/drawing/2014/main" id="{25ADA2E5-7568-619E-F965-5BA607C6A47B}"/>
+              </a:ext>
+            </a:extLst>
+          </p:cNvPr>
+          <p:cNvSpPr>
+            <a:spLocks noGrp="1"/>
+          </p:cNvSpPr>
+          <p:nvPr>
+            <p:ph type="title"/>
+          </p:nvPr>
+        </p:nvSpPr>
+        <p:spPr/>
+        <p:txBody>
+          <a:bodyPr/>
+          <a:lstStyle/>
+          <a:p>
+            <a:r>
+              <a:rPr lang="en-US" dirty="0"/>
+              <a:t>Controversial</a:t>
+            </a:r>
+          </a:p>
+        </p:txBody>
+      </p:sp>
+      <p:sp>
+        <p:nvSpPr>
+          <p:cNvPr id="3" name="Content Placeholder 2">
+            <a:extLst>
+              <a:ext uri="{FF2B5EF4-FFF2-40B4-BE49-F238E27FC236}">
+                <a16:creationId xmlns:a16="http://schemas.microsoft.com/office/drawing/2014/main" id="{87EA975E-9082-E358-9B6D-012D4A36C1BF}"/>
+              </a:ext>
+            </a:extLst>
+          </p:cNvPr>
+          <p:cNvSpPr>
+            <a:spLocks noGrp="1"/>
+          </p:cNvSpPr>
+          <p:nvPr>
+            <p:ph idx="1"/>
+          </p:nvPr>
+        </p:nvSpPr>
+        <p:spPr/>
+        <p:txBody>
+          <a:bodyPr/>
+          <a:lstStyle/>
+          <a:p>
+            <a:r>
+              <a:rPr lang="en-US" dirty="0"/>
+              <a:t>For the reasons stated earlier, Java exception specifications are controversial</a:t>
+            </a:r>
+          </a:p>
+          <a:p>
+            <a:pPr lvl="1"/>
+            <a:r>
+              <a:rPr lang="en-US" dirty="0"/>
+              <a:t>Some believe they are a mistake in the design of Java</a:t>
+            </a:r>
+          </a:p>
+          <a:p>
+            <a:pPr lvl="1"/>
+            <a:r>
+              <a:rPr lang="en-US" dirty="0"/>
+              <a:t>Some believe they are useful tools to help make more reliable programs</a:t>
+            </a:r>
+          </a:p>
+          <a:p>
+            <a:pPr lvl="1"/>
+            <a:r>
+              <a:rPr lang="en-US" dirty="0"/>
+              <a:t>Perhaps both are right?</a:t>
+            </a:r>
+          </a:p>
+          <a:p>
+            <a:r>
+              <a:rPr lang="en-US" dirty="0"/>
+              <a:t>Most modern languages do not have exception specifications</a:t>
+            </a:r>
+          </a:p>
+          <a:p>
+            <a:pPr lvl="1"/>
+            <a:r>
+              <a:rPr lang="en-US" dirty="0"/>
+              <a:t>For example, Scala does not, despite targeting the JVM</a:t>
+            </a:r>
+          </a:p>
+        </p:txBody>
+      </p:sp>
+    </p:spTree>
+    <p:extLst>
+      <p:ext uri="{BB962C8B-B14F-4D97-AF65-F5344CB8AC3E}">
+        <p14:creationId xmlns:p14="http://schemas.microsoft.com/office/powerpoint/2010/main" val="3290453476"/>
+      </p:ext>
+    </p:extLst>
+  </p:cSld>
+  <p:clrMapOvr>
+    <a:masterClrMapping/>
+  </p:clrMapOvr>
+</p:sld>
+</file>
+
+<file path=ppt/slides/slide26.xml><?xml version="1.0" encoding="utf-8"?>
+<p:sld xmlns:a="http://schemas.openxmlformats.org/drawingml/2006/main" xmlns:r="http://schemas.openxmlformats.org/officeDocument/2006/relationships" xmlns:p="http://schemas.openxmlformats.org/presentationml/2006/main">
+  <p:cSld>
+    <p:spTree>
+      <p:nvGrpSpPr>
+        <p:cNvPr id="1" name=""/>
+        <p:cNvGrpSpPr/>
+        <p:nvPr/>
+      </p:nvGrpSpPr>
+      <p:grpSpPr>
+        <a:xfrm>
+          <a:off x="0" y="0"/>
+          <a:ext cx="0" cy="0"/>
+          <a:chOff x="0" y="0"/>
+          <a:chExt cx="0" cy="0"/>
+        </a:xfrm>
+      </p:grpSpPr>
+      <p:sp>
+        <p:nvSpPr>
+          <p:cNvPr id="2" name="Title 1">
+            <a:extLst>
+              <a:ext uri="{FF2B5EF4-FFF2-40B4-BE49-F238E27FC236}">
+                <a16:creationId xmlns:a16="http://schemas.microsoft.com/office/drawing/2014/main" id="{B8019375-DAD6-BCBC-80AA-65E97AEC3A53}"/>
+              </a:ext>
+            </a:extLst>
+          </p:cNvPr>
+          <p:cNvSpPr>
+            <a:spLocks noGrp="1"/>
+          </p:cNvSpPr>
+          <p:nvPr>
+            <p:ph type="title"/>
+          </p:nvPr>
+        </p:nvSpPr>
+        <p:spPr/>
+        <p:txBody>
+          <a:bodyPr/>
+          <a:lstStyle/>
+          <a:p>
+            <a:r>
+              <a:rPr lang="en-US" dirty="0"/>
+              <a:t>What about C++?</a:t>
+            </a:r>
+          </a:p>
+        </p:txBody>
+      </p:sp>
+      <p:sp>
+        <p:nvSpPr>
+          <p:cNvPr id="3" name="Content Placeholder 2">
+            <a:extLst>
+              <a:ext uri="{FF2B5EF4-FFF2-40B4-BE49-F238E27FC236}">
+                <a16:creationId xmlns:a16="http://schemas.microsoft.com/office/drawing/2014/main" id="{EFF45E84-AB08-BEEE-99B4-82B4BA8B5DAE}"/>
+              </a:ext>
+            </a:extLst>
+          </p:cNvPr>
+          <p:cNvSpPr>
+            <a:spLocks noGrp="1"/>
+          </p:cNvSpPr>
+          <p:nvPr>
+            <p:ph idx="1"/>
+          </p:nvPr>
+        </p:nvSpPr>
+        <p:spPr/>
+        <p:txBody>
+          <a:bodyPr/>
+          <a:lstStyle/>
+          <a:p>
+            <a:r>
+              <a:rPr lang="en-US" dirty="0"/>
+              <a:t>C++ 1998 had a form of exception specifications</a:t>
+            </a:r>
+          </a:p>
+          <a:p>
+            <a:r>
+              <a:rPr lang="en-US" dirty="0"/>
+              <a:t>It was even more controversial than Java’s</a:t>
+            </a:r>
+          </a:p>
+          <a:p>
+            <a:pPr lvl="1"/>
+            <a:r>
+              <a:rPr lang="en-US" dirty="0"/>
+              <a:t>It did not provide much help with creating more reliable programs</a:t>
+            </a:r>
+          </a:p>
+          <a:p>
+            <a:pPr lvl="1"/>
+            <a:r>
+              <a:rPr lang="en-US" dirty="0"/>
+              <a:t>C++ needed to be compatible with legacy (pre-1998) code and with C, which limited the design options for exception specifications</a:t>
+            </a:r>
+          </a:p>
+          <a:p>
+            <a:r>
+              <a:rPr lang="en-US" dirty="0"/>
+              <a:t>It basically didn’t work and caused more problems than it solved</a:t>
+            </a:r>
+          </a:p>
+          <a:p>
+            <a:r>
+              <a:rPr lang="en-US" dirty="0"/>
+              <a:t>A “best practice” quickly arrived: </a:t>
+            </a:r>
+            <a:r>
+              <a:rPr lang="en-US" i="1" u="sng" dirty="0"/>
+              <a:t>Don’t Use Exception Specifications</a:t>
+            </a:r>
+            <a:r>
+              <a:rPr lang="en-US" dirty="0"/>
+              <a:t>!</a:t>
+            </a:r>
+          </a:p>
+          <a:p>
+            <a:r>
+              <a:rPr lang="en-US" dirty="0"/>
+              <a:t>Deprecated in C++ 2011. Completely removed in C++ 2017</a:t>
+            </a:r>
+          </a:p>
+          <a:p>
+            <a:pPr lvl="1"/>
+            <a:r>
+              <a:rPr lang="en-US" dirty="0"/>
+              <a:t>A rare case of the language actually getting </a:t>
+            </a:r>
+            <a:r>
+              <a:rPr lang="en-US" i="1" dirty="0"/>
+              <a:t>smaller</a:t>
+            </a:r>
+            <a:r>
+              <a:rPr lang="en-US" dirty="0"/>
+              <a:t>! (*gasp*)</a:t>
+            </a:r>
+          </a:p>
+        </p:txBody>
+      </p:sp>
+    </p:spTree>
+    <p:extLst>
+      <p:ext uri="{BB962C8B-B14F-4D97-AF65-F5344CB8AC3E}">
+        <p14:creationId xmlns:p14="http://schemas.microsoft.com/office/powerpoint/2010/main" val="3452763118"/>
+      </p:ext>
+    </p:extLst>
+  </p:cSld>
+  <p:clrMapOvr>
+    <a:masterClrMapping/>
+  </p:clrMapOvr>
+</p:sld>
+</file>
+
+<file path=ppt/slides/slide27.xml><?xml version="1.0" encoding="utf-8"?>
+<p:sld xmlns:a="http://schemas.openxmlformats.org/drawingml/2006/main" xmlns:r="http://schemas.openxmlformats.org/officeDocument/2006/relationships" xmlns:p="http://schemas.openxmlformats.org/presentationml/2006/main">
+  <p:cSld>
+    <p:spTree>
+      <p:nvGrpSpPr>
+        <p:cNvPr id="1" name=""/>
+        <p:cNvGrpSpPr/>
+        <p:nvPr/>
+      </p:nvGrpSpPr>
+      <p:grpSpPr>
+        <a:xfrm>
+          <a:off x="0" y="0"/>
+          <a:ext cx="0" cy="0"/>
+          <a:chOff x="0" y="0"/>
+          <a:chExt cx="0" cy="0"/>
+        </a:xfrm>
+      </p:grpSpPr>
+      <p:sp>
+        <p:nvSpPr>
+          <p:cNvPr id="2" name="Title 1">
+            <a:extLst>
+              <a:ext uri="{FF2B5EF4-FFF2-40B4-BE49-F238E27FC236}">
+                <a16:creationId xmlns:a16="http://schemas.microsoft.com/office/drawing/2014/main" id="{8CC41B8A-F35B-9096-644F-DF5B8791DE9B}"/>
+              </a:ext>
+            </a:extLst>
+          </p:cNvPr>
+          <p:cNvSpPr>
+            <a:spLocks noGrp="1"/>
+          </p:cNvSpPr>
+          <p:nvPr>
+            <p:ph type="title"/>
+          </p:nvPr>
+        </p:nvSpPr>
+        <p:spPr/>
+        <p:txBody>
+          <a:bodyPr/>
+          <a:lstStyle/>
+          <a:p>
+            <a:r>
+              <a:rPr lang="en-US" dirty="0"/>
+              <a:t>With One Exception…</a:t>
+            </a:r>
+          </a:p>
+        </p:txBody>
+      </p:sp>
+      <p:sp>
+        <p:nvSpPr>
+          <p:cNvPr id="3" name="Content Placeholder 2">
+            <a:extLst>
+              <a:ext uri="{FF2B5EF4-FFF2-40B4-BE49-F238E27FC236}">
+                <a16:creationId xmlns:a16="http://schemas.microsoft.com/office/drawing/2014/main" id="{DF8D7988-21E5-0F26-47A6-67632E22D0C7}"/>
+              </a:ext>
+            </a:extLst>
+          </p:cNvPr>
+          <p:cNvSpPr>
+            <a:spLocks noGrp="1"/>
+          </p:cNvSpPr>
+          <p:nvPr>
+            <p:ph idx="1"/>
+          </p:nvPr>
+        </p:nvSpPr>
+        <p:spPr/>
+        <p:txBody>
+          <a:bodyPr/>
+          <a:lstStyle/>
+          <a:p>
+            <a:r>
+              <a:rPr lang="en-US" i="1" dirty="0"/>
+              <a:t>Finish Me!</a:t>
+            </a:r>
+          </a:p>
+        </p:txBody>
+      </p:sp>
+    </p:spTree>
+    <p:extLst>
+      <p:ext uri="{BB962C8B-B14F-4D97-AF65-F5344CB8AC3E}">
+        <p14:creationId xmlns:p14="http://schemas.microsoft.com/office/powerpoint/2010/main" val="516076572"/>
       </p:ext>
     </p:extLst>
   </p:cSld>

</xml_diff>

<commit_message>
More work on the Exceptions presentation.
</commit_message>
<xml_diff>
--- a/Presentations/Exceptions.pptx
+++ b/Presentations/Exceptions.pptx
@@ -28,10 +28,16 @@
     <p:sldId id="276" r:id="rId22"/>
     <p:sldId id="277" r:id="rId23"/>
     <p:sldId id="278" r:id="rId24"/>
-    <p:sldId id="279" r:id="rId25"/>
-    <p:sldId id="280" r:id="rId26"/>
-    <p:sldId id="281" r:id="rId27"/>
-    <p:sldId id="282" r:id="rId28"/>
+    <p:sldId id="283" r:id="rId25"/>
+    <p:sldId id="284" r:id="rId26"/>
+    <p:sldId id="285" r:id="rId27"/>
+    <p:sldId id="286" r:id="rId28"/>
+    <p:sldId id="287" r:id="rId29"/>
+    <p:sldId id="288" r:id="rId30"/>
+    <p:sldId id="279" r:id="rId31"/>
+    <p:sldId id="280" r:id="rId32"/>
+    <p:sldId id="281" r:id="rId33"/>
+    <p:sldId id="282" r:id="rId34"/>
   </p:sldIdLst>
   <p:sldSz cx="12192000" cy="6858000"/>
   <p:notesSz cx="6858000" cy="9144000"/>
@@ -285,7 +291,7 @@
           <a:p>
             <a:fld id="{17A57B3F-CD89-7649-929F-A2F99AD089BC}" type="datetimeFigureOut">
               <a:rPr lang="en-US" smtClean="0"/>
-              <a:t>10/27/23</a:t>
+              <a:t>11/13/23</a:t>
             </a:fld>
             <a:endParaRPr lang="en-US"/>
           </a:p>
@@ -483,7 +489,7 @@
           <a:p>
             <a:fld id="{17A57B3F-CD89-7649-929F-A2F99AD089BC}" type="datetimeFigureOut">
               <a:rPr lang="en-US" smtClean="0"/>
-              <a:t>10/27/23</a:t>
+              <a:t>11/13/23</a:t>
             </a:fld>
             <a:endParaRPr lang="en-US"/>
           </a:p>
@@ -691,7 +697,7 @@
           <a:p>
             <a:fld id="{17A57B3F-CD89-7649-929F-A2F99AD089BC}" type="datetimeFigureOut">
               <a:rPr lang="en-US" smtClean="0"/>
-              <a:t>10/27/23</a:t>
+              <a:t>11/13/23</a:t>
             </a:fld>
             <a:endParaRPr lang="en-US"/>
           </a:p>
@@ -889,7 +895,7 @@
           <a:p>
             <a:fld id="{17A57B3F-CD89-7649-929F-A2F99AD089BC}" type="datetimeFigureOut">
               <a:rPr lang="en-US" smtClean="0"/>
-              <a:t>10/27/23</a:t>
+              <a:t>11/13/23</a:t>
             </a:fld>
             <a:endParaRPr lang="en-US"/>
           </a:p>
@@ -1164,7 +1170,7 @@
           <a:p>
             <a:fld id="{17A57B3F-CD89-7649-929F-A2F99AD089BC}" type="datetimeFigureOut">
               <a:rPr lang="en-US" smtClean="0"/>
-              <a:t>10/27/23</a:t>
+              <a:t>11/13/23</a:t>
             </a:fld>
             <a:endParaRPr lang="en-US"/>
           </a:p>
@@ -1429,7 +1435,7 @@
           <a:p>
             <a:fld id="{17A57B3F-CD89-7649-929F-A2F99AD089BC}" type="datetimeFigureOut">
               <a:rPr lang="en-US" smtClean="0"/>
-              <a:t>10/27/23</a:t>
+              <a:t>11/13/23</a:t>
             </a:fld>
             <a:endParaRPr lang="en-US"/>
           </a:p>
@@ -1841,7 +1847,7 @@
           <a:p>
             <a:fld id="{17A57B3F-CD89-7649-929F-A2F99AD089BC}" type="datetimeFigureOut">
               <a:rPr lang="en-US" smtClean="0"/>
-              <a:t>10/27/23</a:t>
+              <a:t>11/13/23</a:t>
             </a:fld>
             <a:endParaRPr lang="en-US"/>
           </a:p>
@@ -1982,7 +1988,7 @@
           <a:p>
             <a:fld id="{17A57B3F-CD89-7649-929F-A2F99AD089BC}" type="datetimeFigureOut">
               <a:rPr lang="en-US" smtClean="0"/>
-              <a:t>10/27/23</a:t>
+              <a:t>11/13/23</a:t>
             </a:fld>
             <a:endParaRPr lang="en-US"/>
           </a:p>
@@ -2095,7 +2101,7 @@
           <a:p>
             <a:fld id="{17A57B3F-CD89-7649-929F-A2F99AD089BC}" type="datetimeFigureOut">
               <a:rPr lang="en-US" smtClean="0"/>
-              <a:t>10/27/23</a:t>
+              <a:t>11/13/23</a:t>
             </a:fld>
             <a:endParaRPr lang="en-US"/>
           </a:p>
@@ -2406,7 +2412,7 @@
           <a:p>
             <a:fld id="{17A57B3F-CD89-7649-929F-A2F99AD089BC}" type="datetimeFigureOut">
               <a:rPr lang="en-US" smtClean="0"/>
-              <a:t>10/27/23</a:t>
+              <a:t>11/13/23</a:t>
             </a:fld>
             <a:endParaRPr lang="en-US"/>
           </a:p>
@@ -2694,7 +2700,7 @@
           <a:p>
             <a:fld id="{17A57B3F-CD89-7649-929F-A2F99AD089BC}" type="datetimeFigureOut">
               <a:rPr lang="en-US" smtClean="0"/>
-              <a:t>10/27/23</a:t>
+              <a:t>11/13/23</a:t>
             </a:fld>
             <a:endParaRPr lang="en-US"/>
           </a:p>
@@ -2935,7 +2941,7 @@
           <a:p>
             <a:fld id="{17A57B3F-CD89-7649-929F-A2F99AD089BC}" type="datetimeFigureOut">
               <a:rPr lang="en-US" smtClean="0"/>
-              <a:t>10/27/23</a:t>
+              <a:t>11/13/23</a:t>
             </a:fld>
             <a:endParaRPr lang="en-US"/>
           </a:p>
@@ -3564,6 +3570,13 @@
           <a:lstStyle/>
           <a:p>
             <a:r>
+              <a:rPr lang="en-US" dirty="0">
+                <a:latin typeface="Consolas" panose="020B0609020204030204" pitchFamily="49" charset="0"/>
+                <a:cs typeface="Consolas" panose="020B0609020204030204" pitchFamily="49" charset="0"/>
+              </a:rPr>
+              <a:t>std::</a:t>
+            </a:r>
+            <a:r>
               <a:rPr lang="en-US" dirty="0" err="1">
                 <a:latin typeface="Consolas" panose="020B0609020204030204" pitchFamily="49" charset="0"/>
                 <a:cs typeface="Consolas" panose="020B0609020204030204" pitchFamily="49" charset="0"/>
@@ -6799,8 +6812,659 @@
           <a:lstStyle/>
           <a:p>
             <a:r>
-              <a:rPr lang="en-US" i="1" dirty="0"/>
-              <a:t>Finish Me!</a:t>
+              <a:rPr lang="en-US" dirty="0">
+                <a:latin typeface="Consolas" panose="020B0609020204030204" pitchFamily="49" charset="0"/>
+                <a:cs typeface="Consolas" panose="020B0609020204030204" pitchFamily="49" charset="0"/>
+              </a:rPr>
+              <a:t>#include &lt;</a:t>
+            </a:r>
+            <a:r>
+              <a:rPr lang="en-US" dirty="0" err="1">
+                <a:latin typeface="Consolas" panose="020B0609020204030204" pitchFamily="49" charset="0"/>
+                <a:cs typeface="Consolas" panose="020B0609020204030204" pitchFamily="49" charset="0"/>
+              </a:rPr>
+              <a:t>stdexcept</a:t>
+            </a:r>
+            <a:r>
+              <a:rPr lang="en-US" dirty="0">
+                <a:latin typeface="Consolas" panose="020B0609020204030204" pitchFamily="49" charset="0"/>
+                <a:cs typeface="Consolas" panose="020B0609020204030204" pitchFamily="49" charset="0"/>
+              </a:rPr>
+              <a:t>&gt;</a:t>
+            </a:r>
+          </a:p>
+        </p:txBody>
+      </p:sp>
+      <p:sp>
+        <p:nvSpPr>
+          <p:cNvPr id="4" name="TextBox 3">
+            <a:extLst>
+              <a:ext uri="{FF2B5EF4-FFF2-40B4-BE49-F238E27FC236}">
+                <a16:creationId xmlns:a16="http://schemas.microsoft.com/office/drawing/2014/main" id="{5014D88F-C74B-DC3A-BB5A-368FB8AFD701}"/>
+              </a:ext>
+            </a:extLst>
+          </p:cNvPr>
+          <p:cNvSpPr txBox="1"/>
+          <p:nvPr/>
+        </p:nvSpPr>
+        <p:spPr>
+          <a:xfrm>
+            <a:off x="2267868" y="2341582"/>
+            <a:ext cx="7782900" cy="3416320"/>
+          </a:xfrm>
+          <a:prstGeom prst="rect">
+            <a:avLst/>
+          </a:prstGeom>
+          <a:noFill/>
+        </p:spPr>
+        <p:txBody>
+          <a:bodyPr wrap="none" rtlCol="0">
+            <a:spAutoFit/>
+          </a:bodyPr>
+          <a:lstStyle/>
+          <a:p>
+            <a:r>
+              <a:rPr lang="en-US" b="1" dirty="0">
+                <a:latin typeface="Consolas" panose="020B0609020204030204" pitchFamily="49" charset="0"/>
+                <a:cs typeface="Consolas" panose="020B0609020204030204" pitchFamily="49" charset="0"/>
+              </a:rPr>
+              <a:t>namespace</a:t>
+            </a:r>
+            <a:r>
+              <a:rPr lang="en-US" dirty="0">
+                <a:latin typeface="Consolas" panose="020B0609020204030204" pitchFamily="49" charset="0"/>
+                <a:cs typeface="Consolas" panose="020B0609020204030204" pitchFamily="49" charset="0"/>
+              </a:rPr>
+              <a:t> std {</a:t>
+            </a:r>
+          </a:p>
+          <a:p>
+            <a:r>
+              <a:rPr lang="en-US" dirty="0">
+                <a:latin typeface="Consolas" panose="020B0609020204030204" pitchFamily="49" charset="0"/>
+                <a:cs typeface="Consolas" panose="020B0609020204030204" pitchFamily="49" charset="0"/>
+              </a:rPr>
+              <a:t>    </a:t>
+            </a:r>
+            <a:r>
+              <a:rPr lang="en-US" b="1" dirty="0">
+                <a:latin typeface="Consolas" panose="020B0609020204030204" pitchFamily="49" charset="0"/>
+                <a:cs typeface="Consolas" panose="020B0609020204030204" pitchFamily="49" charset="0"/>
+              </a:rPr>
+              <a:t>class</a:t>
+            </a:r>
+            <a:r>
+              <a:rPr lang="en-US" dirty="0">
+                <a:latin typeface="Consolas" panose="020B0609020204030204" pitchFamily="49" charset="0"/>
+                <a:cs typeface="Consolas" panose="020B0609020204030204" pitchFamily="49" charset="0"/>
+              </a:rPr>
+              <a:t> exception { … };</a:t>
+            </a:r>
+          </a:p>
+          <a:p>
+            <a:r>
+              <a:rPr lang="en-US" dirty="0">
+                <a:latin typeface="Consolas" panose="020B0609020204030204" pitchFamily="49" charset="0"/>
+                <a:cs typeface="Consolas" panose="020B0609020204030204" pitchFamily="49" charset="0"/>
+              </a:rPr>
+              <a:t>    </a:t>
+            </a:r>
+            <a:r>
+              <a:rPr lang="en-US" b="1" dirty="0">
+                <a:latin typeface="Consolas" panose="020B0609020204030204" pitchFamily="49" charset="0"/>
+                <a:cs typeface="Consolas" panose="020B0609020204030204" pitchFamily="49" charset="0"/>
+              </a:rPr>
+              <a:t>class</a:t>
+            </a:r>
+            <a:r>
+              <a:rPr lang="en-US" dirty="0">
+                <a:latin typeface="Consolas" panose="020B0609020204030204" pitchFamily="49" charset="0"/>
+                <a:cs typeface="Consolas" panose="020B0609020204030204" pitchFamily="49" charset="0"/>
+              </a:rPr>
+              <a:t> </a:t>
+            </a:r>
+            <a:r>
+              <a:rPr lang="en-US" dirty="0" err="1">
+                <a:latin typeface="Consolas" panose="020B0609020204030204" pitchFamily="49" charset="0"/>
+                <a:cs typeface="Consolas" panose="020B0609020204030204" pitchFamily="49" charset="0"/>
+              </a:rPr>
+              <a:t>logic_error</a:t>
+            </a:r>
+            <a:r>
+              <a:rPr lang="en-US" dirty="0">
+                <a:latin typeface="Consolas" panose="020B0609020204030204" pitchFamily="49" charset="0"/>
+                <a:cs typeface="Consolas" panose="020B0609020204030204" pitchFamily="49" charset="0"/>
+              </a:rPr>
+              <a:t>          : </a:t>
+            </a:r>
+            <a:r>
+              <a:rPr lang="en-US" b="1" dirty="0">
+                <a:latin typeface="Consolas" panose="020B0609020204030204" pitchFamily="49" charset="0"/>
+                <a:cs typeface="Consolas" panose="020B0609020204030204" pitchFamily="49" charset="0"/>
+              </a:rPr>
+              <a:t>public</a:t>
+            </a:r>
+            <a:r>
+              <a:rPr lang="en-US" dirty="0">
+                <a:latin typeface="Consolas" panose="020B0609020204030204" pitchFamily="49" charset="0"/>
+                <a:cs typeface="Consolas" panose="020B0609020204030204" pitchFamily="49" charset="0"/>
+              </a:rPr>
+              <a:t> exception { … };</a:t>
+            </a:r>
+          </a:p>
+          <a:p>
+            <a:r>
+              <a:rPr lang="en-US" dirty="0">
+                <a:latin typeface="Consolas" panose="020B0609020204030204" pitchFamily="49" charset="0"/>
+                <a:cs typeface="Consolas" panose="020B0609020204030204" pitchFamily="49" charset="0"/>
+              </a:rPr>
+              <a:t>        </a:t>
+            </a:r>
+            <a:r>
+              <a:rPr lang="en-US" b="1" dirty="0">
+                <a:latin typeface="Consolas" panose="020B0609020204030204" pitchFamily="49" charset="0"/>
+                <a:cs typeface="Consolas" panose="020B0609020204030204" pitchFamily="49" charset="0"/>
+              </a:rPr>
+              <a:t>class</a:t>
+            </a:r>
+            <a:r>
+              <a:rPr lang="en-US" dirty="0">
+                <a:latin typeface="Consolas" panose="020B0609020204030204" pitchFamily="49" charset="0"/>
+                <a:cs typeface="Consolas" panose="020B0609020204030204" pitchFamily="49" charset="0"/>
+              </a:rPr>
+              <a:t> </a:t>
+            </a:r>
+            <a:r>
+              <a:rPr lang="en-US" dirty="0" err="1">
+                <a:latin typeface="Consolas" panose="020B0609020204030204" pitchFamily="49" charset="0"/>
+                <a:cs typeface="Consolas" panose="020B0609020204030204" pitchFamily="49" charset="0"/>
+              </a:rPr>
+              <a:t>domain_error</a:t>
+            </a:r>
+            <a:r>
+              <a:rPr lang="en-US" dirty="0">
+                <a:latin typeface="Consolas" panose="020B0609020204030204" pitchFamily="49" charset="0"/>
+                <a:cs typeface="Consolas" panose="020B0609020204030204" pitchFamily="49" charset="0"/>
+              </a:rPr>
+              <a:t>     : </a:t>
+            </a:r>
+            <a:r>
+              <a:rPr lang="en-US" b="1" dirty="0">
+                <a:latin typeface="Consolas" panose="020B0609020204030204" pitchFamily="49" charset="0"/>
+                <a:cs typeface="Consolas" panose="020B0609020204030204" pitchFamily="49" charset="0"/>
+              </a:rPr>
+              <a:t>public</a:t>
+            </a:r>
+            <a:r>
+              <a:rPr lang="en-US" dirty="0">
+                <a:latin typeface="Consolas" panose="020B0609020204030204" pitchFamily="49" charset="0"/>
+                <a:cs typeface="Consolas" panose="020B0609020204030204" pitchFamily="49" charset="0"/>
+              </a:rPr>
+              <a:t> </a:t>
+            </a:r>
+            <a:r>
+              <a:rPr lang="en-US" dirty="0" err="1">
+                <a:latin typeface="Consolas" panose="020B0609020204030204" pitchFamily="49" charset="0"/>
+                <a:cs typeface="Consolas" panose="020B0609020204030204" pitchFamily="49" charset="0"/>
+              </a:rPr>
+              <a:t>logic_error</a:t>
+            </a:r>
+            <a:r>
+              <a:rPr lang="en-US" dirty="0">
+                <a:latin typeface="Consolas" panose="020B0609020204030204" pitchFamily="49" charset="0"/>
+                <a:cs typeface="Consolas" panose="020B0609020204030204" pitchFamily="49" charset="0"/>
+              </a:rPr>
+              <a:t> { … };</a:t>
+            </a:r>
+          </a:p>
+          <a:p>
+            <a:r>
+              <a:rPr lang="en-US" dirty="0">
+                <a:latin typeface="Consolas" panose="020B0609020204030204" pitchFamily="49" charset="0"/>
+                <a:cs typeface="Consolas" panose="020B0609020204030204" pitchFamily="49" charset="0"/>
+              </a:rPr>
+              <a:t>        </a:t>
+            </a:r>
+            <a:r>
+              <a:rPr lang="en-US" b="1" dirty="0">
+                <a:latin typeface="Consolas" panose="020B0609020204030204" pitchFamily="49" charset="0"/>
+                <a:cs typeface="Consolas" panose="020B0609020204030204" pitchFamily="49" charset="0"/>
+              </a:rPr>
+              <a:t>class</a:t>
+            </a:r>
+            <a:r>
+              <a:rPr lang="en-US" dirty="0">
+                <a:latin typeface="Consolas" panose="020B0609020204030204" pitchFamily="49" charset="0"/>
+                <a:cs typeface="Consolas" panose="020B0609020204030204" pitchFamily="49" charset="0"/>
+              </a:rPr>
+              <a:t> </a:t>
+            </a:r>
+            <a:r>
+              <a:rPr lang="en-US" dirty="0" err="1">
+                <a:latin typeface="Consolas" panose="020B0609020204030204" pitchFamily="49" charset="0"/>
+                <a:cs typeface="Consolas" panose="020B0609020204030204" pitchFamily="49" charset="0"/>
+              </a:rPr>
+              <a:t>invalid_argument</a:t>
+            </a:r>
+            <a:r>
+              <a:rPr lang="en-US" dirty="0">
+                <a:latin typeface="Consolas" panose="020B0609020204030204" pitchFamily="49" charset="0"/>
+                <a:cs typeface="Consolas" panose="020B0609020204030204" pitchFamily="49" charset="0"/>
+              </a:rPr>
+              <a:t> : </a:t>
+            </a:r>
+            <a:r>
+              <a:rPr lang="en-US" b="1" dirty="0">
+                <a:latin typeface="Consolas" panose="020B0609020204030204" pitchFamily="49" charset="0"/>
+                <a:cs typeface="Consolas" panose="020B0609020204030204" pitchFamily="49" charset="0"/>
+              </a:rPr>
+              <a:t>public</a:t>
+            </a:r>
+            <a:r>
+              <a:rPr lang="en-US" dirty="0">
+                <a:latin typeface="Consolas" panose="020B0609020204030204" pitchFamily="49" charset="0"/>
+                <a:cs typeface="Consolas" panose="020B0609020204030204" pitchFamily="49" charset="0"/>
+              </a:rPr>
+              <a:t> </a:t>
+            </a:r>
+            <a:r>
+              <a:rPr lang="en-US" dirty="0" err="1">
+                <a:latin typeface="Consolas" panose="020B0609020204030204" pitchFamily="49" charset="0"/>
+                <a:cs typeface="Consolas" panose="020B0609020204030204" pitchFamily="49" charset="0"/>
+              </a:rPr>
+              <a:t>logic_error</a:t>
+            </a:r>
+            <a:r>
+              <a:rPr lang="en-US" dirty="0">
+                <a:latin typeface="Consolas" panose="020B0609020204030204" pitchFamily="49" charset="0"/>
+                <a:cs typeface="Consolas" panose="020B0609020204030204" pitchFamily="49" charset="0"/>
+              </a:rPr>
+              <a:t> { … };</a:t>
+            </a:r>
+          </a:p>
+          <a:p>
+            <a:r>
+              <a:rPr lang="en-US" dirty="0">
+                <a:latin typeface="Consolas" panose="020B0609020204030204" pitchFamily="49" charset="0"/>
+                <a:cs typeface="Consolas" panose="020B0609020204030204" pitchFamily="49" charset="0"/>
+              </a:rPr>
+              <a:t>        </a:t>
+            </a:r>
+            <a:r>
+              <a:rPr lang="en-US" b="1" dirty="0">
+                <a:latin typeface="Consolas" panose="020B0609020204030204" pitchFamily="49" charset="0"/>
+                <a:cs typeface="Consolas" panose="020B0609020204030204" pitchFamily="49" charset="0"/>
+              </a:rPr>
+              <a:t>class</a:t>
+            </a:r>
+            <a:r>
+              <a:rPr lang="en-US" dirty="0">
+                <a:latin typeface="Consolas" panose="020B0609020204030204" pitchFamily="49" charset="0"/>
+                <a:cs typeface="Consolas" panose="020B0609020204030204" pitchFamily="49" charset="0"/>
+              </a:rPr>
+              <a:t> </a:t>
+            </a:r>
+            <a:r>
+              <a:rPr lang="en-US" dirty="0" err="1">
+                <a:latin typeface="Consolas" panose="020B0609020204030204" pitchFamily="49" charset="0"/>
+                <a:cs typeface="Consolas" panose="020B0609020204030204" pitchFamily="49" charset="0"/>
+              </a:rPr>
+              <a:t>length_error</a:t>
+            </a:r>
+            <a:r>
+              <a:rPr lang="en-US" dirty="0">
+                <a:latin typeface="Consolas" panose="020B0609020204030204" pitchFamily="49" charset="0"/>
+                <a:cs typeface="Consolas" panose="020B0609020204030204" pitchFamily="49" charset="0"/>
+              </a:rPr>
+              <a:t>     : </a:t>
+            </a:r>
+            <a:r>
+              <a:rPr lang="en-US" b="1" dirty="0">
+                <a:latin typeface="Consolas" panose="020B0609020204030204" pitchFamily="49" charset="0"/>
+                <a:cs typeface="Consolas" panose="020B0609020204030204" pitchFamily="49" charset="0"/>
+              </a:rPr>
+              <a:t>public</a:t>
+            </a:r>
+            <a:r>
+              <a:rPr lang="en-US" dirty="0">
+                <a:latin typeface="Consolas" panose="020B0609020204030204" pitchFamily="49" charset="0"/>
+                <a:cs typeface="Consolas" panose="020B0609020204030204" pitchFamily="49" charset="0"/>
+              </a:rPr>
+              <a:t> </a:t>
+            </a:r>
+            <a:r>
+              <a:rPr lang="en-US" dirty="0" err="1">
+                <a:latin typeface="Consolas" panose="020B0609020204030204" pitchFamily="49" charset="0"/>
+                <a:cs typeface="Consolas" panose="020B0609020204030204" pitchFamily="49" charset="0"/>
+              </a:rPr>
+              <a:t>logic_error</a:t>
+            </a:r>
+            <a:r>
+              <a:rPr lang="en-US" dirty="0">
+                <a:latin typeface="Consolas" panose="020B0609020204030204" pitchFamily="49" charset="0"/>
+                <a:cs typeface="Consolas" panose="020B0609020204030204" pitchFamily="49" charset="0"/>
+              </a:rPr>
+              <a:t> { … };</a:t>
+            </a:r>
+          </a:p>
+          <a:p>
+            <a:r>
+              <a:rPr lang="en-US" dirty="0">
+                <a:latin typeface="Consolas" panose="020B0609020204030204" pitchFamily="49" charset="0"/>
+                <a:cs typeface="Consolas" panose="020B0609020204030204" pitchFamily="49" charset="0"/>
+              </a:rPr>
+              <a:t>        </a:t>
+            </a:r>
+            <a:r>
+              <a:rPr lang="en-US" b="1" dirty="0">
+                <a:latin typeface="Consolas" panose="020B0609020204030204" pitchFamily="49" charset="0"/>
+                <a:cs typeface="Consolas" panose="020B0609020204030204" pitchFamily="49" charset="0"/>
+              </a:rPr>
+              <a:t>class</a:t>
+            </a:r>
+            <a:r>
+              <a:rPr lang="en-US" dirty="0">
+                <a:latin typeface="Consolas" panose="020B0609020204030204" pitchFamily="49" charset="0"/>
+                <a:cs typeface="Consolas" panose="020B0609020204030204" pitchFamily="49" charset="0"/>
+              </a:rPr>
+              <a:t> </a:t>
+            </a:r>
+            <a:r>
+              <a:rPr lang="en-US" dirty="0" err="1">
+                <a:latin typeface="Consolas" panose="020B0609020204030204" pitchFamily="49" charset="0"/>
+                <a:cs typeface="Consolas" panose="020B0609020204030204" pitchFamily="49" charset="0"/>
+              </a:rPr>
+              <a:t>out_of_range</a:t>
+            </a:r>
+            <a:r>
+              <a:rPr lang="en-US" dirty="0">
+                <a:latin typeface="Consolas" panose="020B0609020204030204" pitchFamily="49" charset="0"/>
+                <a:cs typeface="Consolas" panose="020B0609020204030204" pitchFamily="49" charset="0"/>
+              </a:rPr>
+              <a:t>     : </a:t>
+            </a:r>
+            <a:r>
+              <a:rPr lang="en-US" b="1" dirty="0">
+                <a:latin typeface="Consolas" panose="020B0609020204030204" pitchFamily="49" charset="0"/>
+                <a:cs typeface="Consolas" panose="020B0609020204030204" pitchFamily="49" charset="0"/>
+              </a:rPr>
+              <a:t>public</a:t>
+            </a:r>
+            <a:r>
+              <a:rPr lang="en-US" dirty="0">
+                <a:latin typeface="Consolas" panose="020B0609020204030204" pitchFamily="49" charset="0"/>
+                <a:cs typeface="Consolas" panose="020B0609020204030204" pitchFamily="49" charset="0"/>
+              </a:rPr>
+              <a:t> </a:t>
+            </a:r>
+            <a:r>
+              <a:rPr lang="en-US" dirty="0" err="1">
+                <a:latin typeface="Consolas" panose="020B0609020204030204" pitchFamily="49" charset="0"/>
+                <a:cs typeface="Consolas" panose="020B0609020204030204" pitchFamily="49" charset="0"/>
+              </a:rPr>
+              <a:t>logic_error</a:t>
+            </a:r>
+            <a:r>
+              <a:rPr lang="en-US" dirty="0">
+                <a:latin typeface="Consolas" panose="020B0609020204030204" pitchFamily="49" charset="0"/>
+                <a:cs typeface="Consolas" panose="020B0609020204030204" pitchFamily="49" charset="0"/>
+              </a:rPr>
+              <a:t> { … };</a:t>
+            </a:r>
+          </a:p>
+          <a:p>
+            <a:r>
+              <a:rPr lang="en-US" dirty="0">
+                <a:latin typeface="Consolas" panose="020B0609020204030204" pitchFamily="49" charset="0"/>
+                <a:cs typeface="Consolas" panose="020B0609020204030204" pitchFamily="49" charset="0"/>
+              </a:rPr>
+              <a:t>    </a:t>
+            </a:r>
+            <a:r>
+              <a:rPr lang="en-US" b="1" dirty="0">
+                <a:latin typeface="Consolas" panose="020B0609020204030204" pitchFamily="49" charset="0"/>
+                <a:cs typeface="Consolas" panose="020B0609020204030204" pitchFamily="49" charset="0"/>
+              </a:rPr>
+              <a:t>class</a:t>
+            </a:r>
+            <a:r>
+              <a:rPr lang="en-US" dirty="0">
+                <a:latin typeface="Consolas" panose="020B0609020204030204" pitchFamily="49" charset="0"/>
+                <a:cs typeface="Consolas" panose="020B0609020204030204" pitchFamily="49" charset="0"/>
+              </a:rPr>
+              <a:t> </a:t>
+            </a:r>
+            <a:r>
+              <a:rPr lang="en-US" dirty="0" err="1">
+                <a:latin typeface="Consolas" panose="020B0609020204030204" pitchFamily="49" charset="0"/>
+                <a:cs typeface="Consolas" panose="020B0609020204030204" pitchFamily="49" charset="0"/>
+              </a:rPr>
+              <a:t>runtime_error</a:t>
+            </a:r>
+            <a:r>
+              <a:rPr lang="en-US" dirty="0">
+                <a:latin typeface="Consolas" panose="020B0609020204030204" pitchFamily="49" charset="0"/>
+                <a:cs typeface="Consolas" panose="020B0609020204030204" pitchFamily="49" charset="0"/>
+              </a:rPr>
+              <a:t>        : </a:t>
+            </a:r>
+            <a:r>
+              <a:rPr lang="en-US" b="1" dirty="0">
+                <a:latin typeface="Consolas" panose="020B0609020204030204" pitchFamily="49" charset="0"/>
+                <a:cs typeface="Consolas" panose="020B0609020204030204" pitchFamily="49" charset="0"/>
+              </a:rPr>
+              <a:t>public</a:t>
+            </a:r>
+            <a:r>
+              <a:rPr lang="en-US" dirty="0">
+                <a:latin typeface="Consolas" panose="020B0609020204030204" pitchFamily="49" charset="0"/>
+                <a:cs typeface="Consolas" panose="020B0609020204030204" pitchFamily="49" charset="0"/>
+              </a:rPr>
+              <a:t> exception { … };</a:t>
+            </a:r>
+          </a:p>
+          <a:p>
+            <a:r>
+              <a:rPr lang="en-US" dirty="0">
+                <a:latin typeface="Consolas" panose="020B0609020204030204" pitchFamily="49" charset="0"/>
+                <a:cs typeface="Consolas" panose="020B0609020204030204" pitchFamily="49" charset="0"/>
+              </a:rPr>
+              <a:t>        </a:t>
+            </a:r>
+            <a:r>
+              <a:rPr lang="en-US" b="1" dirty="0">
+                <a:latin typeface="Consolas" panose="020B0609020204030204" pitchFamily="49" charset="0"/>
+                <a:cs typeface="Consolas" panose="020B0609020204030204" pitchFamily="49" charset="0"/>
+              </a:rPr>
+              <a:t>class</a:t>
+            </a:r>
+            <a:r>
+              <a:rPr lang="en-US" dirty="0">
+                <a:latin typeface="Consolas" panose="020B0609020204030204" pitchFamily="49" charset="0"/>
+                <a:cs typeface="Consolas" panose="020B0609020204030204" pitchFamily="49" charset="0"/>
+              </a:rPr>
+              <a:t> </a:t>
+            </a:r>
+            <a:r>
+              <a:rPr lang="en-US" dirty="0" err="1">
+                <a:latin typeface="Consolas" panose="020B0609020204030204" pitchFamily="49" charset="0"/>
+                <a:cs typeface="Consolas" panose="020B0609020204030204" pitchFamily="49" charset="0"/>
+              </a:rPr>
+              <a:t>range_error</a:t>
+            </a:r>
+            <a:r>
+              <a:rPr lang="en-US" dirty="0">
+                <a:latin typeface="Consolas" panose="020B0609020204030204" pitchFamily="49" charset="0"/>
+                <a:cs typeface="Consolas" panose="020B0609020204030204" pitchFamily="49" charset="0"/>
+              </a:rPr>
+              <a:t>.     : </a:t>
+            </a:r>
+            <a:r>
+              <a:rPr lang="en-US" b="1" dirty="0">
+                <a:latin typeface="Consolas" panose="020B0609020204030204" pitchFamily="49" charset="0"/>
+                <a:cs typeface="Consolas" panose="020B0609020204030204" pitchFamily="49" charset="0"/>
+              </a:rPr>
+              <a:t>public</a:t>
+            </a:r>
+            <a:r>
+              <a:rPr lang="en-US" dirty="0">
+                <a:latin typeface="Consolas" panose="020B0609020204030204" pitchFamily="49" charset="0"/>
+                <a:cs typeface="Consolas" panose="020B0609020204030204" pitchFamily="49" charset="0"/>
+              </a:rPr>
+              <a:t> </a:t>
+            </a:r>
+            <a:r>
+              <a:rPr lang="en-US" dirty="0" err="1">
+                <a:latin typeface="Consolas" panose="020B0609020204030204" pitchFamily="49" charset="0"/>
+                <a:cs typeface="Consolas" panose="020B0609020204030204" pitchFamily="49" charset="0"/>
+              </a:rPr>
+              <a:t>runtime_error</a:t>
+            </a:r>
+            <a:r>
+              <a:rPr lang="en-US" dirty="0">
+                <a:latin typeface="Consolas" panose="020B0609020204030204" pitchFamily="49" charset="0"/>
+                <a:cs typeface="Consolas" panose="020B0609020204030204" pitchFamily="49" charset="0"/>
+              </a:rPr>
+              <a:t> { … };</a:t>
+            </a:r>
+          </a:p>
+          <a:p>
+            <a:r>
+              <a:rPr lang="en-US" dirty="0">
+                <a:latin typeface="Consolas" panose="020B0609020204030204" pitchFamily="49" charset="0"/>
+                <a:cs typeface="Consolas" panose="020B0609020204030204" pitchFamily="49" charset="0"/>
+              </a:rPr>
+              <a:t>        </a:t>
+            </a:r>
+            <a:r>
+              <a:rPr lang="en-US" b="1" dirty="0">
+                <a:latin typeface="Consolas" panose="020B0609020204030204" pitchFamily="49" charset="0"/>
+                <a:cs typeface="Consolas" panose="020B0609020204030204" pitchFamily="49" charset="0"/>
+              </a:rPr>
+              <a:t>class</a:t>
+            </a:r>
+            <a:r>
+              <a:rPr lang="en-US" dirty="0">
+                <a:latin typeface="Consolas" panose="020B0609020204030204" pitchFamily="49" charset="0"/>
+                <a:cs typeface="Consolas" panose="020B0609020204030204" pitchFamily="49" charset="0"/>
+              </a:rPr>
+              <a:t> </a:t>
+            </a:r>
+            <a:r>
+              <a:rPr lang="en-US" dirty="0" err="1">
+                <a:latin typeface="Consolas" panose="020B0609020204030204" pitchFamily="49" charset="0"/>
+                <a:cs typeface="Consolas" panose="020B0609020204030204" pitchFamily="49" charset="0"/>
+              </a:rPr>
+              <a:t>overflow_error</a:t>
+            </a:r>
+            <a:r>
+              <a:rPr lang="en-US" dirty="0">
+                <a:latin typeface="Consolas" panose="020B0609020204030204" pitchFamily="49" charset="0"/>
+                <a:cs typeface="Consolas" panose="020B0609020204030204" pitchFamily="49" charset="0"/>
+              </a:rPr>
+              <a:t>   : </a:t>
+            </a:r>
+            <a:r>
+              <a:rPr lang="en-US" b="1" dirty="0">
+                <a:latin typeface="Consolas" panose="020B0609020204030204" pitchFamily="49" charset="0"/>
+                <a:cs typeface="Consolas" panose="020B0609020204030204" pitchFamily="49" charset="0"/>
+              </a:rPr>
+              <a:t>public</a:t>
+            </a:r>
+            <a:r>
+              <a:rPr lang="en-US" dirty="0">
+                <a:latin typeface="Consolas" panose="020B0609020204030204" pitchFamily="49" charset="0"/>
+                <a:cs typeface="Consolas" panose="020B0609020204030204" pitchFamily="49" charset="0"/>
+              </a:rPr>
+              <a:t> </a:t>
+            </a:r>
+            <a:r>
+              <a:rPr lang="en-US" dirty="0" err="1">
+                <a:latin typeface="Consolas" panose="020B0609020204030204" pitchFamily="49" charset="0"/>
+                <a:cs typeface="Consolas" panose="020B0609020204030204" pitchFamily="49" charset="0"/>
+              </a:rPr>
+              <a:t>runtime_error</a:t>
+            </a:r>
+            <a:r>
+              <a:rPr lang="en-US" dirty="0">
+                <a:latin typeface="Consolas" panose="020B0609020204030204" pitchFamily="49" charset="0"/>
+                <a:cs typeface="Consolas" panose="020B0609020204030204" pitchFamily="49" charset="0"/>
+              </a:rPr>
+              <a:t> { … };</a:t>
+            </a:r>
+          </a:p>
+          <a:p>
+            <a:r>
+              <a:rPr lang="en-US" dirty="0">
+                <a:latin typeface="Consolas" panose="020B0609020204030204" pitchFamily="49" charset="0"/>
+                <a:cs typeface="Consolas" panose="020B0609020204030204" pitchFamily="49" charset="0"/>
+              </a:rPr>
+              <a:t>        </a:t>
+            </a:r>
+            <a:r>
+              <a:rPr lang="en-US" b="1" dirty="0">
+                <a:latin typeface="Consolas" panose="020B0609020204030204" pitchFamily="49" charset="0"/>
+                <a:cs typeface="Consolas" panose="020B0609020204030204" pitchFamily="49" charset="0"/>
+              </a:rPr>
+              <a:t>class</a:t>
+            </a:r>
+            <a:r>
+              <a:rPr lang="en-US" dirty="0">
+                <a:latin typeface="Consolas" panose="020B0609020204030204" pitchFamily="49" charset="0"/>
+                <a:cs typeface="Consolas" panose="020B0609020204030204" pitchFamily="49" charset="0"/>
+              </a:rPr>
+              <a:t> </a:t>
+            </a:r>
+            <a:r>
+              <a:rPr lang="en-US" dirty="0" err="1">
+                <a:latin typeface="Consolas" panose="020B0609020204030204" pitchFamily="49" charset="0"/>
+                <a:cs typeface="Consolas" panose="020B0609020204030204" pitchFamily="49" charset="0"/>
+              </a:rPr>
+              <a:t>underflow_error</a:t>
+            </a:r>
+            <a:r>
+              <a:rPr lang="en-US" dirty="0">
+                <a:latin typeface="Consolas" panose="020B0609020204030204" pitchFamily="49" charset="0"/>
+                <a:cs typeface="Consolas" panose="020B0609020204030204" pitchFamily="49" charset="0"/>
+              </a:rPr>
+              <a:t>  : </a:t>
+            </a:r>
+            <a:r>
+              <a:rPr lang="en-US" b="1" dirty="0">
+                <a:latin typeface="Consolas" panose="020B0609020204030204" pitchFamily="49" charset="0"/>
+                <a:cs typeface="Consolas" panose="020B0609020204030204" pitchFamily="49" charset="0"/>
+              </a:rPr>
+              <a:t>public</a:t>
+            </a:r>
+            <a:r>
+              <a:rPr lang="en-US" dirty="0">
+                <a:latin typeface="Consolas" panose="020B0609020204030204" pitchFamily="49" charset="0"/>
+                <a:cs typeface="Consolas" panose="020B0609020204030204" pitchFamily="49" charset="0"/>
+              </a:rPr>
+              <a:t> </a:t>
+            </a:r>
+            <a:r>
+              <a:rPr lang="en-US" dirty="0" err="1">
+                <a:latin typeface="Consolas" panose="020B0609020204030204" pitchFamily="49" charset="0"/>
+                <a:cs typeface="Consolas" panose="020B0609020204030204" pitchFamily="49" charset="0"/>
+              </a:rPr>
+              <a:t>runtime_error</a:t>
+            </a:r>
+            <a:r>
+              <a:rPr lang="en-US" dirty="0">
+                <a:latin typeface="Consolas" panose="020B0609020204030204" pitchFamily="49" charset="0"/>
+                <a:cs typeface="Consolas" panose="020B0609020204030204" pitchFamily="49" charset="0"/>
+              </a:rPr>
+              <a:t> { … };</a:t>
+            </a:r>
+          </a:p>
+          <a:p>
+            <a:r>
+              <a:rPr lang="en-US" dirty="0">
+                <a:latin typeface="Consolas" panose="020B0609020204030204" pitchFamily="49" charset="0"/>
+                <a:cs typeface="Consolas" panose="020B0609020204030204" pitchFamily="49" charset="0"/>
+              </a:rPr>
+              <a:t>}</a:t>
             </a:r>
           </a:p>
         </p:txBody>
@@ -6840,7 +7504,7 @@
           <p:cNvPr id="2" name="Title 1">
             <a:extLst>
               <a:ext uri="{FF2B5EF4-FFF2-40B4-BE49-F238E27FC236}">
-                <a16:creationId xmlns:a16="http://schemas.microsoft.com/office/drawing/2014/main" id="{F3082411-E9A4-A944-9340-9F466602DD0D}"/>
+                <a16:creationId xmlns:a16="http://schemas.microsoft.com/office/drawing/2014/main" id="{67EE6AEE-94F2-12B2-2ABC-A5BF855D14DD}"/>
               </a:ext>
             </a:extLst>
           </p:cNvPr>
@@ -6858,7 +7522,7 @@
           <a:p>
             <a:r>
               <a:rPr lang="en-US" dirty="0"/>
-              <a:t>Exception Specifications?</a:t>
+              <a:t>What?</a:t>
             </a:r>
           </a:p>
         </p:txBody>
@@ -6868,7 +7532,7 @@
           <p:cNvPr id="3" name="Content Placeholder 2">
             <a:extLst>
               <a:ext uri="{FF2B5EF4-FFF2-40B4-BE49-F238E27FC236}">
-                <a16:creationId xmlns:a16="http://schemas.microsoft.com/office/drawing/2014/main" id="{CBEB03E1-7F52-5E2A-265E-2B14FA91C142}"/>
+                <a16:creationId xmlns:a16="http://schemas.microsoft.com/office/drawing/2014/main" id="{5E8AB477-0FC1-D356-87E7-AEA3F8751ADC}"/>
               </a:ext>
             </a:extLst>
           </p:cNvPr>
@@ -6886,41 +7550,54 @@
           <a:p>
             <a:r>
               <a:rPr lang="en-US" dirty="0"/>
-              <a:t>Java allows you to declare which exceptions a method might throw</a:t>
-            </a:r>
-          </a:p>
-          <a:p>
-            <a:pPr lvl="1"/>
-            <a:r>
-              <a:rPr lang="en-US" dirty="0"/>
-              <a:t>Compiler verifies (statically) that all declared exceptions of called methods are either handled or declared to be thrown</a:t>
-            </a:r>
-          </a:p>
-          <a:p>
-            <a:pPr lvl="1"/>
-            <a:r>
-              <a:rPr lang="en-US" dirty="0"/>
-              <a:t>The idea was to ensure that no exceptions will go unnoticed/unhandled</a:t>
-            </a:r>
-          </a:p>
-          <a:p>
-            <a:r>
-              <a:rPr lang="en-US" dirty="0"/>
-              <a:t>Problems:</a:t>
-            </a:r>
-          </a:p>
-          <a:p>
-            <a:pPr lvl="1"/>
-            <a:r>
-              <a:rPr lang="en-US" dirty="0"/>
-              <a:t>Not all exceptions are “checked”, and they can be thrown even without the specification. Thus, the feature doesn’t really guarantee that there are no unhandled exceptions</a:t>
-            </a:r>
-          </a:p>
-          <a:p>
-            <a:pPr lvl="1"/>
-            <a:r>
-              <a:rPr lang="en-US" dirty="0"/>
-              <a:t>Sometimes, because of the logic of your program, you know an exception won’t be thrown, yet you are forced to handle an exception that can’t happen or declare that you will throw an exception you never will</a:t>
+              <a:t>All the standard exception classes have a constructor taking a reference to a </a:t>
+            </a:r>
+            <a:r>
+              <a:rPr lang="en-US" dirty="0">
+                <a:latin typeface="Consolas" panose="020B0609020204030204" pitchFamily="49" charset="0"/>
+                <a:cs typeface="Consolas" panose="020B0609020204030204" pitchFamily="49" charset="0"/>
+              </a:rPr>
+              <a:t>const std::string</a:t>
+            </a:r>
+          </a:p>
+          <a:p>
+            <a:r>
+              <a:rPr lang="en-US" dirty="0"/>
+              <a:t>All the standard exception classes have a </a:t>
+            </a:r>
+            <a:r>
+              <a:rPr lang="en-US" dirty="0">
+                <a:latin typeface="Consolas" panose="020B0609020204030204" pitchFamily="49" charset="0"/>
+                <a:cs typeface="Consolas" panose="020B0609020204030204" pitchFamily="49" charset="0"/>
+              </a:rPr>
+              <a:t>what</a:t>
+            </a:r>
+            <a:r>
+              <a:rPr lang="en-US" dirty="0"/>
+              <a:t> method that returns that string (as a </a:t>
+            </a:r>
+            <a:r>
+              <a:rPr lang="en-US" dirty="0">
+                <a:latin typeface="Consolas" panose="020B0609020204030204" pitchFamily="49" charset="0"/>
+                <a:cs typeface="Consolas" panose="020B0609020204030204" pitchFamily="49" charset="0"/>
+              </a:rPr>
+              <a:t>const char *</a:t>
+            </a:r>
+            <a:r>
+              <a:rPr lang="en-US" dirty="0"/>
+              <a:t>)</a:t>
+            </a:r>
+          </a:p>
+          <a:p>
+            <a:r>
+              <a:rPr lang="en-US" dirty="0"/>
+              <a:t>The intent is for this string to contain a (potentially) human-readable message describing the exception</a:t>
+            </a:r>
+          </a:p>
+          <a:p>
+            <a:r>
+              <a:rPr lang="en-US" dirty="0"/>
+              <a:t>It could also be used to encode other information if desired</a:t>
             </a:r>
           </a:p>
         </p:txBody>
@@ -6928,7 +7605,7 @@
     </p:spTree>
     <p:extLst>
       <p:ext uri="{BB962C8B-B14F-4D97-AF65-F5344CB8AC3E}">
-        <p14:creationId xmlns:p14="http://schemas.microsoft.com/office/powerpoint/2010/main" val="3373807689"/>
+        <p14:creationId xmlns:p14="http://schemas.microsoft.com/office/powerpoint/2010/main" val="3490196241"/>
       </p:ext>
     </p:extLst>
   </p:cSld>
@@ -6960,7 +7637,7 @@
           <p:cNvPr id="2" name="Title 1">
             <a:extLst>
               <a:ext uri="{FF2B5EF4-FFF2-40B4-BE49-F238E27FC236}">
-                <a16:creationId xmlns:a16="http://schemas.microsoft.com/office/drawing/2014/main" id="{25ADA2E5-7568-619E-F965-5BA607C6A47B}"/>
+                <a16:creationId xmlns:a16="http://schemas.microsoft.com/office/drawing/2014/main" id="{761DF6A5-483D-0AA0-40B4-C1616F9CE33F}"/>
               </a:ext>
             </a:extLst>
           </p:cNvPr>
@@ -6978,7 +7655,7 @@
           <a:p>
             <a:r>
               <a:rPr lang="en-US" dirty="0"/>
-              <a:t>Controversial</a:t>
+              <a:t>Logic vs Runtime</a:t>
             </a:r>
           </a:p>
         </p:txBody>
@@ -6988,7 +7665,7 @@
           <p:cNvPr id="3" name="Content Placeholder 2">
             <a:extLst>
               <a:ext uri="{FF2B5EF4-FFF2-40B4-BE49-F238E27FC236}">
-                <a16:creationId xmlns:a16="http://schemas.microsoft.com/office/drawing/2014/main" id="{87EA975E-9082-E358-9B6D-012D4A36C1BF}"/>
+                <a16:creationId xmlns:a16="http://schemas.microsoft.com/office/drawing/2014/main" id="{2FBC4B14-9879-AA98-CCE7-B80C004E002A}"/>
               </a:ext>
             </a:extLst>
           </p:cNvPr>
@@ -7006,41 +7683,51 @@
           <a:p>
             <a:r>
               <a:rPr lang="en-US" dirty="0"/>
-              <a:t>For the reasons stated earlier, Java exception specifications are controversial</a:t>
+              <a:t>A </a:t>
+            </a:r>
+            <a:r>
+              <a:rPr lang="en-US" i="1" dirty="0"/>
+              <a:t>logic error</a:t>
+            </a:r>
+            <a:r>
+              <a:rPr lang="en-US" dirty="0"/>
+              <a:t> is an error in the program itself. In theory they can be prevented by the programmer.</a:t>
             </a:r>
           </a:p>
           <a:p>
             <a:pPr lvl="1"/>
             <a:r>
               <a:rPr lang="en-US" dirty="0"/>
-              <a:t>Some believe they are a mistake in the design of Java</a:t>
+              <a:t>In other words, </a:t>
+            </a:r>
+            <a:r>
+              <a:rPr lang="en-US" u="sng" dirty="0"/>
+              <a:t>a logic error is a program bug</a:t>
+            </a:r>
+            <a:r>
+              <a:rPr lang="en-US" dirty="0"/>
+              <a:t> that was detected by the program as it runs</a:t>
+            </a:r>
+          </a:p>
+          <a:p>
+            <a:r>
+              <a:rPr lang="en-US" dirty="0"/>
+              <a:t>A </a:t>
+            </a:r>
+            <a:r>
+              <a:rPr lang="en-US" i="1" dirty="0"/>
+              <a:t>runtime error</a:t>
+            </a:r>
+            <a:r>
+              <a:rPr lang="en-US" dirty="0"/>
+              <a:t> is an error that arises from the environment in which the program executes. It is not the program’s fault.</a:t>
             </a:r>
           </a:p>
           <a:p>
             <a:pPr lvl="1"/>
             <a:r>
               <a:rPr lang="en-US" dirty="0"/>
-              <a:t>Some believe they are useful tools to help make more reliable programs</a:t>
-            </a:r>
-          </a:p>
-          <a:p>
-            <a:pPr lvl="1"/>
-            <a:r>
-              <a:rPr lang="en-US" dirty="0"/>
-              <a:t>Perhaps both are right?</a:t>
-            </a:r>
-          </a:p>
-          <a:p>
-            <a:r>
-              <a:rPr lang="en-US" dirty="0"/>
-              <a:t>Most modern languages do not have exception specifications</a:t>
-            </a:r>
-          </a:p>
-          <a:p>
-            <a:pPr lvl="1"/>
-            <a:r>
-              <a:rPr lang="en-US" dirty="0"/>
-              <a:t>For example, Scala does not, despite targeting the JVM</a:t>
+              <a:t>It could be argued that runtime errors should not be reported as exceptions at all, but if the error is obscure enough it might still make sense to use an exception</a:t>
             </a:r>
           </a:p>
         </p:txBody>
@@ -7048,7 +7735,7 @@
     </p:spTree>
     <p:extLst>
       <p:ext uri="{BB962C8B-B14F-4D97-AF65-F5344CB8AC3E}">
-        <p14:creationId xmlns:p14="http://schemas.microsoft.com/office/powerpoint/2010/main" val="3290453476"/>
+        <p14:creationId xmlns:p14="http://schemas.microsoft.com/office/powerpoint/2010/main" val="1416766983"/>
       </p:ext>
     </p:extLst>
   </p:cSld>
@@ -7080,7 +7767,7 @@
           <p:cNvPr id="2" name="Title 1">
             <a:extLst>
               <a:ext uri="{FF2B5EF4-FFF2-40B4-BE49-F238E27FC236}">
-                <a16:creationId xmlns:a16="http://schemas.microsoft.com/office/drawing/2014/main" id="{B8019375-DAD6-BCBC-80AA-65E97AEC3A53}"/>
+                <a16:creationId xmlns:a16="http://schemas.microsoft.com/office/drawing/2014/main" id="{CF4CC0F6-6072-72DE-D93F-B01A274A38A1}"/>
               </a:ext>
             </a:extLst>
           </p:cNvPr>
@@ -7098,7 +7785,7 @@
           <a:p>
             <a:r>
               <a:rPr lang="en-US" dirty="0"/>
-              <a:t>What about C++?</a:t>
+              <a:t>Logic Errors</a:t>
             </a:r>
           </a:p>
         </p:txBody>
@@ -7108,7 +7795,7 @@
           <p:cNvPr id="3" name="Content Placeholder 2">
             <a:extLst>
               <a:ext uri="{FF2B5EF4-FFF2-40B4-BE49-F238E27FC236}">
-                <a16:creationId xmlns:a16="http://schemas.microsoft.com/office/drawing/2014/main" id="{EFF45E84-AB08-BEEE-99B4-82B4BA8B5DAE}"/>
+                <a16:creationId xmlns:a16="http://schemas.microsoft.com/office/drawing/2014/main" id="{CC3AB8A8-803F-1AF8-35E6-C78517789CD2}"/>
               </a:ext>
             </a:extLst>
           </p:cNvPr>
@@ -7121,81 +7808,131 @@
         </p:nvSpPr>
         <p:spPr/>
         <p:txBody>
-          <a:bodyPr/>
-          <a:lstStyle/>
-          <a:p>
-            <a:r>
-              <a:rPr lang="en-US" dirty="0"/>
-              <a:t>C++ 1998 had a form of exception specifications</a:t>
-            </a:r>
-          </a:p>
-          <a:p>
-            <a:r>
-              <a:rPr lang="en-US" dirty="0"/>
-              <a:t>It was even more controversial than Java’s</a:t>
-            </a:r>
+          <a:bodyPr>
+            <a:normAutofit lnSpcReduction="10000"/>
+          </a:bodyPr>
+          <a:lstStyle/>
+          <a:p>
+            <a:r>
+              <a:rPr lang="en-US" dirty="0" err="1">
+                <a:latin typeface="Consolas" panose="020B0609020204030204" pitchFamily="49" charset="0"/>
+                <a:cs typeface="Consolas" panose="020B0609020204030204" pitchFamily="49" charset="0"/>
+              </a:rPr>
+              <a:t>domain_error</a:t>
+            </a:r>
+            <a:endParaRPr lang="en-US" dirty="0">
+              <a:latin typeface="Consolas" panose="020B0609020204030204" pitchFamily="49" charset="0"/>
+              <a:cs typeface="Consolas" panose="020B0609020204030204" pitchFamily="49" charset="0"/>
+            </a:endParaRPr>
           </a:p>
           <a:p>
             <a:pPr lvl="1"/>
             <a:r>
               <a:rPr lang="en-US" dirty="0"/>
-              <a:t>It did not provide much help with creating more reliable programs</a:t>
-            </a:r>
+              <a:t>An argument to a function is outside the function’s domain (e.g., negative values to a square root function)</a:t>
+            </a:r>
+          </a:p>
+          <a:p>
+            <a:r>
+              <a:rPr lang="en-US" dirty="0" err="1">
+                <a:latin typeface="Consolas" panose="020B0609020204030204" pitchFamily="49" charset="0"/>
+                <a:cs typeface="Consolas" panose="020B0609020204030204" pitchFamily="49" charset="0"/>
+              </a:rPr>
+              <a:t>invalid_argument</a:t>
+            </a:r>
+            <a:endParaRPr lang="en-US" dirty="0">
+              <a:latin typeface="Consolas" panose="020B0609020204030204" pitchFamily="49" charset="0"/>
+              <a:cs typeface="Consolas" panose="020B0609020204030204" pitchFamily="49" charset="0"/>
+            </a:endParaRPr>
           </a:p>
           <a:p>
             <a:pPr lvl="1"/>
             <a:r>
               <a:rPr lang="en-US" dirty="0"/>
-              <a:t>C++ needed to be compatible with legacy (pre-1998) code and with C, which limited the design options for exception specifications</a:t>
-            </a:r>
-          </a:p>
-          <a:p>
-            <a:r>
-              <a:rPr lang="en-US" dirty="0"/>
-              <a:t>It basically didn’t work and caused more problems than it solved</a:t>
-            </a:r>
-          </a:p>
-          <a:p>
-            <a:r>
-              <a:rPr lang="en-US" dirty="0"/>
-              <a:t>A “best practice” quickly arrived: </a:t>
-            </a:r>
-            <a:r>
-              <a:rPr lang="en-US" i="1" u="sng" dirty="0"/>
-              <a:t>Don’t Use Exception Specifications</a:t>
-            </a:r>
-            <a:r>
-              <a:rPr lang="en-US" dirty="0"/>
-              <a:t>!</a:t>
-            </a:r>
-          </a:p>
-          <a:p>
-            <a:r>
-              <a:rPr lang="en-US" dirty="0"/>
-              <a:t>Deprecated in C++ 2011. Completely removed in C++ 2017</a:t>
-            </a:r>
+              <a:t>An argument to a function is invalid. Similar to </a:t>
+            </a:r>
+            <a:r>
+              <a:rPr lang="en-US" dirty="0" err="1">
+                <a:latin typeface="Consolas" panose="020B0609020204030204" pitchFamily="49" charset="0"/>
+                <a:cs typeface="Consolas" panose="020B0609020204030204" pitchFamily="49" charset="0"/>
+              </a:rPr>
+              <a:t>domain_error</a:t>
+            </a:r>
+            <a:r>
+              <a:rPr lang="en-US" dirty="0"/>
+              <a:t>, except used for non-mathematical functions (e.g., bad string format)</a:t>
+            </a:r>
+          </a:p>
+          <a:p>
+            <a:r>
+              <a:rPr lang="en-US" dirty="0" err="1">
+                <a:latin typeface="Consolas" panose="020B0609020204030204" pitchFamily="49" charset="0"/>
+                <a:cs typeface="Consolas" panose="020B0609020204030204" pitchFamily="49" charset="0"/>
+              </a:rPr>
+              <a:t>length_error</a:t>
+            </a:r>
+            <a:endParaRPr lang="en-US" dirty="0">
+              <a:latin typeface="Consolas" panose="020B0609020204030204" pitchFamily="49" charset="0"/>
+              <a:cs typeface="Consolas" panose="020B0609020204030204" pitchFamily="49" charset="0"/>
+            </a:endParaRPr>
           </a:p>
           <a:p>
             <a:pPr lvl="1"/>
             <a:r>
-              <a:rPr lang="en-US" dirty="0"/>
-              <a:t>A rare case of the language actually getting </a:t>
-            </a:r>
-            <a:r>
-              <a:rPr lang="en-US" i="1" dirty="0"/>
-              <a:t>smaller</a:t>
-            </a:r>
-            <a:r>
-              <a:rPr lang="en-US" dirty="0"/>
-              <a:t>! (*gasp*)</a:t>
-            </a:r>
+              <a:rPr lang="en-US" dirty="0">
+                <a:effectLst/>
+              </a:rPr>
+              <a:t>To “report an attempt to produce an</a:t>
+            </a:r>
+            <a:r>
+              <a:rPr lang="en-US" dirty="0"/>
+              <a:t> </a:t>
+            </a:r>
+            <a:r>
+              <a:rPr lang="en-US" dirty="0">
+                <a:effectLst/>
+              </a:rPr>
+              <a:t>object whose length exceeds its maximum allowable size.”</a:t>
+            </a:r>
+          </a:p>
+          <a:p>
+            <a:r>
+              <a:rPr lang="en-US" dirty="0" err="1">
+                <a:latin typeface="Consolas" panose="020B0609020204030204" pitchFamily="49" charset="0"/>
+                <a:cs typeface="Consolas" panose="020B0609020204030204" pitchFamily="49" charset="0"/>
+              </a:rPr>
+              <a:t>out_of_range</a:t>
+            </a:r>
+            <a:endParaRPr lang="en-US" dirty="0">
+              <a:latin typeface="Consolas" panose="020B0609020204030204" pitchFamily="49" charset="0"/>
+              <a:cs typeface="Consolas" panose="020B0609020204030204" pitchFamily="49" charset="0"/>
+            </a:endParaRPr>
+          </a:p>
+          <a:p>
+            <a:pPr lvl="1"/>
+            <a:r>
+              <a:rPr lang="en-US" dirty="0">
+                <a:effectLst/>
+              </a:rPr>
+              <a:t>To “report an argument value not in its expected range.”</a:t>
+            </a:r>
+          </a:p>
+          <a:p>
+            <a:pPr lvl="1"/>
+            <a:endParaRPr lang="en-US" dirty="0">
+              <a:effectLst/>
+            </a:endParaRPr>
+          </a:p>
+          <a:p>
+            <a:pPr lvl="1"/>
+            <a:endParaRPr lang="en-US" dirty="0"/>
           </a:p>
         </p:txBody>
       </p:sp>
     </p:spTree>
     <p:extLst>
       <p:ext uri="{BB962C8B-B14F-4D97-AF65-F5344CB8AC3E}">
-        <p14:creationId xmlns:p14="http://schemas.microsoft.com/office/powerpoint/2010/main" val="3452763118"/>
+        <p14:creationId xmlns:p14="http://schemas.microsoft.com/office/powerpoint/2010/main" val="2852456796"/>
       </p:ext>
     </p:extLst>
   </p:cSld>
@@ -7227,7 +7964,7 @@
           <p:cNvPr id="2" name="Title 1">
             <a:extLst>
               <a:ext uri="{FF2B5EF4-FFF2-40B4-BE49-F238E27FC236}">
-                <a16:creationId xmlns:a16="http://schemas.microsoft.com/office/drawing/2014/main" id="{8CC41B8A-F35B-9096-644F-DF5B8791DE9B}"/>
+                <a16:creationId xmlns:a16="http://schemas.microsoft.com/office/drawing/2014/main" id="{6F03634E-7F79-BE26-D121-998656263F40}"/>
               </a:ext>
             </a:extLst>
           </p:cNvPr>
@@ -7245,7 +7982,7 @@
           <a:p>
             <a:r>
               <a:rPr lang="en-US" dirty="0"/>
-              <a:t>With One Exception…</a:t>
+              <a:t>Runtime Errors</a:t>
             </a:r>
           </a:p>
         </p:txBody>
@@ -7255,7 +7992,7 @@
           <p:cNvPr id="3" name="Content Placeholder 2">
             <a:extLst>
               <a:ext uri="{FF2B5EF4-FFF2-40B4-BE49-F238E27FC236}">
-                <a16:creationId xmlns:a16="http://schemas.microsoft.com/office/drawing/2014/main" id="{DF8D7988-21E5-0F26-47A6-67632E22D0C7}"/>
+                <a16:creationId xmlns:a16="http://schemas.microsoft.com/office/drawing/2014/main" id="{318B720A-2D10-E151-114C-27A66EF416FF}"/>
               </a:ext>
             </a:extLst>
           </p:cNvPr>
@@ -7268,20 +8005,671 @@
         </p:nvSpPr>
         <p:spPr/>
         <p:txBody>
-          <a:bodyPr/>
-          <a:lstStyle/>
-          <a:p>
-            <a:r>
-              <a:rPr lang="en-US" i="1" dirty="0"/>
-              <a:t>Finish Me!</a:t>
-            </a:r>
+          <a:bodyPr>
+            <a:normAutofit/>
+          </a:bodyPr>
+          <a:lstStyle/>
+          <a:p>
+            <a:r>
+              <a:rPr lang="en-US" dirty="0" err="1">
+                <a:latin typeface="Consolas" panose="020B0609020204030204" pitchFamily="49" charset="0"/>
+                <a:cs typeface="Consolas" panose="020B0609020204030204" pitchFamily="49" charset="0"/>
+              </a:rPr>
+              <a:t>range_error</a:t>
+            </a:r>
+            <a:endParaRPr lang="en-US" dirty="0">
+              <a:latin typeface="Consolas" panose="020B0609020204030204" pitchFamily="49" charset="0"/>
+              <a:cs typeface="Consolas" panose="020B0609020204030204" pitchFamily="49" charset="0"/>
+            </a:endParaRPr>
+          </a:p>
+          <a:p>
+            <a:pPr lvl="1"/>
+            <a:r>
+              <a:rPr lang="en-US" dirty="0">
+                <a:effectLst/>
+              </a:rPr>
+              <a:t>To “report range errors in internal</a:t>
+            </a:r>
+            <a:r>
+              <a:rPr lang="en-US" dirty="0"/>
+              <a:t> </a:t>
+            </a:r>
+            <a:r>
+              <a:rPr lang="en-US" dirty="0">
+                <a:effectLst/>
+              </a:rPr>
+              <a:t>computations.” Here </a:t>
+            </a:r>
+            <a:r>
+              <a:rPr lang="en-US" i="1" dirty="0">
+                <a:effectLst/>
+              </a:rPr>
+              <a:t>range</a:t>
+            </a:r>
+            <a:r>
+              <a:rPr lang="en-US" dirty="0">
+                <a:effectLst/>
+              </a:rPr>
+              <a:t> is used in a set-theoretic way to mean the computed result of a function is not in the allowed set of possibilities, e.g., a string can’t be made with the right format</a:t>
+            </a:r>
+          </a:p>
+          <a:p>
+            <a:r>
+              <a:rPr lang="en-US" dirty="0" err="1">
+                <a:latin typeface="Consolas" panose="020B0609020204030204" pitchFamily="49" charset="0"/>
+                <a:cs typeface="Consolas" panose="020B0609020204030204" pitchFamily="49" charset="0"/>
+              </a:rPr>
+              <a:t>overflow_error</a:t>
+            </a:r>
+            <a:endParaRPr lang="en-US" dirty="0">
+              <a:latin typeface="Consolas" panose="020B0609020204030204" pitchFamily="49" charset="0"/>
+              <a:cs typeface="Consolas" panose="020B0609020204030204" pitchFamily="49" charset="0"/>
+            </a:endParaRPr>
+          </a:p>
+          <a:p>
+            <a:pPr lvl="1"/>
+            <a:r>
+              <a:rPr lang="en-US" dirty="0">
+                <a:effectLst/>
+              </a:rPr>
+              <a:t>To “report an arithmetic overflow</a:t>
+            </a:r>
+            <a:r>
+              <a:rPr lang="en-US" dirty="0"/>
+              <a:t> </a:t>
+            </a:r>
+            <a:r>
+              <a:rPr lang="en-US" dirty="0">
+                <a:effectLst/>
+              </a:rPr>
+              <a:t>error.” Although an arithmetic overflow is a kind of range error, this exception is intended to be used when numeric computations go beyond the allowed range of their type</a:t>
+            </a:r>
+          </a:p>
+          <a:p>
+            <a:r>
+              <a:rPr lang="en-US" dirty="0" err="1">
+                <a:latin typeface="Consolas" panose="020B0609020204030204" pitchFamily="49" charset="0"/>
+                <a:cs typeface="Consolas" panose="020B0609020204030204" pitchFamily="49" charset="0"/>
+              </a:rPr>
+              <a:t>underflow_error</a:t>
+            </a:r>
+            <a:endParaRPr lang="en-US" dirty="0">
+              <a:latin typeface="Consolas" panose="020B0609020204030204" pitchFamily="49" charset="0"/>
+              <a:cs typeface="Consolas" panose="020B0609020204030204" pitchFamily="49" charset="0"/>
+            </a:endParaRPr>
+          </a:p>
+          <a:p>
+            <a:pPr lvl="1"/>
+            <a:r>
+              <a:rPr lang="en-US" dirty="0"/>
+              <a:t>T</a:t>
+            </a:r>
+            <a:r>
+              <a:rPr lang="en-US" dirty="0">
+                <a:effectLst/>
+              </a:rPr>
+              <a:t>o “report an arithmetic underflow error.”</a:t>
+            </a:r>
+          </a:p>
+          <a:p>
+            <a:pPr lvl="1"/>
+            <a:endParaRPr lang="en-US" dirty="0">
+              <a:effectLst/>
+            </a:endParaRPr>
+          </a:p>
+          <a:p>
+            <a:pPr lvl="1"/>
+            <a:endParaRPr lang="en-US" dirty="0">
+              <a:effectLst/>
+            </a:endParaRPr>
+          </a:p>
+          <a:p>
+            <a:pPr lvl="1"/>
+            <a:endParaRPr lang="en-US" dirty="0"/>
           </a:p>
         </p:txBody>
       </p:sp>
     </p:spTree>
     <p:extLst>
       <p:ext uri="{BB962C8B-B14F-4D97-AF65-F5344CB8AC3E}">
-        <p14:creationId xmlns:p14="http://schemas.microsoft.com/office/powerpoint/2010/main" val="516076572"/>
+        <p14:creationId xmlns:p14="http://schemas.microsoft.com/office/powerpoint/2010/main" val="3746225915"/>
+      </p:ext>
+    </p:extLst>
+  </p:cSld>
+  <p:clrMapOvr>
+    <a:masterClrMapping/>
+  </p:clrMapOvr>
+</p:sld>
+</file>
+
+<file path=ppt/slides/slide28.xml><?xml version="1.0" encoding="utf-8"?>
+<p:sld xmlns:a="http://schemas.openxmlformats.org/drawingml/2006/main" xmlns:r="http://schemas.openxmlformats.org/officeDocument/2006/relationships" xmlns:p="http://schemas.openxmlformats.org/presentationml/2006/main">
+  <p:cSld>
+    <p:spTree>
+      <p:nvGrpSpPr>
+        <p:cNvPr id="1" name=""/>
+        <p:cNvGrpSpPr/>
+        <p:nvPr/>
+      </p:nvGrpSpPr>
+      <p:grpSpPr>
+        <a:xfrm>
+          <a:off x="0" y="0"/>
+          <a:ext cx="0" cy="0"/>
+          <a:chOff x="0" y="0"/>
+          <a:chExt cx="0" cy="0"/>
+        </a:xfrm>
+      </p:grpSpPr>
+      <p:sp>
+        <p:nvSpPr>
+          <p:cNvPr id="2" name="Title 1">
+            <a:extLst>
+              <a:ext uri="{FF2B5EF4-FFF2-40B4-BE49-F238E27FC236}">
+                <a16:creationId xmlns:a16="http://schemas.microsoft.com/office/drawing/2014/main" id="{7CA9107B-9A8F-291D-AF88-ADADF33ECD15}"/>
+              </a:ext>
+            </a:extLst>
+          </p:cNvPr>
+          <p:cNvSpPr>
+            <a:spLocks noGrp="1"/>
+          </p:cNvSpPr>
+          <p:nvPr>
+            <p:ph type="title"/>
+          </p:nvPr>
+        </p:nvSpPr>
+        <p:spPr/>
+        <p:txBody>
+          <a:bodyPr/>
+          <a:lstStyle/>
+          <a:p>
+            <a:r>
+              <a:rPr lang="en-US" dirty="0"/>
+              <a:t>Example</a:t>
+            </a:r>
+          </a:p>
+        </p:txBody>
+      </p:sp>
+      <p:sp>
+        <p:nvSpPr>
+          <p:cNvPr id="3" name="Content Placeholder 2">
+            <a:extLst>
+              <a:ext uri="{FF2B5EF4-FFF2-40B4-BE49-F238E27FC236}">
+                <a16:creationId xmlns:a16="http://schemas.microsoft.com/office/drawing/2014/main" id="{91FD388F-CA44-0C1E-6A8C-D79B66E2898A}"/>
+              </a:ext>
+            </a:extLst>
+          </p:cNvPr>
+          <p:cNvSpPr>
+            <a:spLocks noGrp="1"/>
+          </p:cNvSpPr>
+          <p:nvPr>
+            <p:ph idx="1"/>
+          </p:nvPr>
+        </p:nvSpPr>
+        <p:spPr/>
+        <p:txBody>
+          <a:bodyPr/>
+          <a:lstStyle/>
+          <a:p>
+            <a:r>
+              <a:rPr lang="en-US" dirty="0"/>
+              <a:t>An exception to throw if a function/method is not implemented:</a:t>
+            </a:r>
+            <a:br>
+              <a:rPr lang="en-US" dirty="0"/>
+            </a:br>
+            <a:br>
+              <a:rPr lang="en-US" dirty="0"/>
+            </a:br>
+            <a:br>
+              <a:rPr lang="en-US" dirty="0"/>
+            </a:br>
+            <a:br>
+              <a:rPr lang="en-US" dirty="0"/>
+            </a:br>
+            <a:br>
+              <a:rPr lang="en-US" dirty="0"/>
+            </a:br>
+            <a:endParaRPr lang="en-US" dirty="0"/>
+          </a:p>
+          <a:p>
+            <a:pPr lvl="1"/>
+            <a:r>
+              <a:rPr lang="en-US" dirty="0"/>
+              <a:t>Derived from </a:t>
+            </a:r>
+            <a:r>
+              <a:rPr lang="en-US" dirty="0" err="1">
+                <a:latin typeface="Consolas" panose="020B0609020204030204" pitchFamily="49" charset="0"/>
+                <a:cs typeface="Consolas" panose="020B0609020204030204" pitchFamily="49" charset="0"/>
+              </a:rPr>
+              <a:t>logic_error</a:t>
+            </a:r>
+            <a:r>
+              <a:rPr lang="en-US" dirty="0"/>
+              <a:t> since calling an unimplemented function is a bug</a:t>
+            </a:r>
+          </a:p>
+          <a:p>
+            <a:pPr lvl="1"/>
+            <a:r>
+              <a:rPr lang="en-US" dirty="0"/>
+              <a:t>Constructor takes a message string that is used to initialize the base class, becoming the </a:t>
+            </a:r>
+            <a:r>
+              <a:rPr lang="en-US" i="1" dirty="0"/>
+              <a:t>what</a:t>
+            </a:r>
+            <a:r>
+              <a:rPr lang="en-US" dirty="0"/>
+              <a:t> message for the exception object</a:t>
+            </a:r>
+          </a:p>
+          <a:p>
+            <a:pPr lvl="1"/>
+            <a:r>
+              <a:rPr lang="en-US" dirty="0"/>
+              <a:t>No other data members or methods in this example. </a:t>
+            </a:r>
+            <a:r>
+              <a:rPr lang="en-US" u="sng" dirty="0"/>
+              <a:t>There could be others!</a:t>
+            </a:r>
+          </a:p>
+        </p:txBody>
+      </p:sp>
+      <p:sp>
+        <p:nvSpPr>
+          <p:cNvPr id="4" name="TextBox 3">
+            <a:extLst>
+              <a:ext uri="{FF2B5EF4-FFF2-40B4-BE49-F238E27FC236}">
+                <a16:creationId xmlns:a16="http://schemas.microsoft.com/office/drawing/2014/main" id="{5B8A1EEB-F004-8418-93DF-441DAD0A4EE2}"/>
+              </a:ext>
+            </a:extLst>
+          </p:cNvPr>
+          <p:cNvSpPr txBox="1"/>
+          <p:nvPr/>
+        </p:nvSpPr>
+        <p:spPr>
+          <a:xfrm>
+            <a:off x="2267868" y="2388551"/>
+            <a:ext cx="7656263" cy="1754326"/>
+          </a:xfrm>
+          <a:prstGeom prst="rect">
+            <a:avLst/>
+          </a:prstGeom>
+          <a:noFill/>
+        </p:spPr>
+        <p:txBody>
+          <a:bodyPr wrap="none" rtlCol="0">
+            <a:spAutoFit/>
+          </a:bodyPr>
+          <a:lstStyle/>
+          <a:p>
+            <a:r>
+              <a:rPr lang="en-US" b="1" dirty="0">
+                <a:latin typeface="Consolas" panose="020B0609020204030204" pitchFamily="49" charset="0"/>
+                <a:cs typeface="Consolas" panose="020B0609020204030204" pitchFamily="49" charset="0"/>
+              </a:rPr>
+              <a:t>class</a:t>
+            </a:r>
+            <a:r>
+              <a:rPr lang="en-US" dirty="0">
+                <a:latin typeface="Consolas" panose="020B0609020204030204" pitchFamily="49" charset="0"/>
+                <a:cs typeface="Consolas" panose="020B0609020204030204" pitchFamily="49" charset="0"/>
+              </a:rPr>
+              <a:t> </a:t>
+            </a:r>
+            <a:r>
+              <a:rPr lang="en-US" dirty="0" err="1">
+                <a:latin typeface="Consolas" panose="020B0609020204030204" pitchFamily="49" charset="0"/>
+                <a:cs typeface="Consolas" panose="020B0609020204030204" pitchFamily="49" charset="0"/>
+              </a:rPr>
+              <a:t>NotImplemented</a:t>
+            </a:r>
+            <a:r>
+              <a:rPr lang="en-US" dirty="0">
+                <a:latin typeface="Consolas" panose="020B0609020204030204" pitchFamily="49" charset="0"/>
+                <a:cs typeface="Consolas" panose="020B0609020204030204" pitchFamily="49" charset="0"/>
+              </a:rPr>
+              <a:t> : </a:t>
+            </a:r>
+            <a:r>
+              <a:rPr lang="en-US" b="1" dirty="0">
+                <a:latin typeface="Consolas" panose="020B0609020204030204" pitchFamily="49" charset="0"/>
+                <a:cs typeface="Consolas" panose="020B0609020204030204" pitchFamily="49" charset="0"/>
+              </a:rPr>
+              <a:t>public</a:t>
+            </a:r>
+            <a:r>
+              <a:rPr lang="en-US" dirty="0">
+                <a:latin typeface="Consolas" panose="020B0609020204030204" pitchFamily="49" charset="0"/>
+                <a:cs typeface="Consolas" panose="020B0609020204030204" pitchFamily="49" charset="0"/>
+              </a:rPr>
+              <a:t> </a:t>
+            </a:r>
+            <a:r>
+              <a:rPr lang="en-US" dirty="0" err="1">
+                <a:latin typeface="Consolas" panose="020B0609020204030204" pitchFamily="49" charset="0"/>
+                <a:cs typeface="Consolas" panose="020B0609020204030204" pitchFamily="49" charset="0"/>
+              </a:rPr>
+              <a:t>logic_error</a:t>
+            </a:r>
+            <a:r>
+              <a:rPr lang="en-US" dirty="0">
+                <a:latin typeface="Consolas" panose="020B0609020204030204" pitchFamily="49" charset="0"/>
+                <a:cs typeface="Consolas" panose="020B0609020204030204" pitchFamily="49" charset="0"/>
+              </a:rPr>
+              <a:t> {</a:t>
+            </a:r>
+          </a:p>
+          <a:p>
+            <a:r>
+              <a:rPr lang="en-US" b="1" dirty="0">
+                <a:latin typeface="Consolas" panose="020B0609020204030204" pitchFamily="49" charset="0"/>
+                <a:cs typeface="Consolas" panose="020B0609020204030204" pitchFamily="49" charset="0"/>
+              </a:rPr>
+              <a:t>public</a:t>
+            </a:r>
+            <a:r>
+              <a:rPr lang="en-US" dirty="0">
+                <a:latin typeface="Consolas" panose="020B0609020204030204" pitchFamily="49" charset="0"/>
+                <a:cs typeface="Consolas" panose="020B0609020204030204" pitchFamily="49" charset="0"/>
+              </a:rPr>
+              <a:t>:</a:t>
+            </a:r>
+          </a:p>
+          <a:p>
+            <a:r>
+              <a:rPr lang="en-US" dirty="0">
+                <a:latin typeface="Consolas" panose="020B0609020204030204" pitchFamily="49" charset="0"/>
+                <a:cs typeface="Consolas" panose="020B0609020204030204" pitchFamily="49" charset="0"/>
+              </a:rPr>
+              <a:t>    </a:t>
+            </a:r>
+            <a:r>
+              <a:rPr lang="en-US" b="1" dirty="0">
+                <a:latin typeface="Consolas" panose="020B0609020204030204" pitchFamily="49" charset="0"/>
+                <a:cs typeface="Consolas" panose="020B0609020204030204" pitchFamily="49" charset="0"/>
+              </a:rPr>
+              <a:t>explicit</a:t>
+            </a:r>
+            <a:r>
+              <a:rPr lang="en-US" dirty="0">
+                <a:latin typeface="Consolas" panose="020B0609020204030204" pitchFamily="49" charset="0"/>
+                <a:cs typeface="Consolas" panose="020B0609020204030204" pitchFamily="49" charset="0"/>
+              </a:rPr>
+              <a:t> </a:t>
+            </a:r>
+            <a:r>
+              <a:rPr lang="en-US" dirty="0" err="1">
+                <a:latin typeface="Consolas" panose="020B0609020204030204" pitchFamily="49" charset="0"/>
+                <a:cs typeface="Consolas" panose="020B0609020204030204" pitchFamily="49" charset="0"/>
+              </a:rPr>
+              <a:t>NotImplemented</a:t>
+            </a:r>
+            <a:r>
+              <a:rPr lang="en-US" dirty="0">
+                <a:latin typeface="Consolas" panose="020B0609020204030204" pitchFamily="49" charset="0"/>
+                <a:cs typeface="Consolas" panose="020B0609020204030204" pitchFamily="49" charset="0"/>
+              </a:rPr>
+              <a:t>( const std::string &amp;message ) :</a:t>
+            </a:r>
+          </a:p>
+          <a:p>
+            <a:r>
+              <a:rPr lang="en-US" dirty="0">
+                <a:latin typeface="Consolas" panose="020B0609020204030204" pitchFamily="49" charset="0"/>
+                <a:cs typeface="Consolas" panose="020B0609020204030204" pitchFamily="49" charset="0"/>
+              </a:rPr>
+              <a:t>        </a:t>
+            </a:r>
+            <a:r>
+              <a:rPr lang="en-US" dirty="0" err="1">
+                <a:latin typeface="Consolas" panose="020B0609020204030204" pitchFamily="49" charset="0"/>
+                <a:cs typeface="Consolas" panose="020B0609020204030204" pitchFamily="49" charset="0"/>
+              </a:rPr>
+              <a:t>logic_error</a:t>
+            </a:r>
+            <a:r>
+              <a:rPr lang="en-US" dirty="0">
+                <a:latin typeface="Consolas" panose="020B0609020204030204" pitchFamily="49" charset="0"/>
+                <a:cs typeface="Consolas" panose="020B0609020204030204" pitchFamily="49" charset="0"/>
+              </a:rPr>
+              <a:t>( message )</a:t>
+            </a:r>
+          </a:p>
+          <a:p>
+            <a:r>
+              <a:rPr lang="en-US" dirty="0">
+                <a:latin typeface="Consolas" panose="020B0609020204030204" pitchFamily="49" charset="0"/>
+                <a:cs typeface="Consolas" panose="020B0609020204030204" pitchFamily="49" charset="0"/>
+              </a:rPr>
+              <a:t>    { }</a:t>
+            </a:r>
+          </a:p>
+          <a:p>
+            <a:r>
+              <a:rPr lang="en-US" dirty="0">
+                <a:latin typeface="Consolas" panose="020B0609020204030204" pitchFamily="49" charset="0"/>
+                <a:cs typeface="Consolas" panose="020B0609020204030204" pitchFamily="49" charset="0"/>
+              </a:rPr>
+              <a:t>};</a:t>
+            </a:r>
+          </a:p>
+        </p:txBody>
+      </p:sp>
+      <p:sp>
+        <p:nvSpPr>
+          <p:cNvPr id="5" name="TextBox 4">
+            <a:extLst>
+              <a:ext uri="{FF2B5EF4-FFF2-40B4-BE49-F238E27FC236}">
+                <a16:creationId xmlns:a16="http://schemas.microsoft.com/office/drawing/2014/main" id="{40CF834F-479A-2CDA-1524-6E2AC49BC27E}"/>
+              </a:ext>
+            </a:extLst>
+          </p:cNvPr>
+          <p:cNvSpPr txBox="1"/>
+          <p:nvPr/>
+        </p:nvSpPr>
+        <p:spPr>
+          <a:xfrm>
+            <a:off x="1761318" y="5807631"/>
+            <a:ext cx="8669361" cy="369332"/>
+          </a:xfrm>
+          <a:prstGeom prst="rect">
+            <a:avLst/>
+          </a:prstGeom>
+          <a:noFill/>
+        </p:spPr>
+        <p:txBody>
+          <a:bodyPr wrap="none" rtlCol="0">
+            <a:spAutoFit/>
+          </a:bodyPr>
+          <a:lstStyle/>
+          <a:p>
+            <a:r>
+              <a:rPr lang="en-US" b="1" dirty="0">
+                <a:latin typeface="Consolas" panose="020B0609020204030204" pitchFamily="49" charset="0"/>
+                <a:cs typeface="Consolas" panose="020B0609020204030204" pitchFamily="49" charset="0"/>
+              </a:rPr>
+              <a:t>throw</a:t>
+            </a:r>
+            <a:r>
+              <a:rPr lang="en-US" dirty="0">
+                <a:latin typeface="Consolas" panose="020B0609020204030204" pitchFamily="49" charset="0"/>
+                <a:cs typeface="Consolas" panose="020B0609020204030204" pitchFamily="49" charset="0"/>
+              </a:rPr>
+              <a:t> </a:t>
+            </a:r>
+            <a:r>
+              <a:rPr lang="en-US" dirty="0" err="1">
+                <a:latin typeface="Consolas" panose="020B0609020204030204" pitchFamily="49" charset="0"/>
+                <a:cs typeface="Consolas" panose="020B0609020204030204" pitchFamily="49" charset="0"/>
+              </a:rPr>
+              <a:t>NotImplemented</a:t>
+            </a:r>
+            <a:r>
+              <a:rPr lang="en-US" dirty="0">
+                <a:latin typeface="Consolas" panose="020B0609020204030204" pitchFamily="49" charset="0"/>
+                <a:cs typeface="Consolas" panose="020B0609020204030204" pitchFamily="49" charset="0"/>
+              </a:rPr>
+              <a:t>( “f( int, const string &amp; ) not implemented” );</a:t>
+            </a:r>
+          </a:p>
+        </p:txBody>
+      </p:sp>
+    </p:spTree>
+    <p:extLst>
+      <p:ext uri="{BB962C8B-B14F-4D97-AF65-F5344CB8AC3E}">
+        <p14:creationId xmlns:p14="http://schemas.microsoft.com/office/powerpoint/2010/main" val="1041585868"/>
+      </p:ext>
+    </p:extLst>
+  </p:cSld>
+  <p:clrMapOvr>
+    <a:masterClrMapping/>
+  </p:clrMapOvr>
+</p:sld>
+</file>
+
+<file path=ppt/slides/slide29.xml><?xml version="1.0" encoding="utf-8"?>
+<p:sld xmlns:a="http://schemas.openxmlformats.org/drawingml/2006/main" xmlns:r="http://schemas.openxmlformats.org/officeDocument/2006/relationships" xmlns:p="http://schemas.openxmlformats.org/presentationml/2006/main">
+  <p:cSld>
+    <p:spTree>
+      <p:nvGrpSpPr>
+        <p:cNvPr id="1" name=""/>
+        <p:cNvGrpSpPr/>
+        <p:nvPr/>
+      </p:nvGrpSpPr>
+      <p:grpSpPr>
+        <a:xfrm>
+          <a:off x="0" y="0"/>
+          <a:ext cx="0" cy="0"/>
+          <a:chOff x="0" y="0"/>
+          <a:chExt cx="0" cy="0"/>
+        </a:xfrm>
+      </p:grpSpPr>
+      <p:sp>
+        <p:nvSpPr>
+          <p:cNvPr id="2" name="Title 1">
+            <a:extLst>
+              <a:ext uri="{FF2B5EF4-FFF2-40B4-BE49-F238E27FC236}">
+                <a16:creationId xmlns:a16="http://schemas.microsoft.com/office/drawing/2014/main" id="{D98F9FC7-0B1F-AF38-FCE0-BF1267BF0114}"/>
+              </a:ext>
+            </a:extLst>
+          </p:cNvPr>
+          <p:cNvSpPr>
+            <a:spLocks noGrp="1"/>
+          </p:cNvSpPr>
+          <p:nvPr>
+            <p:ph type="title"/>
+          </p:nvPr>
+        </p:nvSpPr>
+        <p:spPr/>
+        <p:txBody>
+          <a:bodyPr/>
+          <a:lstStyle/>
+          <a:p>
+            <a:r>
+              <a:rPr lang="en-US" dirty="0"/>
+              <a:t>Other Standard Exceptions</a:t>
+            </a:r>
+          </a:p>
+        </p:txBody>
+      </p:sp>
+      <p:sp>
+        <p:nvSpPr>
+          <p:cNvPr id="3" name="Content Placeholder 2">
+            <a:extLst>
+              <a:ext uri="{FF2B5EF4-FFF2-40B4-BE49-F238E27FC236}">
+                <a16:creationId xmlns:a16="http://schemas.microsoft.com/office/drawing/2014/main" id="{9992A5F3-5CB4-318D-6925-D8CBDE68D490}"/>
+              </a:ext>
+            </a:extLst>
+          </p:cNvPr>
+          <p:cNvSpPr>
+            <a:spLocks noGrp="1"/>
+          </p:cNvSpPr>
+          <p:nvPr>
+            <p:ph idx="1"/>
+          </p:nvPr>
+        </p:nvSpPr>
+        <p:spPr/>
+        <p:txBody>
+          <a:bodyPr/>
+          <a:lstStyle/>
+          <a:p>
+            <a:r>
+              <a:rPr lang="en-US" dirty="0"/>
+              <a:t>The C++ standard defines other exceptions derived for exception for various special purposes. For example:</a:t>
+            </a:r>
+          </a:p>
+          <a:p>
+            <a:r>
+              <a:rPr lang="en-US" dirty="0">
+                <a:latin typeface="Consolas" panose="020B0609020204030204" pitchFamily="49" charset="0"/>
+                <a:cs typeface="Consolas" panose="020B0609020204030204" pitchFamily="49" charset="0"/>
+              </a:rPr>
+              <a:t>std::</a:t>
+            </a:r>
+            <a:r>
+              <a:rPr lang="en-US" dirty="0" err="1">
+                <a:latin typeface="Consolas" panose="020B0609020204030204" pitchFamily="49" charset="0"/>
+                <a:cs typeface="Consolas" panose="020B0609020204030204" pitchFamily="49" charset="0"/>
+              </a:rPr>
+              <a:t>bad_alloc</a:t>
+            </a:r>
+            <a:r>
+              <a:rPr lang="en-US" dirty="0"/>
+              <a:t> is thrown when new fails to find memory</a:t>
+            </a:r>
+          </a:p>
+          <a:p>
+            <a:pPr lvl="1"/>
+            <a:r>
+              <a:rPr lang="en-US" dirty="0"/>
+              <a:t>This is rare: virtual memory means programs don’t usually run out</a:t>
+            </a:r>
+          </a:p>
+          <a:p>
+            <a:pPr lvl="1"/>
+            <a:r>
+              <a:rPr lang="en-US" dirty="0"/>
+              <a:t>… and if they do, the OS will have bigger problems!</a:t>
+            </a:r>
+          </a:p>
+          <a:p>
+            <a:r>
+              <a:rPr lang="en-US" dirty="0"/>
+              <a:t>The </a:t>
+            </a:r>
+            <a:r>
+              <a:rPr lang="en-US" dirty="0" err="1">
+                <a:latin typeface="Consolas" panose="020B0609020204030204" pitchFamily="49" charset="0"/>
+                <a:cs typeface="Consolas" panose="020B0609020204030204" pitchFamily="49" charset="0"/>
+              </a:rPr>
+              <a:t>bad_alloc</a:t>
+            </a:r>
+            <a:r>
+              <a:rPr lang="en-US" dirty="0"/>
+              <a:t> exception can still be thrown when…</a:t>
+            </a:r>
+          </a:p>
+          <a:p>
+            <a:pPr lvl="1"/>
+            <a:r>
+              <a:rPr lang="en-US" dirty="0"/>
+              <a:t>… you are programming for a highly constrained (embedded) system without virtual memory support</a:t>
+            </a:r>
+          </a:p>
+          <a:p>
+            <a:pPr lvl="1"/>
+            <a:r>
+              <a:rPr lang="en-US" dirty="0"/>
+              <a:t>… the process has a resource quota imposed on it that limits its memory usage</a:t>
+            </a:r>
+          </a:p>
+        </p:txBody>
+      </p:sp>
+    </p:spTree>
+    <p:extLst>
+      <p:ext uri="{BB962C8B-B14F-4D97-AF65-F5344CB8AC3E}">
+        <p14:creationId xmlns:p14="http://schemas.microsoft.com/office/powerpoint/2010/main" val="2253311067"/>
       </p:ext>
     </p:extLst>
   </p:cSld>
@@ -7821,6 +9209,479 @@
     <p:extLst>
       <p:ext uri="{BB962C8B-B14F-4D97-AF65-F5344CB8AC3E}">
         <p14:creationId xmlns:p14="http://schemas.microsoft.com/office/powerpoint/2010/main" val="3868788101"/>
+      </p:ext>
+    </p:extLst>
+  </p:cSld>
+  <p:clrMapOvr>
+    <a:masterClrMapping/>
+  </p:clrMapOvr>
+</p:sld>
+</file>
+
+<file path=ppt/slides/slide30.xml><?xml version="1.0" encoding="utf-8"?>
+<p:sld xmlns:a="http://schemas.openxmlformats.org/drawingml/2006/main" xmlns:r="http://schemas.openxmlformats.org/officeDocument/2006/relationships" xmlns:p="http://schemas.openxmlformats.org/presentationml/2006/main">
+  <p:cSld>
+    <p:spTree>
+      <p:nvGrpSpPr>
+        <p:cNvPr id="1" name=""/>
+        <p:cNvGrpSpPr/>
+        <p:nvPr/>
+      </p:nvGrpSpPr>
+      <p:grpSpPr>
+        <a:xfrm>
+          <a:off x="0" y="0"/>
+          <a:ext cx="0" cy="0"/>
+          <a:chOff x="0" y="0"/>
+          <a:chExt cx="0" cy="0"/>
+        </a:xfrm>
+      </p:grpSpPr>
+      <p:sp>
+        <p:nvSpPr>
+          <p:cNvPr id="2" name="Title 1">
+            <a:extLst>
+              <a:ext uri="{FF2B5EF4-FFF2-40B4-BE49-F238E27FC236}">
+                <a16:creationId xmlns:a16="http://schemas.microsoft.com/office/drawing/2014/main" id="{F3082411-E9A4-A944-9340-9F466602DD0D}"/>
+              </a:ext>
+            </a:extLst>
+          </p:cNvPr>
+          <p:cNvSpPr>
+            <a:spLocks noGrp="1"/>
+          </p:cNvSpPr>
+          <p:nvPr>
+            <p:ph type="title"/>
+          </p:nvPr>
+        </p:nvSpPr>
+        <p:spPr/>
+        <p:txBody>
+          <a:bodyPr/>
+          <a:lstStyle/>
+          <a:p>
+            <a:r>
+              <a:rPr lang="en-US" dirty="0"/>
+              <a:t>Exception Specifications?</a:t>
+            </a:r>
+          </a:p>
+        </p:txBody>
+      </p:sp>
+      <p:sp>
+        <p:nvSpPr>
+          <p:cNvPr id="3" name="Content Placeholder 2">
+            <a:extLst>
+              <a:ext uri="{FF2B5EF4-FFF2-40B4-BE49-F238E27FC236}">
+                <a16:creationId xmlns:a16="http://schemas.microsoft.com/office/drawing/2014/main" id="{CBEB03E1-7F52-5E2A-265E-2B14FA91C142}"/>
+              </a:ext>
+            </a:extLst>
+          </p:cNvPr>
+          <p:cNvSpPr>
+            <a:spLocks noGrp="1"/>
+          </p:cNvSpPr>
+          <p:nvPr>
+            <p:ph idx="1"/>
+          </p:nvPr>
+        </p:nvSpPr>
+        <p:spPr/>
+        <p:txBody>
+          <a:bodyPr/>
+          <a:lstStyle/>
+          <a:p>
+            <a:r>
+              <a:rPr lang="en-US" dirty="0"/>
+              <a:t>Java allows you to declare which exceptions a method might throw</a:t>
+            </a:r>
+          </a:p>
+          <a:p>
+            <a:pPr lvl="1"/>
+            <a:r>
+              <a:rPr lang="en-US" dirty="0"/>
+              <a:t>Compiler verifies (statically) that all declared exceptions of called methods are either handled or declared to be thrown</a:t>
+            </a:r>
+          </a:p>
+          <a:p>
+            <a:pPr lvl="1"/>
+            <a:r>
+              <a:rPr lang="en-US" dirty="0"/>
+              <a:t>The idea was to ensure that no exceptions will go unnoticed/unhandled</a:t>
+            </a:r>
+          </a:p>
+          <a:p>
+            <a:r>
+              <a:rPr lang="en-US" dirty="0"/>
+              <a:t>Problems:</a:t>
+            </a:r>
+          </a:p>
+          <a:p>
+            <a:pPr lvl="1"/>
+            <a:r>
+              <a:rPr lang="en-US" dirty="0"/>
+              <a:t>Not all exceptions are “checked”, and they can be thrown even without the specification. Thus, the feature doesn’t really guarantee that there are no unhandled exceptions</a:t>
+            </a:r>
+          </a:p>
+          <a:p>
+            <a:pPr lvl="1"/>
+            <a:r>
+              <a:rPr lang="en-US" dirty="0"/>
+              <a:t>Sometimes, because of the logic of your program, you know an exception won’t be thrown, yet you are forced to handle an exception that can’t happen or declare that you will throw an exception you never will</a:t>
+            </a:r>
+          </a:p>
+        </p:txBody>
+      </p:sp>
+    </p:spTree>
+    <p:extLst>
+      <p:ext uri="{BB962C8B-B14F-4D97-AF65-F5344CB8AC3E}">
+        <p14:creationId xmlns:p14="http://schemas.microsoft.com/office/powerpoint/2010/main" val="3373807689"/>
+      </p:ext>
+    </p:extLst>
+  </p:cSld>
+  <p:clrMapOvr>
+    <a:masterClrMapping/>
+  </p:clrMapOvr>
+</p:sld>
+</file>
+
+<file path=ppt/slides/slide31.xml><?xml version="1.0" encoding="utf-8"?>
+<p:sld xmlns:a="http://schemas.openxmlformats.org/drawingml/2006/main" xmlns:r="http://schemas.openxmlformats.org/officeDocument/2006/relationships" xmlns:p="http://schemas.openxmlformats.org/presentationml/2006/main">
+  <p:cSld>
+    <p:spTree>
+      <p:nvGrpSpPr>
+        <p:cNvPr id="1" name=""/>
+        <p:cNvGrpSpPr/>
+        <p:nvPr/>
+      </p:nvGrpSpPr>
+      <p:grpSpPr>
+        <a:xfrm>
+          <a:off x="0" y="0"/>
+          <a:ext cx="0" cy="0"/>
+          <a:chOff x="0" y="0"/>
+          <a:chExt cx="0" cy="0"/>
+        </a:xfrm>
+      </p:grpSpPr>
+      <p:sp>
+        <p:nvSpPr>
+          <p:cNvPr id="2" name="Title 1">
+            <a:extLst>
+              <a:ext uri="{FF2B5EF4-FFF2-40B4-BE49-F238E27FC236}">
+                <a16:creationId xmlns:a16="http://schemas.microsoft.com/office/drawing/2014/main" id="{25ADA2E5-7568-619E-F965-5BA607C6A47B}"/>
+              </a:ext>
+            </a:extLst>
+          </p:cNvPr>
+          <p:cNvSpPr>
+            <a:spLocks noGrp="1"/>
+          </p:cNvSpPr>
+          <p:nvPr>
+            <p:ph type="title"/>
+          </p:nvPr>
+        </p:nvSpPr>
+        <p:spPr/>
+        <p:txBody>
+          <a:bodyPr/>
+          <a:lstStyle/>
+          <a:p>
+            <a:r>
+              <a:rPr lang="en-US" dirty="0"/>
+              <a:t>Controversial</a:t>
+            </a:r>
+          </a:p>
+        </p:txBody>
+      </p:sp>
+      <p:sp>
+        <p:nvSpPr>
+          <p:cNvPr id="3" name="Content Placeholder 2">
+            <a:extLst>
+              <a:ext uri="{FF2B5EF4-FFF2-40B4-BE49-F238E27FC236}">
+                <a16:creationId xmlns:a16="http://schemas.microsoft.com/office/drawing/2014/main" id="{87EA975E-9082-E358-9B6D-012D4A36C1BF}"/>
+              </a:ext>
+            </a:extLst>
+          </p:cNvPr>
+          <p:cNvSpPr>
+            <a:spLocks noGrp="1"/>
+          </p:cNvSpPr>
+          <p:nvPr>
+            <p:ph idx="1"/>
+          </p:nvPr>
+        </p:nvSpPr>
+        <p:spPr/>
+        <p:txBody>
+          <a:bodyPr/>
+          <a:lstStyle/>
+          <a:p>
+            <a:r>
+              <a:rPr lang="en-US" dirty="0"/>
+              <a:t>For the reasons stated earlier, Java exception specifications are controversial</a:t>
+            </a:r>
+          </a:p>
+          <a:p>
+            <a:pPr lvl="1"/>
+            <a:r>
+              <a:rPr lang="en-US" dirty="0"/>
+              <a:t>Some believe they are a mistake in the design of Java</a:t>
+            </a:r>
+          </a:p>
+          <a:p>
+            <a:pPr lvl="1"/>
+            <a:r>
+              <a:rPr lang="en-US" dirty="0"/>
+              <a:t>Some believe they are useful tools to help make more reliable programs</a:t>
+            </a:r>
+          </a:p>
+          <a:p>
+            <a:pPr lvl="1"/>
+            <a:r>
+              <a:rPr lang="en-US" dirty="0"/>
+              <a:t>Perhaps both are right?</a:t>
+            </a:r>
+          </a:p>
+          <a:p>
+            <a:r>
+              <a:rPr lang="en-US" dirty="0"/>
+              <a:t>Most modern languages do not have exception specifications</a:t>
+            </a:r>
+          </a:p>
+          <a:p>
+            <a:pPr lvl="1"/>
+            <a:r>
+              <a:rPr lang="en-US" dirty="0"/>
+              <a:t>For example, Scala does not, despite targeting the JVM</a:t>
+            </a:r>
+          </a:p>
+        </p:txBody>
+      </p:sp>
+    </p:spTree>
+    <p:extLst>
+      <p:ext uri="{BB962C8B-B14F-4D97-AF65-F5344CB8AC3E}">
+        <p14:creationId xmlns:p14="http://schemas.microsoft.com/office/powerpoint/2010/main" val="3290453476"/>
+      </p:ext>
+    </p:extLst>
+  </p:cSld>
+  <p:clrMapOvr>
+    <a:masterClrMapping/>
+  </p:clrMapOvr>
+</p:sld>
+</file>
+
+<file path=ppt/slides/slide32.xml><?xml version="1.0" encoding="utf-8"?>
+<p:sld xmlns:a="http://schemas.openxmlformats.org/drawingml/2006/main" xmlns:r="http://schemas.openxmlformats.org/officeDocument/2006/relationships" xmlns:p="http://schemas.openxmlformats.org/presentationml/2006/main">
+  <p:cSld>
+    <p:spTree>
+      <p:nvGrpSpPr>
+        <p:cNvPr id="1" name=""/>
+        <p:cNvGrpSpPr/>
+        <p:nvPr/>
+      </p:nvGrpSpPr>
+      <p:grpSpPr>
+        <a:xfrm>
+          <a:off x="0" y="0"/>
+          <a:ext cx="0" cy="0"/>
+          <a:chOff x="0" y="0"/>
+          <a:chExt cx="0" cy="0"/>
+        </a:xfrm>
+      </p:grpSpPr>
+      <p:sp>
+        <p:nvSpPr>
+          <p:cNvPr id="2" name="Title 1">
+            <a:extLst>
+              <a:ext uri="{FF2B5EF4-FFF2-40B4-BE49-F238E27FC236}">
+                <a16:creationId xmlns:a16="http://schemas.microsoft.com/office/drawing/2014/main" id="{B8019375-DAD6-BCBC-80AA-65E97AEC3A53}"/>
+              </a:ext>
+            </a:extLst>
+          </p:cNvPr>
+          <p:cNvSpPr>
+            <a:spLocks noGrp="1"/>
+          </p:cNvSpPr>
+          <p:nvPr>
+            <p:ph type="title"/>
+          </p:nvPr>
+        </p:nvSpPr>
+        <p:spPr/>
+        <p:txBody>
+          <a:bodyPr/>
+          <a:lstStyle/>
+          <a:p>
+            <a:r>
+              <a:rPr lang="en-US" dirty="0"/>
+              <a:t>What about C++?</a:t>
+            </a:r>
+          </a:p>
+        </p:txBody>
+      </p:sp>
+      <p:sp>
+        <p:nvSpPr>
+          <p:cNvPr id="3" name="Content Placeholder 2">
+            <a:extLst>
+              <a:ext uri="{FF2B5EF4-FFF2-40B4-BE49-F238E27FC236}">
+                <a16:creationId xmlns:a16="http://schemas.microsoft.com/office/drawing/2014/main" id="{EFF45E84-AB08-BEEE-99B4-82B4BA8B5DAE}"/>
+              </a:ext>
+            </a:extLst>
+          </p:cNvPr>
+          <p:cNvSpPr>
+            <a:spLocks noGrp="1"/>
+          </p:cNvSpPr>
+          <p:nvPr>
+            <p:ph idx="1"/>
+          </p:nvPr>
+        </p:nvSpPr>
+        <p:spPr/>
+        <p:txBody>
+          <a:bodyPr/>
+          <a:lstStyle/>
+          <a:p>
+            <a:r>
+              <a:rPr lang="en-US" dirty="0"/>
+              <a:t>C++ 1998 had a form of exception specifications</a:t>
+            </a:r>
+          </a:p>
+          <a:p>
+            <a:r>
+              <a:rPr lang="en-US" dirty="0"/>
+              <a:t>It was even more controversial than Java’s</a:t>
+            </a:r>
+          </a:p>
+          <a:p>
+            <a:pPr lvl="1"/>
+            <a:r>
+              <a:rPr lang="en-US" dirty="0"/>
+              <a:t>It did not provide much help with creating more reliable programs</a:t>
+            </a:r>
+          </a:p>
+          <a:p>
+            <a:pPr lvl="1"/>
+            <a:r>
+              <a:rPr lang="en-US" dirty="0"/>
+              <a:t>C++ needed to be compatible with legacy (pre-1998) code and with C, which limited the design options for exception specifications</a:t>
+            </a:r>
+          </a:p>
+          <a:p>
+            <a:r>
+              <a:rPr lang="en-US" dirty="0"/>
+              <a:t>It basically didn’t work, and it caused more problems than it solved</a:t>
+            </a:r>
+          </a:p>
+          <a:p>
+            <a:r>
+              <a:rPr lang="en-US" dirty="0"/>
+              <a:t>A “best practice” quickly arrived: </a:t>
+            </a:r>
+            <a:r>
+              <a:rPr lang="en-US" i="1" u="sng" dirty="0"/>
+              <a:t>Don’t Use Exception Specifications</a:t>
+            </a:r>
+            <a:r>
+              <a:rPr lang="en-US" dirty="0"/>
+              <a:t>!</a:t>
+            </a:r>
+          </a:p>
+          <a:p>
+            <a:r>
+              <a:rPr lang="en-US" dirty="0"/>
+              <a:t>Deprecated in C++ 2011. Completely removed in C++ 2017</a:t>
+            </a:r>
+          </a:p>
+          <a:p>
+            <a:pPr lvl="1"/>
+            <a:r>
+              <a:rPr lang="en-US" dirty="0"/>
+              <a:t>A rare case of the language actually getting </a:t>
+            </a:r>
+            <a:r>
+              <a:rPr lang="en-US" i="1" dirty="0"/>
+              <a:t>smaller</a:t>
+            </a:r>
+            <a:r>
+              <a:rPr lang="en-US" dirty="0"/>
+              <a:t>! (*gasp*)</a:t>
+            </a:r>
+          </a:p>
+        </p:txBody>
+      </p:sp>
+    </p:spTree>
+    <p:extLst>
+      <p:ext uri="{BB962C8B-B14F-4D97-AF65-F5344CB8AC3E}">
+        <p14:creationId xmlns:p14="http://schemas.microsoft.com/office/powerpoint/2010/main" val="3452763118"/>
+      </p:ext>
+    </p:extLst>
+  </p:cSld>
+  <p:clrMapOvr>
+    <a:masterClrMapping/>
+  </p:clrMapOvr>
+</p:sld>
+</file>
+
+<file path=ppt/slides/slide33.xml><?xml version="1.0" encoding="utf-8"?>
+<p:sld xmlns:a="http://schemas.openxmlformats.org/drawingml/2006/main" xmlns:r="http://schemas.openxmlformats.org/officeDocument/2006/relationships" xmlns:p="http://schemas.openxmlformats.org/presentationml/2006/main">
+  <p:cSld>
+    <p:spTree>
+      <p:nvGrpSpPr>
+        <p:cNvPr id="1" name=""/>
+        <p:cNvGrpSpPr/>
+        <p:nvPr/>
+      </p:nvGrpSpPr>
+      <p:grpSpPr>
+        <a:xfrm>
+          <a:off x="0" y="0"/>
+          <a:ext cx="0" cy="0"/>
+          <a:chOff x="0" y="0"/>
+          <a:chExt cx="0" cy="0"/>
+        </a:xfrm>
+      </p:grpSpPr>
+      <p:sp>
+        <p:nvSpPr>
+          <p:cNvPr id="2" name="Title 1">
+            <a:extLst>
+              <a:ext uri="{FF2B5EF4-FFF2-40B4-BE49-F238E27FC236}">
+                <a16:creationId xmlns:a16="http://schemas.microsoft.com/office/drawing/2014/main" id="{8CC41B8A-F35B-9096-644F-DF5B8791DE9B}"/>
+              </a:ext>
+            </a:extLst>
+          </p:cNvPr>
+          <p:cNvSpPr>
+            <a:spLocks noGrp="1"/>
+          </p:cNvSpPr>
+          <p:nvPr>
+            <p:ph type="title"/>
+          </p:nvPr>
+        </p:nvSpPr>
+        <p:spPr/>
+        <p:txBody>
+          <a:bodyPr/>
+          <a:lstStyle/>
+          <a:p>
+            <a:r>
+              <a:rPr lang="en-US" dirty="0"/>
+              <a:t>With One (um) Exception…</a:t>
+            </a:r>
+          </a:p>
+        </p:txBody>
+      </p:sp>
+      <p:sp>
+        <p:nvSpPr>
+          <p:cNvPr id="3" name="Content Placeholder 2">
+            <a:extLst>
+              <a:ext uri="{FF2B5EF4-FFF2-40B4-BE49-F238E27FC236}">
+                <a16:creationId xmlns:a16="http://schemas.microsoft.com/office/drawing/2014/main" id="{DF8D7988-21E5-0F26-47A6-67632E22D0C7}"/>
+              </a:ext>
+            </a:extLst>
+          </p:cNvPr>
+          <p:cNvSpPr>
+            <a:spLocks noGrp="1"/>
+          </p:cNvSpPr>
+          <p:nvPr>
+            <p:ph idx="1"/>
+          </p:nvPr>
+        </p:nvSpPr>
+        <p:spPr/>
+        <p:txBody>
+          <a:bodyPr/>
+          <a:lstStyle/>
+          <a:p>
+            <a:r>
+              <a:rPr lang="en-US" i="1" dirty="0"/>
+              <a:t>Finish Me!</a:t>
+            </a:r>
+          </a:p>
+        </p:txBody>
+      </p:sp>
+    </p:spTree>
+    <p:extLst>
+      <p:ext uri="{BB962C8B-B14F-4D97-AF65-F5344CB8AC3E}">
+        <p14:creationId xmlns:p14="http://schemas.microsoft.com/office/powerpoint/2010/main" val="516076572"/>
       </p:ext>
     </p:extLst>
   </p:cSld>
@@ -8160,7 +10021,7 @@
           <a:p>
             <a:r>
               <a:rPr lang="en-US" dirty="0"/>
-              <a:t>When an error is detected throw an </a:t>
+              <a:t>When an error is detected, throw an </a:t>
             </a:r>
             <a:r>
               <a:rPr lang="en-US" i="1" dirty="0"/>
@@ -8813,7 +10674,7 @@
           <a:p>
             <a:r>
               <a:rPr lang="en-US" dirty="0"/>
-              <a:t>Many programs (in other languages) overuse exceptions</a:t>
+              <a:t>Many programs (especially in other languages) overuse exceptions</a:t>
             </a:r>
           </a:p>
           <a:p>

</xml_diff>

<commit_message>
Various updates on the Smart Pointers presentation and the Exceptions presentations.
</commit_message>
<xml_diff>
--- a/Presentations/Exceptions.pptx
+++ b/Presentations/Exceptions.pptx
@@ -38,6 +38,8 @@
     <p:sldId id="280" r:id="rId32"/>
     <p:sldId id="281" r:id="rId33"/>
     <p:sldId id="282" r:id="rId34"/>
+    <p:sldId id="289" r:id="rId35"/>
+    <p:sldId id="290" r:id="rId36"/>
   </p:sldIdLst>
   <p:sldSz cx="12192000" cy="6858000"/>
   <p:notesSz cx="6858000" cy="9144000"/>
@@ -291,7 +293,7 @@
           <a:p>
             <a:fld id="{17A57B3F-CD89-7649-929F-A2F99AD089BC}" type="datetimeFigureOut">
               <a:rPr lang="en-US" smtClean="0"/>
-              <a:t>11/13/23</a:t>
+              <a:t>11/15/23</a:t>
             </a:fld>
             <a:endParaRPr lang="en-US"/>
           </a:p>
@@ -489,7 +491,7 @@
           <a:p>
             <a:fld id="{17A57B3F-CD89-7649-929F-A2F99AD089BC}" type="datetimeFigureOut">
               <a:rPr lang="en-US" smtClean="0"/>
-              <a:t>11/13/23</a:t>
+              <a:t>11/15/23</a:t>
             </a:fld>
             <a:endParaRPr lang="en-US"/>
           </a:p>
@@ -697,7 +699,7 @@
           <a:p>
             <a:fld id="{17A57B3F-CD89-7649-929F-A2F99AD089BC}" type="datetimeFigureOut">
               <a:rPr lang="en-US" smtClean="0"/>
-              <a:t>11/13/23</a:t>
+              <a:t>11/15/23</a:t>
             </a:fld>
             <a:endParaRPr lang="en-US"/>
           </a:p>
@@ -895,7 +897,7 @@
           <a:p>
             <a:fld id="{17A57B3F-CD89-7649-929F-A2F99AD089BC}" type="datetimeFigureOut">
               <a:rPr lang="en-US" smtClean="0"/>
-              <a:t>11/13/23</a:t>
+              <a:t>11/15/23</a:t>
             </a:fld>
             <a:endParaRPr lang="en-US"/>
           </a:p>
@@ -1170,7 +1172,7 @@
           <a:p>
             <a:fld id="{17A57B3F-CD89-7649-929F-A2F99AD089BC}" type="datetimeFigureOut">
               <a:rPr lang="en-US" smtClean="0"/>
-              <a:t>11/13/23</a:t>
+              <a:t>11/15/23</a:t>
             </a:fld>
             <a:endParaRPr lang="en-US"/>
           </a:p>
@@ -1435,7 +1437,7 @@
           <a:p>
             <a:fld id="{17A57B3F-CD89-7649-929F-A2F99AD089BC}" type="datetimeFigureOut">
               <a:rPr lang="en-US" smtClean="0"/>
-              <a:t>11/13/23</a:t>
+              <a:t>11/15/23</a:t>
             </a:fld>
             <a:endParaRPr lang="en-US"/>
           </a:p>
@@ -1847,7 +1849,7 @@
           <a:p>
             <a:fld id="{17A57B3F-CD89-7649-929F-A2F99AD089BC}" type="datetimeFigureOut">
               <a:rPr lang="en-US" smtClean="0"/>
-              <a:t>11/13/23</a:t>
+              <a:t>11/15/23</a:t>
             </a:fld>
             <a:endParaRPr lang="en-US"/>
           </a:p>
@@ -1988,7 +1990,7 @@
           <a:p>
             <a:fld id="{17A57B3F-CD89-7649-929F-A2F99AD089BC}" type="datetimeFigureOut">
               <a:rPr lang="en-US" smtClean="0"/>
-              <a:t>11/13/23</a:t>
+              <a:t>11/15/23</a:t>
             </a:fld>
             <a:endParaRPr lang="en-US"/>
           </a:p>
@@ -2101,7 +2103,7 @@
           <a:p>
             <a:fld id="{17A57B3F-CD89-7649-929F-A2F99AD089BC}" type="datetimeFigureOut">
               <a:rPr lang="en-US" smtClean="0"/>
-              <a:t>11/13/23</a:t>
+              <a:t>11/15/23</a:t>
             </a:fld>
             <a:endParaRPr lang="en-US"/>
           </a:p>
@@ -2412,7 +2414,7 @@
           <a:p>
             <a:fld id="{17A57B3F-CD89-7649-929F-A2F99AD089BC}" type="datetimeFigureOut">
               <a:rPr lang="en-US" smtClean="0"/>
-              <a:t>11/13/23</a:t>
+              <a:t>11/15/23</a:t>
             </a:fld>
             <a:endParaRPr lang="en-US"/>
           </a:p>
@@ -2700,7 +2702,7 @@
           <a:p>
             <a:fld id="{17A57B3F-CD89-7649-929F-A2F99AD089BC}" type="datetimeFigureOut">
               <a:rPr lang="en-US" smtClean="0"/>
-              <a:t>11/13/23</a:t>
+              <a:t>11/15/23</a:t>
             </a:fld>
             <a:endParaRPr lang="en-US"/>
           </a:p>
@@ -2941,7 +2943,7 @@
           <a:p>
             <a:fld id="{17A57B3F-CD89-7649-929F-A2F99AD089BC}" type="datetimeFigureOut">
               <a:rPr lang="en-US" smtClean="0"/>
-              <a:t>11/13/23</a:t>
+              <a:t>11/15/23</a:t>
             </a:fld>
             <a:endParaRPr lang="en-US"/>
           </a:p>
@@ -3783,7 +3785,7 @@
             <a:pPr lvl="1"/>
             <a:r>
               <a:rPr lang="en-US" dirty="0"/>
-              <a:t>Pointer types (e.g., pointing at a complex dynamically allocated object)</a:t>
+              <a:t>Pointer types (e.g., pointing at a complex, dynamically allocated object)</a:t>
             </a:r>
           </a:p>
           <a:p>
@@ -5895,7 +5897,7 @@
                 <a:latin typeface="Consolas" panose="020B0609020204030204" pitchFamily="49" charset="0"/>
                 <a:cs typeface="Consolas" panose="020B0609020204030204" pitchFamily="49" charset="0"/>
               </a:rPr>
-              <a:t>    // No more data (“end-of-file”) or error.</a:t>
+              <a:t>    // No more data (“end-of-file”), or error.</a:t>
             </a:r>
           </a:p>
           <a:p>
@@ -8343,6 +8345,59 @@
                 <a:latin typeface="Consolas" panose="020B0609020204030204" pitchFamily="49" charset="0"/>
                 <a:cs typeface="Consolas" panose="020B0609020204030204" pitchFamily="49" charset="0"/>
               </a:rPr>
+              <a:t> std::</a:t>
+            </a:r>
+            <a:r>
+              <a:rPr lang="en-US" dirty="0" err="1">
+                <a:latin typeface="Consolas" panose="020B0609020204030204" pitchFamily="49" charset="0"/>
+                <a:cs typeface="Consolas" panose="020B0609020204030204" pitchFamily="49" charset="0"/>
+              </a:rPr>
+              <a:t>logic_error</a:t>
+            </a:r>
+            <a:r>
+              <a:rPr lang="en-US" dirty="0">
+                <a:latin typeface="Consolas" panose="020B0609020204030204" pitchFamily="49" charset="0"/>
+                <a:cs typeface="Consolas" panose="020B0609020204030204" pitchFamily="49" charset="0"/>
+              </a:rPr>
+              <a:t> {</a:t>
+            </a:r>
+          </a:p>
+          <a:p>
+            <a:r>
+              <a:rPr lang="en-US" b="1" dirty="0">
+                <a:latin typeface="Consolas" panose="020B0609020204030204" pitchFamily="49" charset="0"/>
+                <a:cs typeface="Consolas" panose="020B0609020204030204" pitchFamily="49" charset="0"/>
+              </a:rPr>
+              <a:t>public</a:t>
+            </a:r>
+            <a:r>
+              <a:rPr lang="en-US" dirty="0">
+                <a:latin typeface="Consolas" panose="020B0609020204030204" pitchFamily="49" charset="0"/>
+                <a:cs typeface="Consolas" panose="020B0609020204030204" pitchFamily="49" charset="0"/>
+              </a:rPr>
+              <a:t>:</a:t>
+            </a:r>
+          </a:p>
+          <a:p>
+            <a:r>
+              <a:rPr lang="en-US" dirty="0">
+                <a:latin typeface="Consolas" panose="020B0609020204030204" pitchFamily="49" charset="0"/>
+                <a:cs typeface="Consolas" panose="020B0609020204030204" pitchFamily="49" charset="0"/>
+              </a:rPr>
+              <a:t>    </a:t>
+            </a:r>
+            <a:r>
+              <a:rPr lang="en-US" b="1" dirty="0">
+                <a:latin typeface="Consolas" panose="020B0609020204030204" pitchFamily="49" charset="0"/>
+                <a:cs typeface="Consolas" panose="020B0609020204030204" pitchFamily="49" charset="0"/>
+              </a:rPr>
+              <a:t>explicit</a:t>
+            </a:r>
+            <a:r>
+              <a:rPr lang="en-US" dirty="0">
+                <a:latin typeface="Consolas" panose="020B0609020204030204" pitchFamily="49" charset="0"/>
+                <a:cs typeface="Consolas" panose="020B0609020204030204" pitchFamily="49" charset="0"/>
+              </a:rPr>
               <a:t> </a:t>
             </a:r>
             <a:r>
@@ -8350,59 +8405,6 @@
                 <a:latin typeface="Consolas" panose="020B0609020204030204" pitchFamily="49" charset="0"/>
                 <a:cs typeface="Consolas" panose="020B0609020204030204" pitchFamily="49" charset="0"/>
               </a:rPr>
-              <a:t>logic_error</a:t>
-            </a:r>
-            <a:r>
-              <a:rPr lang="en-US" dirty="0">
-                <a:latin typeface="Consolas" panose="020B0609020204030204" pitchFamily="49" charset="0"/>
-                <a:cs typeface="Consolas" panose="020B0609020204030204" pitchFamily="49" charset="0"/>
-              </a:rPr>
-              <a:t> {</a:t>
-            </a:r>
-          </a:p>
-          <a:p>
-            <a:r>
-              <a:rPr lang="en-US" b="1" dirty="0">
-                <a:latin typeface="Consolas" panose="020B0609020204030204" pitchFamily="49" charset="0"/>
-                <a:cs typeface="Consolas" panose="020B0609020204030204" pitchFamily="49" charset="0"/>
-              </a:rPr>
-              <a:t>public</a:t>
-            </a:r>
-            <a:r>
-              <a:rPr lang="en-US" dirty="0">
-                <a:latin typeface="Consolas" panose="020B0609020204030204" pitchFamily="49" charset="0"/>
-                <a:cs typeface="Consolas" panose="020B0609020204030204" pitchFamily="49" charset="0"/>
-              </a:rPr>
-              <a:t>:</a:t>
-            </a:r>
-          </a:p>
-          <a:p>
-            <a:r>
-              <a:rPr lang="en-US" dirty="0">
-                <a:latin typeface="Consolas" panose="020B0609020204030204" pitchFamily="49" charset="0"/>
-                <a:cs typeface="Consolas" panose="020B0609020204030204" pitchFamily="49" charset="0"/>
-              </a:rPr>
-              <a:t>    </a:t>
-            </a:r>
-            <a:r>
-              <a:rPr lang="en-US" b="1" dirty="0">
-                <a:latin typeface="Consolas" panose="020B0609020204030204" pitchFamily="49" charset="0"/>
-                <a:cs typeface="Consolas" panose="020B0609020204030204" pitchFamily="49" charset="0"/>
-              </a:rPr>
-              <a:t>explicit</a:t>
-            </a:r>
-            <a:r>
-              <a:rPr lang="en-US" dirty="0">
-                <a:latin typeface="Consolas" panose="020B0609020204030204" pitchFamily="49" charset="0"/>
-                <a:cs typeface="Consolas" panose="020B0609020204030204" pitchFamily="49" charset="0"/>
-              </a:rPr>
-              <a:t> </a:t>
-            </a:r>
-            <a:r>
-              <a:rPr lang="en-US" dirty="0" err="1">
-                <a:latin typeface="Consolas" panose="020B0609020204030204" pitchFamily="49" charset="0"/>
-                <a:cs typeface="Consolas" panose="020B0609020204030204" pitchFamily="49" charset="0"/>
-              </a:rPr>
               <a:t>NotImplemented</a:t>
             </a:r>
             <a:r>
@@ -8419,7 +8421,7 @@
                 <a:latin typeface="Consolas" panose="020B0609020204030204" pitchFamily="49" charset="0"/>
                 <a:cs typeface="Consolas" panose="020B0609020204030204" pitchFamily="49" charset="0"/>
               </a:rPr>
-              <a:t>        </a:t>
+              <a:t>        std::</a:t>
             </a:r>
             <a:r>
               <a:rPr lang="en-US" dirty="0" err="1">
@@ -8596,7 +8598,18 @@
           <a:p>
             <a:r>
               <a:rPr lang="en-US" dirty="0"/>
-              <a:t>The C++ standard defines other exceptions derived for exception for various special purposes. For example:</a:t>
+              <a:t>The C++ standard defines other exceptions derived from </a:t>
+            </a:r>
+            <a:r>
+              <a:rPr lang="en-US" dirty="0">
+                <a:latin typeface="Consolas" panose="020B0609020204030204" pitchFamily="49" charset="0"/>
+                <a:cs typeface="Consolas" panose="020B0609020204030204" pitchFamily="49" charset="0"/>
+              </a:rPr>
+              <a:t>std::exception</a:t>
+            </a:r>
+            <a:r>
+              <a:rPr lang="en-US" dirty="0"/>
+              <a:t> for various special purposes. For example:</a:t>
             </a:r>
           </a:p>
           <a:p>
@@ -9672,16 +9685,796 @@
           <a:lstStyle/>
           <a:p>
             <a:r>
-              <a:rPr lang="en-US" i="1" dirty="0"/>
-              <a:t>Finish Me!</a:t>
-            </a:r>
-          </a:p>
-        </p:txBody>
-      </p:sp>
+              <a:rPr lang="en-US" dirty="0"/>
+              <a:t>General exception specifications have questionable utility…</a:t>
+            </a:r>
+          </a:p>
+          <a:p>
+            <a:r>
+              <a:rPr lang="en-US" dirty="0"/>
+              <a:t>… but it is useful to know if any exceptions will be thrown at all</a:t>
+            </a:r>
+          </a:p>
+          <a:p>
+            <a:r>
+              <a:rPr lang="en-US" dirty="0"/>
+              <a:t>C++ 2011 (and beyond) allows you to declare </a:t>
+            </a:r>
+            <a:r>
+              <a:rPr lang="en-US" dirty="0" err="1">
+                <a:latin typeface="Consolas" panose="020B0609020204030204" pitchFamily="49" charset="0"/>
+                <a:cs typeface="Consolas" panose="020B0609020204030204" pitchFamily="49" charset="0"/>
+              </a:rPr>
+              <a:t>noexcept</a:t>
+            </a:r>
+            <a:r>
+              <a:rPr lang="en-US" dirty="0"/>
+              <a:t> functions</a:t>
+            </a:r>
+          </a:p>
+        </p:txBody>
+      </p:sp>
+      <p:sp>
+        <p:nvSpPr>
+          <p:cNvPr id="4" name="TextBox 3">
+            <a:extLst>
+              <a:ext uri="{FF2B5EF4-FFF2-40B4-BE49-F238E27FC236}">
+                <a16:creationId xmlns:a16="http://schemas.microsoft.com/office/drawing/2014/main" id="{F5563102-EDD5-366C-6F8E-981409F2572A}"/>
+              </a:ext>
+            </a:extLst>
+          </p:cNvPr>
+          <p:cNvSpPr txBox="1"/>
+          <p:nvPr/>
+        </p:nvSpPr>
+        <p:spPr>
+          <a:xfrm>
+            <a:off x="2100943" y="3668486"/>
+            <a:ext cx="5376793" cy="1754326"/>
+          </a:xfrm>
+          <a:prstGeom prst="rect">
+            <a:avLst/>
+          </a:prstGeom>
+          <a:noFill/>
+        </p:spPr>
+        <p:txBody>
+          <a:bodyPr wrap="none" rtlCol="0">
+            <a:spAutoFit/>
+          </a:bodyPr>
+          <a:lstStyle/>
+          <a:p>
+            <a:r>
+              <a:rPr lang="en-US" b="1" dirty="0">
+                <a:latin typeface="Consolas" panose="020B0609020204030204" pitchFamily="49" charset="0"/>
+                <a:cs typeface="Consolas" panose="020B0609020204030204" pitchFamily="49" charset="0"/>
+              </a:rPr>
+              <a:t>void</a:t>
+            </a:r>
+            <a:r>
+              <a:rPr lang="en-US" dirty="0">
+                <a:latin typeface="Consolas" panose="020B0609020204030204" pitchFamily="49" charset="0"/>
+                <a:cs typeface="Consolas" panose="020B0609020204030204" pitchFamily="49" charset="0"/>
+              </a:rPr>
+              <a:t> </a:t>
+            </a:r>
+            <a:r>
+              <a:rPr lang="en-US" dirty="0" err="1">
+                <a:latin typeface="Consolas" panose="020B0609020204030204" pitchFamily="49" charset="0"/>
+                <a:cs typeface="Consolas" panose="020B0609020204030204" pitchFamily="49" charset="0"/>
+              </a:rPr>
+              <a:t>swap_ints</a:t>
+            </a:r>
+            <a:r>
+              <a:rPr lang="en-US" dirty="0">
+                <a:latin typeface="Consolas" panose="020B0609020204030204" pitchFamily="49" charset="0"/>
+                <a:cs typeface="Consolas" panose="020B0609020204030204" pitchFamily="49" charset="0"/>
+              </a:rPr>
+              <a:t>( </a:t>
+            </a:r>
+            <a:r>
+              <a:rPr lang="en-US" b="1" dirty="0">
+                <a:latin typeface="Consolas" panose="020B0609020204030204" pitchFamily="49" charset="0"/>
+                <a:cs typeface="Consolas" panose="020B0609020204030204" pitchFamily="49" charset="0"/>
+              </a:rPr>
+              <a:t>int</a:t>
+            </a:r>
+            <a:r>
+              <a:rPr lang="en-US" dirty="0">
+                <a:latin typeface="Consolas" panose="020B0609020204030204" pitchFamily="49" charset="0"/>
+                <a:cs typeface="Consolas" panose="020B0609020204030204" pitchFamily="49" charset="0"/>
+              </a:rPr>
+              <a:t> &amp;x, </a:t>
+            </a:r>
+            <a:r>
+              <a:rPr lang="en-US" b="1" dirty="0">
+                <a:latin typeface="Consolas" panose="020B0609020204030204" pitchFamily="49" charset="0"/>
+                <a:cs typeface="Consolas" panose="020B0609020204030204" pitchFamily="49" charset="0"/>
+              </a:rPr>
+              <a:t>int</a:t>
+            </a:r>
+            <a:r>
+              <a:rPr lang="en-US" dirty="0">
+                <a:latin typeface="Consolas" panose="020B0609020204030204" pitchFamily="49" charset="0"/>
+                <a:cs typeface="Consolas" panose="020B0609020204030204" pitchFamily="49" charset="0"/>
+              </a:rPr>
+              <a:t> &amp;y ) </a:t>
+            </a:r>
+            <a:r>
+              <a:rPr lang="en-US" b="1" dirty="0" err="1">
+                <a:latin typeface="Consolas" panose="020B0609020204030204" pitchFamily="49" charset="0"/>
+                <a:cs typeface="Consolas" panose="020B0609020204030204" pitchFamily="49" charset="0"/>
+              </a:rPr>
+              <a:t>noexcept</a:t>
+            </a:r>
+            <a:endParaRPr lang="en-US" b="1" dirty="0">
+              <a:latin typeface="Consolas" panose="020B0609020204030204" pitchFamily="49" charset="0"/>
+              <a:cs typeface="Consolas" panose="020B0609020204030204" pitchFamily="49" charset="0"/>
+            </a:endParaRPr>
+          </a:p>
+          <a:p>
+            <a:r>
+              <a:rPr lang="en-US" dirty="0">
+                <a:latin typeface="Consolas" panose="020B0609020204030204" pitchFamily="49" charset="0"/>
+                <a:cs typeface="Consolas" panose="020B0609020204030204" pitchFamily="49" charset="0"/>
+              </a:rPr>
+              <a:t>{</a:t>
+            </a:r>
+          </a:p>
+          <a:p>
+            <a:r>
+              <a:rPr lang="en-US" dirty="0">
+                <a:latin typeface="Consolas" panose="020B0609020204030204" pitchFamily="49" charset="0"/>
+                <a:cs typeface="Consolas" panose="020B0609020204030204" pitchFamily="49" charset="0"/>
+              </a:rPr>
+              <a:t>    </a:t>
+            </a:r>
+            <a:r>
+              <a:rPr lang="en-US" b="1" dirty="0">
+                <a:latin typeface="Consolas" panose="020B0609020204030204" pitchFamily="49" charset="0"/>
+                <a:cs typeface="Consolas" panose="020B0609020204030204" pitchFamily="49" charset="0"/>
+              </a:rPr>
+              <a:t>int</a:t>
+            </a:r>
+            <a:r>
+              <a:rPr lang="en-US" dirty="0">
+                <a:latin typeface="Consolas" panose="020B0609020204030204" pitchFamily="49" charset="0"/>
+                <a:cs typeface="Consolas" panose="020B0609020204030204" pitchFamily="49" charset="0"/>
+              </a:rPr>
+              <a:t> temp = x;</a:t>
+            </a:r>
+          </a:p>
+          <a:p>
+            <a:r>
+              <a:rPr lang="en-US" dirty="0">
+                <a:latin typeface="Consolas" panose="020B0609020204030204" pitchFamily="49" charset="0"/>
+                <a:cs typeface="Consolas" panose="020B0609020204030204" pitchFamily="49" charset="0"/>
+              </a:rPr>
+              <a:t>    x = y;</a:t>
+            </a:r>
+          </a:p>
+          <a:p>
+            <a:r>
+              <a:rPr lang="en-US" dirty="0">
+                <a:latin typeface="Consolas" panose="020B0609020204030204" pitchFamily="49" charset="0"/>
+                <a:cs typeface="Consolas" panose="020B0609020204030204" pitchFamily="49" charset="0"/>
+              </a:rPr>
+              <a:t>    y = temp;</a:t>
+            </a:r>
+          </a:p>
+          <a:p>
+            <a:r>
+              <a:rPr lang="en-US" dirty="0">
+                <a:latin typeface="Consolas" panose="020B0609020204030204" pitchFamily="49" charset="0"/>
+                <a:cs typeface="Consolas" panose="020B0609020204030204" pitchFamily="49" charset="0"/>
+              </a:rPr>
+              <a:t>}</a:t>
+            </a:r>
+          </a:p>
+        </p:txBody>
+      </p:sp>
+      <p:sp>
+        <p:nvSpPr>
+          <p:cNvPr id="5" name="TextBox 4">
+            <a:extLst>
+              <a:ext uri="{FF2B5EF4-FFF2-40B4-BE49-F238E27FC236}">
+                <a16:creationId xmlns:a16="http://schemas.microsoft.com/office/drawing/2014/main" id="{019A8842-6801-A59B-41F6-FFF7B125330E}"/>
+              </a:ext>
+            </a:extLst>
+          </p:cNvPr>
+          <p:cNvSpPr txBox="1"/>
+          <p:nvPr/>
+        </p:nvSpPr>
+        <p:spPr>
+          <a:xfrm>
+            <a:off x="7707086" y="4360983"/>
+            <a:ext cx="4167295" cy="369332"/>
+          </a:xfrm>
+          <a:prstGeom prst="rect">
+            <a:avLst/>
+          </a:prstGeom>
+          <a:noFill/>
+        </p:spPr>
+        <p:txBody>
+          <a:bodyPr wrap="none" rtlCol="0">
+            <a:spAutoFit/>
+          </a:bodyPr>
+          <a:lstStyle/>
+          <a:p>
+            <a:r>
+              <a:rPr lang="en-US" dirty="0"/>
+              <a:t>A promise that this function will not throw</a:t>
+            </a:r>
+          </a:p>
+        </p:txBody>
+      </p:sp>
+      <p:cxnSp>
+        <p:nvCxnSpPr>
+          <p:cNvPr id="7" name="Straight Arrow Connector 6">
+            <a:extLst>
+              <a:ext uri="{FF2B5EF4-FFF2-40B4-BE49-F238E27FC236}">
+                <a16:creationId xmlns:a16="http://schemas.microsoft.com/office/drawing/2014/main" id="{29BA9702-BE91-3013-86C1-7DEB9C85E920}"/>
+              </a:ext>
+            </a:extLst>
+          </p:cNvPr>
+          <p:cNvCxnSpPr>
+            <a:cxnSpLocks/>
+            <a:stCxn id="5" idx="1"/>
+          </p:cNvCxnSpPr>
+          <p:nvPr/>
+        </p:nvCxnSpPr>
+        <p:spPr>
+          <a:xfrm flipH="1" flipV="1">
+            <a:off x="6988629" y="4001294"/>
+            <a:ext cx="718457" cy="544355"/>
+          </a:xfrm>
+          <a:prstGeom prst="straightConnector1">
+            <a:avLst/>
+          </a:prstGeom>
+          <a:ln>
+            <a:tailEnd type="triangle"/>
+          </a:ln>
+        </p:spPr>
+        <p:style>
+          <a:lnRef idx="1">
+            <a:schemeClr val="accent1"/>
+          </a:lnRef>
+          <a:fillRef idx="0">
+            <a:schemeClr val="accent1"/>
+          </a:fillRef>
+          <a:effectRef idx="0">
+            <a:schemeClr val="accent1"/>
+          </a:effectRef>
+          <a:fontRef idx="minor">
+            <a:schemeClr val="tx1"/>
+          </a:fontRef>
+        </p:style>
+      </p:cxnSp>
+      <p:sp>
+        <p:nvSpPr>
+          <p:cNvPr id="9" name="TextBox 8">
+            <a:extLst>
+              <a:ext uri="{FF2B5EF4-FFF2-40B4-BE49-F238E27FC236}">
+                <a16:creationId xmlns:a16="http://schemas.microsoft.com/office/drawing/2014/main" id="{2055F768-44EF-E7AF-4A65-87CE9248714B}"/>
+              </a:ext>
+            </a:extLst>
+          </p:cNvPr>
+          <p:cNvSpPr txBox="1"/>
+          <p:nvPr/>
+        </p:nvSpPr>
+        <p:spPr>
+          <a:xfrm>
+            <a:off x="5394561" y="5373083"/>
+            <a:ext cx="4625049" cy="369332"/>
+          </a:xfrm>
+          <a:prstGeom prst="rect">
+            <a:avLst/>
+          </a:prstGeom>
+          <a:noFill/>
+        </p:spPr>
+        <p:txBody>
+          <a:bodyPr wrap="none" rtlCol="0">
+            <a:spAutoFit/>
+          </a:bodyPr>
+          <a:lstStyle/>
+          <a:p>
+            <a:r>
+              <a:rPr lang="en-US" dirty="0"/>
+              <a:t>Copying integers does not throw. Promise kept!</a:t>
+            </a:r>
+          </a:p>
+        </p:txBody>
+      </p:sp>
+      <p:cxnSp>
+        <p:nvCxnSpPr>
+          <p:cNvPr id="11" name="Straight Arrow Connector 10">
+            <a:extLst>
+              <a:ext uri="{FF2B5EF4-FFF2-40B4-BE49-F238E27FC236}">
+                <a16:creationId xmlns:a16="http://schemas.microsoft.com/office/drawing/2014/main" id="{A24EE7CD-E81C-5C31-A25B-4EFC9AA46D1A}"/>
+              </a:ext>
+            </a:extLst>
+          </p:cNvPr>
+          <p:cNvCxnSpPr>
+            <a:cxnSpLocks/>
+            <a:stCxn id="9" idx="1"/>
+          </p:cNvCxnSpPr>
+          <p:nvPr/>
+        </p:nvCxnSpPr>
+        <p:spPr>
+          <a:xfrm flipH="1" flipV="1">
+            <a:off x="3951514" y="4833257"/>
+            <a:ext cx="1443047" cy="724492"/>
+          </a:xfrm>
+          <a:prstGeom prst="straightConnector1">
+            <a:avLst/>
+          </a:prstGeom>
+          <a:ln>
+            <a:tailEnd type="triangle"/>
+          </a:ln>
+        </p:spPr>
+        <p:style>
+          <a:lnRef idx="1">
+            <a:schemeClr val="accent1"/>
+          </a:lnRef>
+          <a:fillRef idx="0">
+            <a:schemeClr val="accent1"/>
+          </a:fillRef>
+          <a:effectRef idx="0">
+            <a:schemeClr val="accent1"/>
+          </a:effectRef>
+          <a:fontRef idx="minor">
+            <a:schemeClr val="tx1"/>
+          </a:fontRef>
+        </p:style>
+      </p:cxnSp>
     </p:spTree>
     <p:extLst>
       <p:ext uri="{BB962C8B-B14F-4D97-AF65-F5344CB8AC3E}">
         <p14:creationId xmlns:p14="http://schemas.microsoft.com/office/powerpoint/2010/main" val="516076572"/>
+      </p:ext>
+    </p:extLst>
+  </p:cSld>
+  <p:clrMapOvr>
+    <a:masterClrMapping/>
+  </p:clrMapOvr>
+</p:sld>
+</file>
+
+<file path=ppt/slides/slide34.xml><?xml version="1.0" encoding="utf-8"?>
+<p:sld xmlns:a="http://schemas.openxmlformats.org/drawingml/2006/main" xmlns:r="http://schemas.openxmlformats.org/officeDocument/2006/relationships" xmlns:p="http://schemas.openxmlformats.org/presentationml/2006/main">
+  <p:cSld>
+    <p:spTree>
+      <p:nvGrpSpPr>
+        <p:cNvPr id="1" name=""/>
+        <p:cNvGrpSpPr/>
+        <p:nvPr/>
+      </p:nvGrpSpPr>
+      <p:grpSpPr>
+        <a:xfrm>
+          <a:off x="0" y="0"/>
+          <a:ext cx="0" cy="0"/>
+          <a:chOff x="0" y="0"/>
+          <a:chExt cx="0" cy="0"/>
+        </a:xfrm>
+      </p:grpSpPr>
+      <p:sp>
+        <p:nvSpPr>
+          <p:cNvPr id="2" name="Title 1">
+            <a:extLst>
+              <a:ext uri="{FF2B5EF4-FFF2-40B4-BE49-F238E27FC236}">
+                <a16:creationId xmlns:a16="http://schemas.microsoft.com/office/drawing/2014/main" id="{C198EEF9-9A5A-7970-90DB-0F53297D0DC0}"/>
+              </a:ext>
+            </a:extLst>
+          </p:cNvPr>
+          <p:cNvSpPr>
+            <a:spLocks noGrp="1"/>
+          </p:cNvSpPr>
+          <p:nvPr>
+            <p:ph type="title"/>
+          </p:nvPr>
+        </p:nvSpPr>
+        <p:spPr/>
+        <p:txBody>
+          <a:bodyPr/>
+          <a:lstStyle/>
+          <a:p>
+            <a:r>
+              <a:rPr lang="en-US" dirty="0"/>
+              <a:t>What’s the Point?</a:t>
+            </a:r>
+          </a:p>
+        </p:txBody>
+      </p:sp>
+      <p:sp>
+        <p:nvSpPr>
+          <p:cNvPr id="3" name="Content Placeholder 2">
+            <a:extLst>
+              <a:ext uri="{FF2B5EF4-FFF2-40B4-BE49-F238E27FC236}">
+                <a16:creationId xmlns:a16="http://schemas.microsoft.com/office/drawing/2014/main" id="{18323BD9-97F8-B95B-BE2B-31F7DDFD4AE4}"/>
+              </a:ext>
+            </a:extLst>
+          </p:cNvPr>
+          <p:cNvSpPr>
+            <a:spLocks noGrp="1"/>
+          </p:cNvSpPr>
+          <p:nvPr>
+            <p:ph idx="1"/>
+          </p:nvPr>
+        </p:nvSpPr>
+        <p:spPr/>
+        <p:txBody>
+          <a:bodyPr/>
+          <a:lstStyle/>
+          <a:p>
+            <a:r>
+              <a:rPr lang="en-US" dirty="0"/>
+              <a:t>Better documentation. To evaluate exception safety, you need to know what does </a:t>
+            </a:r>
+            <a:r>
+              <a:rPr lang="en-US" i="1" dirty="0"/>
+              <a:t>not</a:t>
+            </a:r>
+            <a:r>
+              <a:rPr lang="en-US" dirty="0"/>
+              <a:t> throw</a:t>
+            </a:r>
+          </a:p>
+          <a:p>
+            <a:pPr lvl="1"/>
+            <a:r>
+              <a:rPr lang="en-US" dirty="0"/>
+              <a:t>Expressions involving primitive types</a:t>
+            </a:r>
+          </a:p>
+          <a:p>
+            <a:pPr lvl="1"/>
+            <a:r>
+              <a:rPr lang="en-US" dirty="0"/>
+              <a:t>(Raw) pointer manipulation</a:t>
+            </a:r>
+          </a:p>
+          <a:p>
+            <a:pPr lvl="1"/>
+            <a:r>
+              <a:rPr lang="en-US" dirty="0"/>
+              <a:t>Accessing memory (might cause UB, i.e., out-of-bounds access)</a:t>
+            </a:r>
+          </a:p>
+          <a:p>
+            <a:pPr lvl="1"/>
+            <a:r>
+              <a:rPr lang="en-US" u="sng" dirty="0"/>
+              <a:t>Calling any function marked as </a:t>
+            </a:r>
+            <a:r>
+              <a:rPr lang="en-US" u="sng" dirty="0" err="1">
+                <a:latin typeface="Consolas" panose="020B0609020204030204" pitchFamily="49" charset="0"/>
+                <a:cs typeface="Consolas" panose="020B0609020204030204" pitchFamily="49" charset="0"/>
+              </a:rPr>
+              <a:t>noexcept</a:t>
+            </a:r>
+            <a:r>
+              <a:rPr lang="en-US" dirty="0">
+                <a:cs typeface="Consolas" panose="020B0609020204030204" pitchFamily="49" charset="0"/>
+              </a:rPr>
+              <a:t> (tools can potentially help)</a:t>
+            </a:r>
+          </a:p>
+          <a:p>
+            <a:r>
+              <a:rPr lang="en-US" dirty="0">
+                <a:cs typeface="Consolas" panose="020B0609020204030204" pitchFamily="49" charset="0"/>
+              </a:rPr>
+              <a:t>Better optimization.</a:t>
+            </a:r>
+          </a:p>
+          <a:p>
+            <a:pPr lvl="1"/>
+            <a:r>
+              <a:rPr lang="en-US" dirty="0">
+                <a:cs typeface="Consolas" panose="020B0609020204030204" pitchFamily="49" charset="0"/>
+              </a:rPr>
+              <a:t>Generating code to deal with exceptions is complicated for the compiler</a:t>
+            </a:r>
+          </a:p>
+          <a:p>
+            <a:pPr lvl="1"/>
+            <a:r>
+              <a:rPr lang="en-US" dirty="0">
+                <a:cs typeface="Consolas" panose="020B0609020204030204" pitchFamily="49" charset="0"/>
+              </a:rPr>
+              <a:t>Functions not marked as </a:t>
+            </a:r>
+            <a:r>
+              <a:rPr lang="en-US" dirty="0" err="1">
+                <a:latin typeface="Consolas" panose="020B0609020204030204" pitchFamily="49" charset="0"/>
+                <a:cs typeface="Consolas" panose="020B0609020204030204" pitchFamily="49" charset="0"/>
+              </a:rPr>
+              <a:t>noexcept</a:t>
+            </a:r>
+            <a:r>
+              <a:rPr lang="en-US" dirty="0">
+                <a:cs typeface="Consolas" panose="020B0609020204030204" pitchFamily="49" charset="0"/>
+              </a:rPr>
+              <a:t> are assumed to maybe throw</a:t>
+            </a:r>
+          </a:p>
+          <a:p>
+            <a:pPr lvl="1"/>
+            <a:r>
+              <a:rPr lang="en-US" dirty="0">
+                <a:cs typeface="Consolas" panose="020B0609020204030204" pitchFamily="49" charset="0"/>
+              </a:rPr>
+              <a:t>Thus, </a:t>
+            </a:r>
+            <a:r>
+              <a:rPr lang="en-US" dirty="0" err="1">
+                <a:latin typeface="Consolas" panose="020B0609020204030204" pitchFamily="49" charset="0"/>
+                <a:cs typeface="Consolas" panose="020B0609020204030204" pitchFamily="49" charset="0"/>
+              </a:rPr>
+              <a:t>noexcept</a:t>
+            </a:r>
+            <a:r>
+              <a:rPr lang="en-US" dirty="0">
+                <a:cs typeface="Consolas" panose="020B0609020204030204" pitchFamily="49" charset="0"/>
+              </a:rPr>
+              <a:t> makes it possible for the compiler to simplify the code</a:t>
+            </a:r>
+          </a:p>
+        </p:txBody>
+      </p:sp>
+    </p:spTree>
+    <p:extLst>
+      <p:ext uri="{BB962C8B-B14F-4D97-AF65-F5344CB8AC3E}">
+        <p14:creationId xmlns:p14="http://schemas.microsoft.com/office/powerpoint/2010/main" val="170546909"/>
+      </p:ext>
+    </p:extLst>
+  </p:cSld>
+  <p:clrMapOvr>
+    <a:masterClrMapping/>
+  </p:clrMapOvr>
+</p:sld>
+</file>
+
+<file path=ppt/slides/slide35.xml><?xml version="1.0" encoding="utf-8"?>
+<p:sld xmlns:a="http://schemas.openxmlformats.org/drawingml/2006/main" xmlns:r="http://schemas.openxmlformats.org/officeDocument/2006/relationships" xmlns:p="http://schemas.openxmlformats.org/presentationml/2006/main">
+  <p:cSld>
+    <p:spTree>
+      <p:nvGrpSpPr>
+        <p:cNvPr id="1" name=""/>
+        <p:cNvGrpSpPr/>
+        <p:nvPr/>
+      </p:nvGrpSpPr>
+      <p:grpSpPr>
+        <a:xfrm>
+          <a:off x="0" y="0"/>
+          <a:ext cx="0" cy="0"/>
+          <a:chOff x="0" y="0"/>
+          <a:chExt cx="0" cy="0"/>
+        </a:xfrm>
+      </p:grpSpPr>
+      <p:sp>
+        <p:nvSpPr>
+          <p:cNvPr id="2" name="Title 1">
+            <a:extLst>
+              <a:ext uri="{FF2B5EF4-FFF2-40B4-BE49-F238E27FC236}">
+                <a16:creationId xmlns:a16="http://schemas.microsoft.com/office/drawing/2014/main" id="{5420D36D-B26A-1433-ACB5-89C0690742D4}"/>
+              </a:ext>
+            </a:extLst>
+          </p:cNvPr>
+          <p:cNvSpPr>
+            <a:spLocks noGrp="1"/>
+          </p:cNvSpPr>
+          <p:nvPr>
+            <p:ph type="title"/>
+          </p:nvPr>
+        </p:nvSpPr>
+        <p:spPr/>
+        <p:txBody>
+          <a:bodyPr/>
+          <a:lstStyle/>
+          <a:p>
+            <a:r>
+              <a:rPr lang="en-US" dirty="0"/>
+              <a:t>What If You Lie?</a:t>
+            </a:r>
+          </a:p>
+        </p:txBody>
+      </p:sp>
+      <p:sp>
+        <p:nvSpPr>
+          <p:cNvPr id="3" name="Content Placeholder 2">
+            <a:extLst>
+              <a:ext uri="{FF2B5EF4-FFF2-40B4-BE49-F238E27FC236}">
+                <a16:creationId xmlns:a16="http://schemas.microsoft.com/office/drawing/2014/main" id="{ACC8DF56-26F2-0789-18D1-B51D7B0BF7B2}"/>
+              </a:ext>
+            </a:extLst>
+          </p:cNvPr>
+          <p:cNvSpPr>
+            <a:spLocks noGrp="1"/>
+          </p:cNvSpPr>
+          <p:nvPr>
+            <p:ph idx="1"/>
+          </p:nvPr>
+        </p:nvSpPr>
+        <p:spPr/>
+        <p:txBody>
+          <a:bodyPr/>
+          <a:lstStyle/>
+          <a:p>
+            <a:r>
+              <a:rPr lang="en-US" dirty="0"/>
+              <a:t>For example:</a:t>
+            </a:r>
+            <a:br>
+              <a:rPr lang="en-US" dirty="0"/>
+            </a:br>
+            <a:br>
+              <a:rPr lang="en-US" dirty="0"/>
+            </a:br>
+            <a:br>
+              <a:rPr lang="en-US" dirty="0"/>
+            </a:br>
+            <a:br>
+              <a:rPr lang="en-US" dirty="0"/>
+            </a:br>
+            <a:endParaRPr lang="en-US" dirty="0"/>
+          </a:p>
+          <a:p>
+            <a:r>
+              <a:rPr lang="en-US" i="1" dirty="0"/>
+              <a:t>The program terminates at once!</a:t>
+            </a:r>
+          </a:p>
+          <a:p>
+            <a:r>
+              <a:rPr lang="en-US" dirty="0"/>
+              <a:t>This might seem harsh, but…</a:t>
+            </a:r>
+          </a:p>
+          <a:p>
+            <a:pPr lvl="1"/>
+            <a:r>
+              <a:rPr lang="en-US" dirty="0"/>
+              <a:t>… the program is violating its contracts</a:t>
+            </a:r>
+          </a:p>
+          <a:p>
+            <a:pPr lvl="1"/>
+            <a:r>
+              <a:rPr lang="en-US" dirty="0"/>
+              <a:t>This is an internal matter; a bug to be caught during testing</a:t>
+            </a:r>
+          </a:p>
+          <a:p>
+            <a:r>
+              <a:rPr lang="en-US" u="sng" dirty="0"/>
+              <a:t>It is </a:t>
+            </a:r>
+            <a:r>
+              <a:rPr lang="en-US" i="1" u="sng" dirty="0"/>
+              <a:t>not</a:t>
+            </a:r>
+            <a:r>
+              <a:rPr lang="en-US" u="sng" dirty="0"/>
+              <a:t> a compile-time error!</a:t>
+            </a:r>
+          </a:p>
+        </p:txBody>
+      </p:sp>
+      <p:sp>
+        <p:nvSpPr>
+          <p:cNvPr id="4" name="TextBox 3">
+            <a:extLst>
+              <a:ext uri="{FF2B5EF4-FFF2-40B4-BE49-F238E27FC236}">
+                <a16:creationId xmlns:a16="http://schemas.microsoft.com/office/drawing/2014/main" id="{DCD31DE6-0316-A62E-3322-9C9AB6F1526A}"/>
+              </a:ext>
+            </a:extLst>
+          </p:cNvPr>
+          <p:cNvSpPr txBox="1"/>
+          <p:nvPr/>
+        </p:nvSpPr>
+        <p:spPr>
+          <a:xfrm>
+            <a:off x="1110343" y="2438401"/>
+            <a:ext cx="5883342" cy="1200329"/>
+          </a:xfrm>
+          <a:prstGeom prst="rect">
+            <a:avLst/>
+          </a:prstGeom>
+          <a:noFill/>
+        </p:spPr>
+        <p:txBody>
+          <a:bodyPr wrap="none" rtlCol="0">
+            <a:spAutoFit/>
+          </a:bodyPr>
+          <a:lstStyle/>
+          <a:p>
+            <a:r>
+              <a:rPr lang="en-US" b="1" dirty="0">
+                <a:latin typeface="Consolas" panose="020B0609020204030204" pitchFamily="49" charset="0"/>
+                <a:cs typeface="Consolas" panose="020B0609020204030204" pitchFamily="49" charset="0"/>
+              </a:rPr>
+              <a:t>void</a:t>
+            </a:r>
+            <a:r>
+              <a:rPr lang="en-US" dirty="0">
+                <a:latin typeface="Consolas" panose="020B0609020204030204" pitchFamily="49" charset="0"/>
+                <a:cs typeface="Consolas" panose="020B0609020204030204" pitchFamily="49" charset="0"/>
+              </a:rPr>
+              <a:t> f( ) </a:t>
+            </a:r>
+            <a:r>
+              <a:rPr lang="en-US" b="1" dirty="0" err="1">
+                <a:latin typeface="Consolas" panose="020B0609020204030204" pitchFamily="49" charset="0"/>
+                <a:cs typeface="Consolas" panose="020B0609020204030204" pitchFamily="49" charset="0"/>
+              </a:rPr>
+              <a:t>noexcept</a:t>
+            </a:r>
+            <a:endParaRPr lang="en-US" b="1" dirty="0">
+              <a:latin typeface="Consolas" panose="020B0609020204030204" pitchFamily="49" charset="0"/>
+              <a:cs typeface="Consolas" panose="020B0609020204030204" pitchFamily="49" charset="0"/>
+            </a:endParaRPr>
+          </a:p>
+          <a:p>
+            <a:r>
+              <a:rPr lang="en-US" dirty="0">
+                <a:latin typeface="Consolas" panose="020B0609020204030204" pitchFamily="49" charset="0"/>
+                <a:cs typeface="Consolas" panose="020B0609020204030204" pitchFamily="49" charset="0"/>
+              </a:rPr>
+              <a:t>{</a:t>
+            </a:r>
+          </a:p>
+          <a:p>
+            <a:r>
+              <a:rPr lang="en-US" dirty="0">
+                <a:latin typeface="Consolas" panose="020B0609020204030204" pitchFamily="49" charset="0"/>
+                <a:cs typeface="Consolas" panose="020B0609020204030204" pitchFamily="49" charset="0"/>
+              </a:rPr>
+              <a:t>    </a:t>
+            </a:r>
+            <a:r>
+              <a:rPr lang="en-US" b="1" dirty="0">
+                <a:latin typeface="Consolas" panose="020B0609020204030204" pitchFamily="49" charset="0"/>
+                <a:cs typeface="Consolas" panose="020B0609020204030204" pitchFamily="49" charset="0"/>
+              </a:rPr>
+              <a:t>throw</a:t>
+            </a:r>
+            <a:r>
+              <a:rPr lang="en-US" dirty="0">
+                <a:latin typeface="Consolas" panose="020B0609020204030204" pitchFamily="49" charset="0"/>
+                <a:cs typeface="Consolas" panose="020B0609020204030204" pitchFamily="49" charset="0"/>
+              </a:rPr>
+              <a:t> std::</a:t>
+            </a:r>
+            <a:r>
+              <a:rPr lang="en-US" dirty="0" err="1">
+                <a:latin typeface="Consolas" panose="020B0609020204030204" pitchFamily="49" charset="0"/>
+                <a:cs typeface="Consolas" panose="020B0609020204030204" pitchFamily="49" charset="0"/>
+              </a:rPr>
+              <a:t>runtime_error</a:t>
+            </a:r>
+            <a:r>
+              <a:rPr lang="en-US" dirty="0">
+                <a:latin typeface="Consolas" panose="020B0609020204030204" pitchFamily="49" charset="0"/>
+                <a:cs typeface="Consolas" panose="020B0609020204030204" pitchFamily="49" charset="0"/>
+              </a:rPr>
+              <a:t>( “BWHAHAHA!!” );</a:t>
+            </a:r>
+          </a:p>
+          <a:p>
+            <a:r>
+              <a:rPr lang="en-US" dirty="0">
+                <a:latin typeface="Consolas" panose="020B0609020204030204" pitchFamily="49" charset="0"/>
+                <a:cs typeface="Consolas" panose="020B0609020204030204" pitchFamily="49" charset="0"/>
+              </a:rPr>
+              <a:t>}</a:t>
+            </a:r>
+          </a:p>
+        </p:txBody>
+      </p:sp>
+    </p:spTree>
+    <p:extLst>
+      <p:ext uri="{BB962C8B-B14F-4D97-AF65-F5344CB8AC3E}">
+        <p14:creationId xmlns:p14="http://schemas.microsoft.com/office/powerpoint/2010/main" val="3609883093"/>
       </p:ext>
     </p:extLst>
   </p:cSld>

</xml_diff>